<commit_message>
Ready for JaxDug Presentation
</commit_message>
<xml_diff>
--- a/Refactoring_Procedural_Code/Refactoring_Procedural_Code.pptx
+++ b/Refactoring_Procedural_Code/Refactoring_Procedural_Code.pptx
@@ -10,11 +10,14 @@
     <p:sldId id="281" r:id="rId4"/>
     <p:sldId id="274" r:id="rId5"/>
     <p:sldId id="280" r:id="rId6"/>
-    <p:sldId id="284" r:id="rId7"/>
-    <p:sldId id="282" r:id="rId8"/>
-    <p:sldId id="285" r:id="rId9"/>
-    <p:sldId id="283" r:id="rId10"/>
-    <p:sldId id="273" r:id="rId11"/>
+    <p:sldId id="286" r:id="rId7"/>
+    <p:sldId id="284" r:id="rId8"/>
+    <p:sldId id="282" r:id="rId9"/>
+    <p:sldId id="287" r:id="rId10"/>
+    <p:sldId id="285" r:id="rId11"/>
+    <p:sldId id="283" r:id="rId12"/>
+    <p:sldId id="288" r:id="rId13"/>
+    <p:sldId id="273" r:id="rId14"/>
   </p:sldIdLst>
   <p:sldSz cx="12192000" cy="6858000"/>
   <p:notesSz cx="6858000" cy="9144000"/>
@@ -2271,6 +2274,13 @@
         </dgm:presLayoutVars>
       </dgm:prSet>
       <dgm:spPr/>
+      <dgm:t>
+        <a:bodyPr/>
+        <a:lstStyle/>
+        <a:p>
+          <a:endParaRPr lang="en-US"/>
+        </a:p>
+      </dgm:t>
     </dgm:pt>
     <dgm:pt modelId="{BA894299-97DB-4667-BF57-DEC7597AD851}" type="pres">
       <dgm:prSet presAssocID="{1CD9DD62-71D1-4AB4-9004-F666B647DCD2}" presName="hierFlow" presStyleCnt="0"/>
@@ -2301,6 +2311,13 @@
         </dgm:presLayoutVars>
       </dgm:prSet>
       <dgm:spPr/>
+      <dgm:t>
+        <a:bodyPr/>
+        <a:lstStyle/>
+        <a:p>
+          <a:endParaRPr lang="en-US"/>
+        </a:p>
+      </dgm:t>
     </dgm:pt>
     <dgm:pt modelId="{949831FD-11D9-47E7-9005-3E17D3CF326B}" type="pres">
       <dgm:prSet presAssocID="{0D687C51-502C-48CF-8DFA-4574BB7E0BDC}" presName="hierChild2" presStyleCnt="0"/>
@@ -2309,10 +2326,24 @@
     <dgm:pt modelId="{80B81E04-174D-45C2-86AF-F63D1F112A73}" type="pres">
       <dgm:prSet presAssocID="{0A702134-785B-48E8-A677-613364C9D50E}" presName="Name25" presStyleLbl="parChTrans1D2" presStyleIdx="0" presStyleCnt="2"/>
       <dgm:spPr/>
+      <dgm:t>
+        <a:bodyPr/>
+        <a:lstStyle/>
+        <a:p>
+          <a:endParaRPr lang="en-US"/>
+        </a:p>
+      </dgm:t>
     </dgm:pt>
     <dgm:pt modelId="{FB4FC79E-E391-4D90-AB94-B0B9BDA3497A}" type="pres">
       <dgm:prSet presAssocID="{0A702134-785B-48E8-A677-613364C9D50E}" presName="connTx" presStyleLbl="parChTrans1D2" presStyleIdx="0" presStyleCnt="2"/>
       <dgm:spPr/>
+      <dgm:t>
+        <a:bodyPr/>
+        <a:lstStyle/>
+        <a:p>
+          <a:endParaRPr lang="en-US"/>
+        </a:p>
+      </dgm:t>
     </dgm:pt>
     <dgm:pt modelId="{66B5A1B5-748E-493E-8E61-EF5C6719C5DE}" type="pres">
       <dgm:prSet presAssocID="{CE6C6459-7675-4D52-9520-93731C259E25}" presName="Name30" presStyleCnt="0"/>
@@ -2321,6 +2352,13 @@
     <dgm:pt modelId="{60DED693-263F-4E40-9025-DEEE2B4072C5}" type="pres">
       <dgm:prSet presAssocID="{CE6C6459-7675-4D52-9520-93731C259E25}" presName="level2Shape" presStyleLbl="node2" presStyleIdx="0" presStyleCnt="2"/>
       <dgm:spPr/>
+      <dgm:t>
+        <a:bodyPr/>
+        <a:lstStyle/>
+        <a:p>
+          <a:endParaRPr lang="en-US"/>
+        </a:p>
+      </dgm:t>
     </dgm:pt>
     <dgm:pt modelId="{D6DEAFD9-8D75-4816-8D62-EE17D3D5175E}" type="pres">
       <dgm:prSet presAssocID="{CE6C6459-7675-4D52-9520-93731C259E25}" presName="hierChild3" presStyleCnt="0"/>
@@ -2329,10 +2367,24 @@
     <dgm:pt modelId="{9C27FF12-1874-4BFC-8976-392ECF8E121C}" type="pres">
       <dgm:prSet presAssocID="{AAA0BB42-E0CA-4855-A47A-DAD9CD3E6AC7}" presName="Name25" presStyleLbl="parChTrans1D3" presStyleIdx="0" presStyleCnt="4"/>
       <dgm:spPr/>
+      <dgm:t>
+        <a:bodyPr/>
+        <a:lstStyle/>
+        <a:p>
+          <a:endParaRPr lang="en-US"/>
+        </a:p>
+      </dgm:t>
     </dgm:pt>
     <dgm:pt modelId="{1F97F4B3-4707-447E-92A7-16B79223936D}" type="pres">
       <dgm:prSet presAssocID="{AAA0BB42-E0CA-4855-A47A-DAD9CD3E6AC7}" presName="connTx" presStyleLbl="parChTrans1D3" presStyleIdx="0" presStyleCnt="4"/>
       <dgm:spPr/>
+      <dgm:t>
+        <a:bodyPr/>
+        <a:lstStyle/>
+        <a:p>
+          <a:endParaRPr lang="en-US"/>
+        </a:p>
+      </dgm:t>
     </dgm:pt>
     <dgm:pt modelId="{D22A68F5-C4E1-45D4-A892-F1D2A19E348F}" type="pres">
       <dgm:prSet presAssocID="{A5F1D9FE-94AE-4D9D-8104-127130754F38}" presName="Name30" presStyleCnt="0"/>
@@ -2341,6 +2393,13 @@
     <dgm:pt modelId="{3CE3DBC4-EE13-42D3-BCE6-C6B2F278F807}" type="pres">
       <dgm:prSet presAssocID="{A5F1D9FE-94AE-4D9D-8104-127130754F38}" presName="level2Shape" presStyleLbl="node3" presStyleIdx="0" presStyleCnt="4"/>
       <dgm:spPr/>
+      <dgm:t>
+        <a:bodyPr/>
+        <a:lstStyle/>
+        <a:p>
+          <a:endParaRPr lang="en-US"/>
+        </a:p>
+      </dgm:t>
     </dgm:pt>
     <dgm:pt modelId="{73E3D5C2-1FD1-4E6C-BB39-E9C989C13639}" type="pres">
       <dgm:prSet presAssocID="{A5F1D9FE-94AE-4D9D-8104-127130754F38}" presName="hierChild3" presStyleCnt="0"/>
@@ -2349,10 +2408,24 @@
     <dgm:pt modelId="{96F733B4-71CF-4F60-B4BF-457F41FD9E8A}" type="pres">
       <dgm:prSet presAssocID="{AA6E28E9-08E4-4159-B4FD-19CE09705769}" presName="Name25" presStyleLbl="parChTrans1D4" presStyleIdx="0" presStyleCnt="24"/>
       <dgm:spPr/>
+      <dgm:t>
+        <a:bodyPr/>
+        <a:lstStyle/>
+        <a:p>
+          <a:endParaRPr lang="en-US"/>
+        </a:p>
+      </dgm:t>
     </dgm:pt>
     <dgm:pt modelId="{D515642A-D0FF-484D-B2AC-2A387BF0D6BB}" type="pres">
       <dgm:prSet presAssocID="{AA6E28E9-08E4-4159-B4FD-19CE09705769}" presName="connTx" presStyleLbl="parChTrans1D4" presStyleIdx="0" presStyleCnt="24"/>
       <dgm:spPr/>
+      <dgm:t>
+        <a:bodyPr/>
+        <a:lstStyle/>
+        <a:p>
+          <a:endParaRPr lang="en-US"/>
+        </a:p>
+      </dgm:t>
     </dgm:pt>
     <dgm:pt modelId="{47A578EC-A998-4EAE-974A-1ECADA2E9C22}" type="pres">
       <dgm:prSet presAssocID="{DA6FA8C2-A357-4386-BF3C-EC6C7ED88816}" presName="Name30" presStyleCnt="0"/>
@@ -2361,6 +2434,13 @@
     <dgm:pt modelId="{FA718ACE-803C-43D0-A3FF-A49775772DF0}" type="pres">
       <dgm:prSet presAssocID="{DA6FA8C2-A357-4386-BF3C-EC6C7ED88816}" presName="level2Shape" presStyleLbl="node4" presStyleIdx="0" presStyleCnt="24"/>
       <dgm:spPr/>
+      <dgm:t>
+        <a:bodyPr/>
+        <a:lstStyle/>
+        <a:p>
+          <a:endParaRPr lang="en-US"/>
+        </a:p>
+      </dgm:t>
     </dgm:pt>
     <dgm:pt modelId="{55919757-E779-4E22-9607-FCF3E1841293}" type="pres">
       <dgm:prSet presAssocID="{DA6FA8C2-A357-4386-BF3C-EC6C7ED88816}" presName="hierChild3" presStyleCnt="0"/>
@@ -2369,10 +2449,24 @@
     <dgm:pt modelId="{30B02AC4-22E2-4BFD-9FB9-3EAED9A765A5}" type="pres">
       <dgm:prSet presAssocID="{1EDF341C-890A-47D0-904A-D3359101FE57}" presName="Name25" presStyleLbl="parChTrans1D4" presStyleIdx="1" presStyleCnt="24"/>
       <dgm:spPr/>
+      <dgm:t>
+        <a:bodyPr/>
+        <a:lstStyle/>
+        <a:p>
+          <a:endParaRPr lang="en-US"/>
+        </a:p>
+      </dgm:t>
     </dgm:pt>
     <dgm:pt modelId="{9B11BAB6-C5CF-4DE2-9660-1777DDC73FBC}" type="pres">
       <dgm:prSet presAssocID="{1EDF341C-890A-47D0-904A-D3359101FE57}" presName="connTx" presStyleLbl="parChTrans1D4" presStyleIdx="1" presStyleCnt="24"/>
       <dgm:spPr/>
+      <dgm:t>
+        <a:bodyPr/>
+        <a:lstStyle/>
+        <a:p>
+          <a:endParaRPr lang="en-US"/>
+        </a:p>
+      </dgm:t>
     </dgm:pt>
     <dgm:pt modelId="{8CDD79A3-4103-4FC9-BF4F-E330BF0B8689}" type="pres">
       <dgm:prSet presAssocID="{07FAF939-5C4F-416F-85AB-52C73C46EA08}" presName="Name30" presStyleCnt="0"/>
@@ -2396,10 +2490,24 @@
     <dgm:pt modelId="{1831245D-153F-4759-9E75-ED192268B367}" type="pres">
       <dgm:prSet presAssocID="{91D44572-66D0-4F1C-B83C-19F5E3B96CD1}" presName="Name25" presStyleLbl="parChTrans1D4" presStyleIdx="2" presStyleCnt="24"/>
       <dgm:spPr/>
+      <dgm:t>
+        <a:bodyPr/>
+        <a:lstStyle/>
+        <a:p>
+          <a:endParaRPr lang="en-US"/>
+        </a:p>
+      </dgm:t>
     </dgm:pt>
     <dgm:pt modelId="{A46AD2AE-069B-49D6-95A1-82BE1C0C859C}" type="pres">
       <dgm:prSet presAssocID="{91D44572-66D0-4F1C-B83C-19F5E3B96CD1}" presName="connTx" presStyleLbl="parChTrans1D4" presStyleIdx="2" presStyleCnt="24"/>
       <dgm:spPr/>
+      <dgm:t>
+        <a:bodyPr/>
+        <a:lstStyle/>
+        <a:p>
+          <a:endParaRPr lang="en-US"/>
+        </a:p>
+      </dgm:t>
     </dgm:pt>
     <dgm:pt modelId="{A6E27B93-FC85-4F69-A533-41D236D345B9}" type="pres">
       <dgm:prSet presAssocID="{2156149C-D277-4817-9274-0223F9EC0341}" presName="Name30" presStyleCnt="0"/>
@@ -2408,6 +2516,13 @@
     <dgm:pt modelId="{7C43E7D1-713D-4DB7-B285-53D222D0F7E4}" type="pres">
       <dgm:prSet presAssocID="{2156149C-D277-4817-9274-0223F9EC0341}" presName="level2Shape" presStyleLbl="node4" presStyleIdx="2" presStyleCnt="24"/>
       <dgm:spPr/>
+      <dgm:t>
+        <a:bodyPr/>
+        <a:lstStyle/>
+        <a:p>
+          <a:endParaRPr lang="en-US"/>
+        </a:p>
+      </dgm:t>
     </dgm:pt>
     <dgm:pt modelId="{E86AB13D-3E43-42D7-B1F6-1AB1DC0C2CD1}" type="pres">
       <dgm:prSet presAssocID="{2156149C-D277-4817-9274-0223F9EC0341}" presName="hierChild3" presStyleCnt="0"/>
@@ -2416,10 +2531,24 @@
     <dgm:pt modelId="{EC4146AA-9375-444B-9B4A-A54C2C08C7E2}" type="pres">
       <dgm:prSet presAssocID="{21018797-09B0-43BC-990E-D2C4363A13E3}" presName="Name25" presStyleLbl="parChTrans1D4" presStyleIdx="3" presStyleCnt="24"/>
       <dgm:spPr/>
+      <dgm:t>
+        <a:bodyPr/>
+        <a:lstStyle/>
+        <a:p>
+          <a:endParaRPr lang="en-US"/>
+        </a:p>
+      </dgm:t>
     </dgm:pt>
     <dgm:pt modelId="{6BE3305E-F05E-4807-B948-D6048E81DFB0}" type="pres">
       <dgm:prSet presAssocID="{21018797-09B0-43BC-990E-D2C4363A13E3}" presName="connTx" presStyleLbl="parChTrans1D4" presStyleIdx="3" presStyleCnt="24"/>
       <dgm:spPr/>
+      <dgm:t>
+        <a:bodyPr/>
+        <a:lstStyle/>
+        <a:p>
+          <a:endParaRPr lang="en-US"/>
+        </a:p>
+      </dgm:t>
     </dgm:pt>
     <dgm:pt modelId="{4B6EB90B-9DD3-40E8-97A7-8098959A6192}" type="pres">
       <dgm:prSet presAssocID="{730F001D-F4A5-4EB0-8D88-B5C40674D694}" presName="Name30" presStyleCnt="0"/>
@@ -2428,6 +2557,13 @@
     <dgm:pt modelId="{9723A4E8-C293-44A7-8D1D-72F3C79538E8}" type="pres">
       <dgm:prSet presAssocID="{730F001D-F4A5-4EB0-8D88-B5C40674D694}" presName="level2Shape" presStyleLbl="node4" presStyleIdx="3" presStyleCnt="24"/>
       <dgm:spPr/>
+      <dgm:t>
+        <a:bodyPr/>
+        <a:lstStyle/>
+        <a:p>
+          <a:endParaRPr lang="en-US"/>
+        </a:p>
+      </dgm:t>
     </dgm:pt>
     <dgm:pt modelId="{C9E00F3C-2C8E-49F0-AF1D-B240A91358F5}" type="pres">
       <dgm:prSet presAssocID="{730F001D-F4A5-4EB0-8D88-B5C40674D694}" presName="hierChild3" presStyleCnt="0"/>
@@ -2436,10 +2572,24 @@
     <dgm:pt modelId="{4B600412-712E-4383-997C-706DB44D18A6}" type="pres">
       <dgm:prSet presAssocID="{9682CD7E-E678-44BD-9EBA-E4B8EFCC0DA8}" presName="Name25" presStyleLbl="parChTrans1D4" presStyleIdx="4" presStyleCnt="24"/>
       <dgm:spPr/>
+      <dgm:t>
+        <a:bodyPr/>
+        <a:lstStyle/>
+        <a:p>
+          <a:endParaRPr lang="en-US"/>
+        </a:p>
+      </dgm:t>
     </dgm:pt>
     <dgm:pt modelId="{3BB25170-7867-49C5-96A3-2C6046FBCACA}" type="pres">
       <dgm:prSet presAssocID="{9682CD7E-E678-44BD-9EBA-E4B8EFCC0DA8}" presName="connTx" presStyleLbl="parChTrans1D4" presStyleIdx="4" presStyleCnt="24"/>
       <dgm:spPr/>
+      <dgm:t>
+        <a:bodyPr/>
+        <a:lstStyle/>
+        <a:p>
+          <a:endParaRPr lang="en-US"/>
+        </a:p>
+      </dgm:t>
     </dgm:pt>
     <dgm:pt modelId="{17C044DC-3679-4D37-B162-5307D6F5B5B5}" type="pres">
       <dgm:prSet presAssocID="{77A54F8E-465A-4740-AB8E-FEB7A432FB77}" presName="Name30" presStyleCnt="0"/>
@@ -2463,10 +2613,24 @@
     <dgm:pt modelId="{17839822-E48C-4AB1-8DFC-FB7798F4D700}" type="pres">
       <dgm:prSet presAssocID="{5DF021A5-51AC-4009-942E-DDDC0FEE0D9C}" presName="Name25" presStyleLbl="parChTrans1D4" presStyleIdx="5" presStyleCnt="24"/>
       <dgm:spPr/>
+      <dgm:t>
+        <a:bodyPr/>
+        <a:lstStyle/>
+        <a:p>
+          <a:endParaRPr lang="en-US"/>
+        </a:p>
+      </dgm:t>
     </dgm:pt>
     <dgm:pt modelId="{A9BDF05C-259A-439E-A67A-BADD22FCFC0A}" type="pres">
       <dgm:prSet presAssocID="{5DF021A5-51AC-4009-942E-DDDC0FEE0D9C}" presName="connTx" presStyleLbl="parChTrans1D4" presStyleIdx="5" presStyleCnt="24"/>
       <dgm:spPr/>
+      <dgm:t>
+        <a:bodyPr/>
+        <a:lstStyle/>
+        <a:p>
+          <a:endParaRPr lang="en-US"/>
+        </a:p>
+      </dgm:t>
     </dgm:pt>
     <dgm:pt modelId="{0296EE56-DE8D-4D36-9A89-CB86FD40092F}" type="pres">
       <dgm:prSet presAssocID="{2609CAE7-1E9B-4EA8-9580-6C6B40609156}" presName="Name30" presStyleCnt="0"/>
@@ -2475,6 +2639,13 @@
     <dgm:pt modelId="{F49D0E06-532E-4A38-B17D-AA9F46ABFD20}" type="pres">
       <dgm:prSet presAssocID="{2609CAE7-1E9B-4EA8-9580-6C6B40609156}" presName="level2Shape" presStyleLbl="node4" presStyleIdx="5" presStyleCnt="24"/>
       <dgm:spPr/>
+      <dgm:t>
+        <a:bodyPr/>
+        <a:lstStyle/>
+        <a:p>
+          <a:endParaRPr lang="en-US"/>
+        </a:p>
+      </dgm:t>
     </dgm:pt>
     <dgm:pt modelId="{1FAFB3A5-3D9A-4586-AF83-103AA0803C59}" type="pres">
       <dgm:prSet presAssocID="{2609CAE7-1E9B-4EA8-9580-6C6B40609156}" presName="hierChild3" presStyleCnt="0"/>
@@ -2483,10 +2654,24 @@
     <dgm:pt modelId="{DA5E3BEE-FFBB-4462-BCA2-B5CD6BEA797F}" type="pres">
       <dgm:prSet presAssocID="{E10EE0F9-B5B9-4DEE-812B-2DBDC2ACA83A}" presName="Name25" presStyleLbl="parChTrans1D3" presStyleIdx="1" presStyleCnt="4"/>
       <dgm:spPr/>
+      <dgm:t>
+        <a:bodyPr/>
+        <a:lstStyle/>
+        <a:p>
+          <a:endParaRPr lang="en-US"/>
+        </a:p>
+      </dgm:t>
     </dgm:pt>
     <dgm:pt modelId="{F9452968-5195-4D30-A832-7742F8DB07AE}" type="pres">
       <dgm:prSet presAssocID="{E10EE0F9-B5B9-4DEE-812B-2DBDC2ACA83A}" presName="connTx" presStyleLbl="parChTrans1D3" presStyleIdx="1" presStyleCnt="4"/>
       <dgm:spPr/>
+      <dgm:t>
+        <a:bodyPr/>
+        <a:lstStyle/>
+        <a:p>
+          <a:endParaRPr lang="en-US"/>
+        </a:p>
+      </dgm:t>
     </dgm:pt>
     <dgm:pt modelId="{257E6872-3494-4EFA-8CE3-38515B05254E}" type="pres">
       <dgm:prSet presAssocID="{D0B55527-58A5-453A-AAC9-E7454914D72A}" presName="Name30" presStyleCnt="0"/>
@@ -2495,6 +2680,13 @@
     <dgm:pt modelId="{DAA02A32-98C7-4F72-8293-DB1D1E82BBF2}" type="pres">
       <dgm:prSet presAssocID="{D0B55527-58A5-453A-AAC9-E7454914D72A}" presName="level2Shape" presStyleLbl="node3" presStyleIdx="1" presStyleCnt="4"/>
       <dgm:spPr/>
+      <dgm:t>
+        <a:bodyPr/>
+        <a:lstStyle/>
+        <a:p>
+          <a:endParaRPr lang="en-US"/>
+        </a:p>
+      </dgm:t>
     </dgm:pt>
     <dgm:pt modelId="{ADF6E9EB-E1B0-4FE7-949B-33FBEB3B724A}" type="pres">
       <dgm:prSet presAssocID="{D0B55527-58A5-453A-AAC9-E7454914D72A}" presName="hierChild3" presStyleCnt="0"/>
@@ -2503,10 +2695,24 @@
     <dgm:pt modelId="{6159F236-2F76-41A9-A23B-BEBDBBBCB53B}" type="pres">
       <dgm:prSet presAssocID="{3BEFD10E-3FC3-40B4-9F94-725C61E140A6}" presName="Name25" presStyleLbl="parChTrans1D4" presStyleIdx="6" presStyleCnt="24"/>
       <dgm:spPr/>
+      <dgm:t>
+        <a:bodyPr/>
+        <a:lstStyle/>
+        <a:p>
+          <a:endParaRPr lang="en-US"/>
+        </a:p>
+      </dgm:t>
     </dgm:pt>
     <dgm:pt modelId="{5B3DBCAE-487B-45C9-B557-F679B80AC45A}" type="pres">
       <dgm:prSet presAssocID="{3BEFD10E-3FC3-40B4-9F94-725C61E140A6}" presName="connTx" presStyleLbl="parChTrans1D4" presStyleIdx="6" presStyleCnt="24"/>
       <dgm:spPr/>
+      <dgm:t>
+        <a:bodyPr/>
+        <a:lstStyle/>
+        <a:p>
+          <a:endParaRPr lang="en-US"/>
+        </a:p>
+      </dgm:t>
     </dgm:pt>
     <dgm:pt modelId="{AC519455-7FF2-4C38-B795-8F78E0D2A327}" type="pres">
       <dgm:prSet presAssocID="{3AA4DD33-29A4-49A2-B812-06861A367F30}" presName="Name30" presStyleCnt="0"/>
@@ -2515,6 +2721,13 @@
     <dgm:pt modelId="{F55CDB21-B25A-44E2-AC27-A62E893257EA}" type="pres">
       <dgm:prSet presAssocID="{3AA4DD33-29A4-49A2-B812-06861A367F30}" presName="level2Shape" presStyleLbl="node4" presStyleIdx="6" presStyleCnt="24"/>
       <dgm:spPr/>
+      <dgm:t>
+        <a:bodyPr/>
+        <a:lstStyle/>
+        <a:p>
+          <a:endParaRPr lang="en-US"/>
+        </a:p>
+      </dgm:t>
     </dgm:pt>
     <dgm:pt modelId="{592885B2-0AA9-4592-9E1C-4D328AC69FEC}" type="pres">
       <dgm:prSet presAssocID="{3AA4DD33-29A4-49A2-B812-06861A367F30}" presName="hierChild3" presStyleCnt="0"/>
@@ -2523,10 +2736,24 @@
     <dgm:pt modelId="{2CB77F7F-41D2-414F-BFAD-9CE9D858E357}" type="pres">
       <dgm:prSet presAssocID="{3703CCF6-A05B-4A59-8A37-C9334B8CE4EA}" presName="Name25" presStyleLbl="parChTrans1D4" presStyleIdx="7" presStyleCnt="24"/>
       <dgm:spPr/>
+      <dgm:t>
+        <a:bodyPr/>
+        <a:lstStyle/>
+        <a:p>
+          <a:endParaRPr lang="en-US"/>
+        </a:p>
+      </dgm:t>
     </dgm:pt>
     <dgm:pt modelId="{B8C2E5A0-CC61-472F-B45F-8E1C02483554}" type="pres">
       <dgm:prSet presAssocID="{3703CCF6-A05B-4A59-8A37-C9334B8CE4EA}" presName="connTx" presStyleLbl="parChTrans1D4" presStyleIdx="7" presStyleCnt="24"/>
       <dgm:spPr/>
+      <dgm:t>
+        <a:bodyPr/>
+        <a:lstStyle/>
+        <a:p>
+          <a:endParaRPr lang="en-US"/>
+        </a:p>
+      </dgm:t>
     </dgm:pt>
     <dgm:pt modelId="{5239951E-C1FD-4267-9E01-3BBEC351E28C}" type="pres">
       <dgm:prSet presAssocID="{F9140787-06FE-4EBE-A4EB-0CB65F2D6A1B}" presName="Name30" presStyleCnt="0"/>
@@ -2550,10 +2777,24 @@
     <dgm:pt modelId="{01122377-BF51-432C-B5BD-D9659081A77A}" type="pres">
       <dgm:prSet presAssocID="{9427EDE2-FA6C-44D5-BE12-8F55AB4D4442}" presName="Name25" presStyleLbl="parChTrans1D4" presStyleIdx="8" presStyleCnt="24"/>
       <dgm:spPr/>
+      <dgm:t>
+        <a:bodyPr/>
+        <a:lstStyle/>
+        <a:p>
+          <a:endParaRPr lang="en-US"/>
+        </a:p>
+      </dgm:t>
     </dgm:pt>
     <dgm:pt modelId="{4E7BBCD9-5235-4E66-B597-B5B06CAB7928}" type="pres">
       <dgm:prSet presAssocID="{9427EDE2-FA6C-44D5-BE12-8F55AB4D4442}" presName="connTx" presStyleLbl="parChTrans1D4" presStyleIdx="8" presStyleCnt="24"/>
       <dgm:spPr/>
+      <dgm:t>
+        <a:bodyPr/>
+        <a:lstStyle/>
+        <a:p>
+          <a:endParaRPr lang="en-US"/>
+        </a:p>
+      </dgm:t>
     </dgm:pt>
     <dgm:pt modelId="{24C0B369-C8D4-442E-9763-CADEA7C3EF17}" type="pres">
       <dgm:prSet presAssocID="{C6751658-C61A-4CFD-8EFE-23D6286459AC}" presName="Name30" presStyleCnt="0"/>
@@ -2562,6 +2803,13 @@
     <dgm:pt modelId="{552AC263-5454-4740-9492-B8399C4724E1}" type="pres">
       <dgm:prSet presAssocID="{C6751658-C61A-4CFD-8EFE-23D6286459AC}" presName="level2Shape" presStyleLbl="node4" presStyleIdx="8" presStyleCnt="24"/>
       <dgm:spPr/>
+      <dgm:t>
+        <a:bodyPr/>
+        <a:lstStyle/>
+        <a:p>
+          <a:endParaRPr lang="en-US"/>
+        </a:p>
+      </dgm:t>
     </dgm:pt>
     <dgm:pt modelId="{82DF2BAF-2EF4-40B7-8DAC-98131222F389}" type="pres">
       <dgm:prSet presAssocID="{C6751658-C61A-4CFD-8EFE-23D6286459AC}" presName="hierChild3" presStyleCnt="0"/>
@@ -2570,10 +2818,24 @@
     <dgm:pt modelId="{B13B3C32-1189-418C-BC67-FD16797FA497}" type="pres">
       <dgm:prSet presAssocID="{44771617-08EA-4EA7-B21B-5B248CEE262C}" presName="Name25" presStyleLbl="parChTrans1D4" presStyleIdx="9" presStyleCnt="24"/>
       <dgm:spPr/>
+      <dgm:t>
+        <a:bodyPr/>
+        <a:lstStyle/>
+        <a:p>
+          <a:endParaRPr lang="en-US"/>
+        </a:p>
+      </dgm:t>
     </dgm:pt>
     <dgm:pt modelId="{81FE9397-CF0F-438B-87BA-0C1AA4CBD002}" type="pres">
       <dgm:prSet presAssocID="{44771617-08EA-4EA7-B21B-5B248CEE262C}" presName="connTx" presStyleLbl="parChTrans1D4" presStyleIdx="9" presStyleCnt="24"/>
       <dgm:spPr/>
+      <dgm:t>
+        <a:bodyPr/>
+        <a:lstStyle/>
+        <a:p>
+          <a:endParaRPr lang="en-US"/>
+        </a:p>
+      </dgm:t>
     </dgm:pt>
     <dgm:pt modelId="{333214E5-FF9D-4294-9E80-E7B37D615F38}" type="pres">
       <dgm:prSet presAssocID="{2D4BCDE3-0492-4071-8698-EF997550D916}" presName="Name30" presStyleCnt="0"/>
@@ -2582,6 +2844,13 @@
     <dgm:pt modelId="{C08AD4DC-4EEE-4327-8D4E-4150C94BBD0E}" type="pres">
       <dgm:prSet presAssocID="{2D4BCDE3-0492-4071-8698-EF997550D916}" presName="level2Shape" presStyleLbl="node4" presStyleIdx="9" presStyleCnt="24"/>
       <dgm:spPr/>
+      <dgm:t>
+        <a:bodyPr/>
+        <a:lstStyle/>
+        <a:p>
+          <a:endParaRPr lang="en-US"/>
+        </a:p>
+      </dgm:t>
     </dgm:pt>
     <dgm:pt modelId="{76F7198A-9DBB-474C-8461-23C65C803C92}" type="pres">
       <dgm:prSet presAssocID="{2D4BCDE3-0492-4071-8698-EF997550D916}" presName="hierChild3" presStyleCnt="0"/>
@@ -2590,10 +2859,24 @@
     <dgm:pt modelId="{447F965F-96E9-40DC-834F-E91AA721F862}" type="pres">
       <dgm:prSet presAssocID="{FFDBC1C7-A7C8-4E99-A5A3-8B54E332C334}" presName="Name25" presStyleLbl="parChTrans1D4" presStyleIdx="10" presStyleCnt="24"/>
       <dgm:spPr/>
+      <dgm:t>
+        <a:bodyPr/>
+        <a:lstStyle/>
+        <a:p>
+          <a:endParaRPr lang="en-US"/>
+        </a:p>
+      </dgm:t>
     </dgm:pt>
     <dgm:pt modelId="{FF361F37-CE33-40F3-B237-A7D24026C6E6}" type="pres">
       <dgm:prSet presAssocID="{FFDBC1C7-A7C8-4E99-A5A3-8B54E332C334}" presName="connTx" presStyleLbl="parChTrans1D4" presStyleIdx="10" presStyleCnt="24"/>
       <dgm:spPr/>
+      <dgm:t>
+        <a:bodyPr/>
+        <a:lstStyle/>
+        <a:p>
+          <a:endParaRPr lang="en-US"/>
+        </a:p>
+      </dgm:t>
     </dgm:pt>
     <dgm:pt modelId="{0C006CC0-1E87-48B8-B1F6-45585F2C0867}" type="pres">
       <dgm:prSet presAssocID="{32B53F96-582F-49BE-A2E1-81FCE3D8DEDC}" presName="Name30" presStyleCnt="0"/>
@@ -2617,10 +2900,24 @@
     <dgm:pt modelId="{86B6B845-5675-4A08-81FA-73B842A94138}" type="pres">
       <dgm:prSet presAssocID="{D743D934-A151-4033-85EE-03A8AD73236D}" presName="Name25" presStyleLbl="parChTrans1D4" presStyleIdx="11" presStyleCnt="24"/>
       <dgm:spPr/>
+      <dgm:t>
+        <a:bodyPr/>
+        <a:lstStyle/>
+        <a:p>
+          <a:endParaRPr lang="en-US"/>
+        </a:p>
+      </dgm:t>
     </dgm:pt>
     <dgm:pt modelId="{6F611C5A-9069-4296-9DBE-6EFF5A7CB28F}" type="pres">
       <dgm:prSet presAssocID="{D743D934-A151-4033-85EE-03A8AD73236D}" presName="connTx" presStyleLbl="parChTrans1D4" presStyleIdx="11" presStyleCnt="24"/>
       <dgm:spPr/>
+      <dgm:t>
+        <a:bodyPr/>
+        <a:lstStyle/>
+        <a:p>
+          <a:endParaRPr lang="en-US"/>
+        </a:p>
+      </dgm:t>
     </dgm:pt>
     <dgm:pt modelId="{C012C733-A295-49F6-AE8C-C0DA2803A6F6}" type="pres">
       <dgm:prSet presAssocID="{1834AC4E-85AB-49FF-B573-A4707299E0E7}" presName="Name30" presStyleCnt="0"/>
@@ -2629,6 +2926,13 @@
     <dgm:pt modelId="{99C06FA2-59E4-4652-9628-1AE4948833D7}" type="pres">
       <dgm:prSet presAssocID="{1834AC4E-85AB-49FF-B573-A4707299E0E7}" presName="level2Shape" presStyleLbl="node4" presStyleIdx="11" presStyleCnt="24"/>
       <dgm:spPr/>
+      <dgm:t>
+        <a:bodyPr/>
+        <a:lstStyle/>
+        <a:p>
+          <a:endParaRPr lang="en-US"/>
+        </a:p>
+      </dgm:t>
     </dgm:pt>
     <dgm:pt modelId="{FBD0BD5C-FB7C-4BF2-BE88-602783ACC985}" type="pres">
       <dgm:prSet presAssocID="{1834AC4E-85AB-49FF-B573-A4707299E0E7}" presName="hierChild3" presStyleCnt="0"/>
@@ -2637,10 +2941,24 @@
     <dgm:pt modelId="{D3D1D14B-DC9D-4496-8982-375857092585}" type="pres">
       <dgm:prSet presAssocID="{B8BCA234-7558-4285-98DC-27C0A68632A0}" presName="Name25" presStyleLbl="parChTrans1D2" presStyleIdx="1" presStyleCnt="2"/>
       <dgm:spPr/>
+      <dgm:t>
+        <a:bodyPr/>
+        <a:lstStyle/>
+        <a:p>
+          <a:endParaRPr lang="en-US"/>
+        </a:p>
+      </dgm:t>
     </dgm:pt>
     <dgm:pt modelId="{E1F725A6-2EDB-4001-A75E-CEEE0AAC9B17}" type="pres">
       <dgm:prSet presAssocID="{B8BCA234-7558-4285-98DC-27C0A68632A0}" presName="connTx" presStyleLbl="parChTrans1D2" presStyleIdx="1" presStyleCnt="2"/>
       <dgm:spPr/>
+      <dgm:t>
+        <a:bodyPr/>
+        <a:lstStyle/>
+        <a:p>
+          <a:endParaRPr lang="en-US"/>
+        </a:p>
+      </dgm:t>
     </dgm:pt>
     <dgm:pt modelId="{6AF9DD34-6F5B-4DC3-A6E4-B2E463CD480F}" type="pres">
       <dgm:prSet presAssocID="{7D08F0DB-94FA-4A95-AE75-B80FC8240301}" presName="Name30" presStyleCnt="0"/>
@@ -2649,6 +2967,13 @@
     <dgm:pt modelId="{229CD80C-330D-4DAC-A3C1-59B6C682DAE6}" type="pres">
       <dgm:prSet presAssocID="{7D08F0DB-94FA-4A95-AE75-B80FC8240301}" presName="level2Shape" presStyleLbl="node2" presStyleIdx="1" presStyleCnt="2"/>
       <dgm:spPr/>
+      <dgm:t>
+        <a:bodyPr/>
+        <a:lstStyle/>
+        <a:p>
+          <a:endParaRPr lang="en-US"/>
+        </a:p>
+      </dgm:t>
     </dgm:pt>
     <dgm:pt modelId="{0B5A4234-76F2-4B55-A501-F557D8BFF446}" type="pres">
       <dgm:prSet presAssocID="{7D08F0DB-94FA-4A95-AE75-B80FC8240301}" presName="hierChild3" presStyleCnt="0"/>
@@ -2657,10 +2982,24 @@
     <dgm:pt modelId="{F3C23DF2-4442-4108-A920-CA0358091E48}" type="pres">
       <dgm:prSet presAssocID="{607BEA54-06A3-4744-8D8D-95019B9FFFE8}" presName="Name25" presStyleLbl="parChTrans1D3" presStyleIdx="2" presStyleCnt="4"/>
       <dgm:spPr/>
+      <dgm:t>
+        <a:bodyPr/>
+        <a:lstStyle/>
+        <a:p>
+          <a:endParaRPr lang="en-US"/>
+        </a:p>
+      </dgm:t>
     </dgm:pt>
     <dgm:pt modelId="{575743D4-45E3-4259-B33C-B53FA5903ACF}" type="pres">
       <dgm:prSet presAssocID="{607BEA54-06A3-4744-8D8D-95019B9FFFE8}" presName="connTx" presStyleLbl="parChTrans1D3" presStyleIdx="2" presStyleCnt="4"/>
       <dgm:spPr/>
+      <dgm:t>
+        <a:bodyPr/>
+        <a:lstStyle/>
+        <a:p>
+          <a:endParaRPr lang="en-US"/>
+        </a:p>
+      </dgm:t>
     </dgm:pt>
     <dgm:pt modelId="{62F166C7-AA62-4575-9453-5B7F3901DA73}" type="pres">
       <dgm:prSet presAssocID="{1F3ABAE5-FE40-4625-B826-2497EF69ACB0}" presName="Name30" presStyleCnt="0"/>
@@ -2669,6 +3008,13 @@
     <dgm:pt modelId="{DDB88BFF-D45A-4708-B1D6-9985179F7DBD}" type="pres">
       <dgm:prSet presAssocID="{1F3ABAE5-FE40-4625-B826-2497EF69ACB0}" presName="level2Shape" presStyleLbl="node3" presStyleIdx="2" presStyleCnt="4"/>
       <dgm:spPr/>
+      <dgm:t>
+        <a:bodyPr/>
+        <a:lstStyle/>
+        <a:p>
+          <a:endParaRPr lang="en-US"/>
+        </a:p>
+      </dgm:t>
     </dgm:pt>
     <dgm:pt modelId="{7CA6F9CD-12DF-4F06-A002-E7A934D29884}" type="pres">
       <dgm:prSet presAssocID="{1F3ABAE5-FE40-4625-B826-2497EF69ACB0}" presName="hierChild3" presStyleCnt="0"/>
@@ -2677,10 +3023,24 @@
     <dgm:pt modelId="{C85981BA-B3EC-4E1E-B5CC-4C957248A8F4}" type="pres">
       <dgm:prSet presAssocID="{5170FC55-8CD2-4575-8664-FE1527F70A57}" presName="Name25" presStyleLbl="parChTrans1D4" presStyleIdx="12" presStyleCnt="24"/>
       <dgm:spPr/>
+      <dgm:t>
+        <a:bodyPr/>
+        <a:lstStyle/>
+        <a:p>
+          <a:endParaRPr lang="en-US"/>
+        </a:p>
+      </dgm:t>
     </dgm:pt>
     <dgm:pt modelId="{AFB25989-E67A-44A6-AFF4-E96E26E3C9DD}" type="pres">
       <dgm:prSet presAssocID="{5170FC55-8CD2-4575-8664-FE1527F70A57}" presName="connTx" presStyleLbl="parChTrans1D4" presStyleIdx="12" presStyleCnt="24"/>
       <dgm:spPr/>
+      <dgm:t>
+        <a:bodyPr/>
+        <a:lstStyle/>
+        <a:p>
+          <a:endParaRPr lang="en-US"/>
+        </a:p>
+      </dgm:t>
     </dgm:pt>
     <dgm:pt modelId="{50484DE5-272B-4D4F-A1F9-529C55AEB58D}" type="pres">
       <dgm:prSet presAssocID="{F426891C-863F-4A09-A7E9-FC50DCF1E151}" presName="Name30" presStyleCnt="0"/>
@@ -2689,6 +3049,13 @@
     <dgm:pt modelId="{F8E7612B-DC34-4E03-96F7-7220E78E762A}" type="pres">
       <dgm:prSet presAssocID="{F426891C-863F-4A09-A7E9-FC50DCF1E151}" presName="level2Shape" presStyleLbl="node4" presStyleIdx="12" presStyleCnt="24"/>
       <dgm:spPr/>
+      <dgm:t>
+        <a:bodyPr/>
+        <a:lstStyle/>
+        <a:p>
+          <a:endParaRPr lang="en-US"/>
+        </a:p>
+      </dgm:t>
     </dgm:pt>
     <dgm:pt modelId="{F20D275D-5A23-4146-A589-B764B471163C}" type="pres">
       <dgm:prSet presAssocID="{F426891C-863F-4A09-A7E9-FC50DCF1E151}" presName="hierChild3" presStyleCnt="0"/>
@@ -2697,10 +3064,24 @@
     <dgm:pt modelId="{F5C90689-0D93-4983-824F-43F8C0C1014C}" type="pres">
       <dgm:prSet presAssocID="{B5DEF538-F16F-487A-9CF1-DF79331A26C1}" presName="Name25" presStyleLbl="parChTrans1D4" presStyleIdx="13" presStyleCnt="24"/>
       <dgm:spPr/>
+      <dgm:t>
+        <a:bodyPr/>
+        <a:lstStyle/>
+        <a:p>
+          <a:endParaRPr lang="en-US"/>
+        </a:p>
+      </dgm:t>
     </dgm:pt>
     <dgm:pt modelId="{BC4C10C4-2D8D-4F72-A93B-E53674A7FAA1}" type="pres">
       <dgm:prSet presAssocID="{B5DEF538-F16F-487A-9CF1-DF79331A26C1}" presName="connTx" presStyleLbl="parChTrans1D4" presStyleIdx="13" presStyleCnt="24"/>
       <dgm:spPr/>
+      <dgm:t>
+        <a:bodyPr/>
+        <a:lstStyle/>
+        <a:p>
+          <a:endParaRPr lang="en-US"/>
+        </a:p>
+      </dgm:t>
     </dgm:pt>
     <dgm:pt modelId="{DE929ED9-A64F-4924-8B95-74114A17097C}" type="pres">
       <dgm:prSet presAssocID="{58F416B4-4AFA-4C6A-9B3B-A1FF9F489D17}" presName="Name30" presStyleCnt="0"/>
@@ -2724,10 +3105,24 @@
     <dgm:pt modelId="{BCD01B47-E752-43DC-9204-4662C4A964FE}" type="pres">
       <dgm:prSet presAssocID="{34792C18-4B61-4DEA-BB2F-CD4D5C94BF59}" presName="Name25" presStyleLbl="parChTrans1D4" presStyleIdx="14" presStyleCnt="24"/>
       <dgm:spPr/>
+      <dgm:t>
+        <a:bodyPr/>
+        <a:lstStyle/>
+        <a:p>
+          <a:endParaRPr lang="en-US"/>
+        </a:p>
+      </dgm:t>
     </dgm:pt>
     <dgm:pt modelId="{E7CD4DCE-4196-41DD-886C-7F2EEA6B02AF}" type="pres">
       <dgm:prSet presAssocID="{34792C18-4B61-4DEA-BB2F-CD4D5C94BF59}" presName="connTx" presStyleLbl="parChTrans1D4" presStyleIdx="14" presStyleCnt="24"/>
       <dgm:spPr/>
+      <dgm:t>
+        <a:bodyPr/>
+        <a:lstStyle/>
+        <a:p>
+          <a:endParaRPr lang="en-US"/>
+        </a:p>
+      </dgm:t>
     </dgm:pt>
     <dgm:pt modelId="{55DE6693-A18E-4E3F-A41D-D5920DD9BFC4}" type="pres">
       <dgm:prSet presAssocID="{545E3727-7DFE-429D-814A-6CF01E080B31}" presName="Name30" presStyleCnt="0"/>
@@ -2736,6 +3131,13 @@
     <dgm:pt modelId="{8FC05931-54A7-429E-A4A9-9A249A4A90D3}" type="pres">
       <dgm:prSet presAssocID="{545E3727-7DFE-429D-814A-6CF01E080B31}" presName="level2Shape" presStyleLbl="node4" presStyleIdx="14" presStyleCnt="24"/>
       <dgm:spPr/>
+      <dgm:t>
+        <a:bodyPr/>
+        <a:lstStyle/>
+        <a:p>
+          <a:endParaRPr lang="en-US"/>
+        </a:p>
+      </dgm:t>
     </dgm:pt>
     <dgm:pt modelId="{7AB4D30A-E39A-4323-AE52-08D119961879}" type="pres">
       <dgm:prSet presAssocID="{545E3727-7DFE-429D-814A-6CF01E080B31}" presName="hierChild3" presStyleCnt="0"/>
@@ -2744,10 +3146,24 @@
     <dgm:pt modelId="{491E9DA6-DF96-4E0F-A533-FF77FC9B1ED6}" type="pres">
       <dgm:prSet presAssocID="{A3DB99DA-5742-4A54-9A93-4DE079D5FBA8}" presName="Name25" presStyleLbl="parChTrans1D4" presStyleIdx="15" presStyleCnt="24"/>
       <dgm:spPr/>
+      <dgm:t>
+        <a:bodyPr/>
+        <a:lstStyle/>
+        <a:p>
+          <a:endParaRPr lang="en-US"/>
+        </a:p>
+      </dgm:t>
     </dgm:pt>
     <dgm:pt modelId="{CA7DA830-ECD6-4150-BA97-1ED71F584FAC}" type="pres">
       <dgm:prSet presAssocID="{A3DB99DA-5742-4A54-9A93-4DE079D5FBA8}" presName="connTx" presStyleLbl="parChTrans1D4" presStyleIdx="15" presStyleCnt="24"/>
       <dgm:spPr/>
+      <dgm:t>
+        <a:bodyPr/>
+        <a:lstStyle/>
+        <a:p>
+          <a:endParaRPr lang="en-US"/>
+        </a:p>
+      </dgm:t>
     </dgm:pt>
     <dgm:pt modelId="{FBABF5DD-9ECA-4972-B2A8-4B341CC7AD6E}" type="pres">
       <dgm:prSet presAssocID="{E9B644CD-0AD6-4B2F-AE23-8D44A0D9533C}" presName="Name30" presStyleCnt="0"/>
@@ -2756,6 +3172,13 @@
     <dgm:pt modelId="{9AF4B254-F425-4BA4-89A6-37C9E0B347F8}" type="pres">
       <dgm:prSet presAssocID="{E9B644CD-0AD6-4B2F-AE23-8D44A0D9533C}" presName="level2Shape" presStyleLbl="node4" presStyleIdx="15" presStyleCnt="24"/>
       <dgm:spPr/>
+      <dgm:t>
+        <a:bodyPr/>
+        <a:lstStyle/>
+        <a:p>
+          <a:endParaRPr lang="en-US"/>
+        </a:p>
+      </dgm:t>
     </dgm:pt>
     <dgm:pt modelId="{83D271FC-3331-4080-98C6-8796B4226ED4}" type="pres">
       <dgm:prSet presAssocID="{E9B644CD-0AD6-4B2F-AE23-8D44A0D9533C}" presName="hierChild3" presStyleCnt="0"/>
@@ -2764,10 +3187,24 @@
     <dgm:pt modelId="{9B3B63D5-9C25-4694-A396-678698445052}" type="pres">
       <dgm:prSet presAssocID="{81B61790-51E0-4BE6-82A9-4D5328232DF4}" presName="Name25" presStyleLbl="parChTrans1D4" presStyleIdx="16" presStyleCnt="24"/>
       <dgm:spPr/>
+      <dgm:t>
+        <a:bodyPr/>
+        <a:lstStyle/>
+        <a:p>
+          <a:endParaRPr lang="en-US"/>
+        </a:p>
+      </dgm:t>
     </dgm:pt>
     <dgm:pt modelId="{458D0804-25FD-4A67-88D8-B0E9E8A08FED}" type="pres">
       <dgm:prSet presAssocID="{81B61790-51E0-4BE6-82A9-4D5328232DF4}" presName="connTx" presStyleLbl="parChTrans1D4" presStyleIdx="16" presStyleCnt="24"/>
       <dgm:spPr/>
+      <dgm:t>
+        <a:bodyPr/>
+        <a:lstStyle/>
+        <a:p>
+          <a:endParaRPr lang="en-US"/>
+        </a:p>
+      </dgm:t>
     </dgm:pt>
     <dgm:pt modelId="{2BCB0189-7DDB-43ED-9D84-CCB0D9697659}" type="pres">
       <dgm:prSet presAssocID="{A502BECD-C25C-46DD-998E-BBE3539A2279}" presName="Name30" presStyleCnt="0"/>
@@ -2791,10 +3228,24 @@
     <dgm:pt modelId="{EA81110D-DF21-4D75-B998-280031555119}" type="pres">
       <dgm:prSet presAssocID="{95F2FF84-D28D-407B-B8FE-2B372DF9BA0B}" presName="Name25" presStyleLbl="parChTrans1D4" presStyleIdx="17" presStyleCnt="24"/>
       <dgm:spPr/>
+      <dgm:t>
+        <a:bodyPr/>
+        <a:lstStyle/>
+        <a:p>
+          <a:endParaRPr lang="en-US"/>
+        </a:p>
+      </dgm:t>
     </dgm:pt>
     <dgm:pt modelId="{3DDC2BFA-D029-4FC9-9AF9-77E14E16B3E5}" type="pres">
       <dgm:prSet presAssocID="{95F2FF84-D28D-407B-B8FE-2B372DF9BA0B}" presName="connTx" presStyleLbl="parChTrans1D4" presStyleIdx="17" presStyleCnt="24"/>
       <dgm:spPr/>
+      <dgm:t>
+        <a:bodyPr/>
+        <a:lstStyle/>
+        <a:p>
+          <a:endParaRPr lang="en-US"/>
+        </a:p>
+      </dgm:t>
     </dgm:pt>
     <dgm:pt modelId="{18A77649-F3A6-4FAD-B127-607CB87B27A6}" type="pres">
       <dgm:prSet presAssocID="{74B15A58-032C-46CF-B5FE-463EE477385D}" presName="Name30" presStyleCnt="0"/>
@@ -2803,6 +3254,13 @@
     <dgm:pt modelId="{28E57BF7-BA7E-4AFE-A671-CFC047D7FCC6}" type="pres">
       <dgm:prSet presAssocID="{74B15A58-032C-46CF-B5FE-463EE477385D}" presName="level2Shape" presStyleLbl="node4" presStyleIdx="17" presStyleCnt="24"/>
       <dgm:spPr/>
+      <dgm:t>
+        <a:bodyPr/>
+        <a:lstStyle/>
+        <a:p>
+          <a:endParaRPr lang="en-US"/>
+        </a:p>
+      </dgm:t>
     </dgm:pt>
     <dgm:pt modelId="{558C4AAA-14BF-4B08-8482-D4F615B03DDE}" type="pres">
       <dgm:prSet presAssocID="{74B15A58-032C-46CF-B5FE-463EE477385D}" presName="hierChild3" presStyleCnt="0"/>
@@ -2811,10 +3269,24 @@
     <dgm:pt modelId="{A2854C72-DA8B-49A4-8120-CA3E12969429}" type="pres">
       <dgm:prSet presAssocID="{64665E1A-AFF0-43DA-B18D-D3AF74A28B79}" presName="Name25" presStyleLbl="parChTrans1D3" presStyleIdx="3" presStyleCnt="4"/>
       <dgm:spPr/>
+      <dgm:t>
+        <a:bodyPr/>
+        <a:lstStyle/>
+        <a:p>
+          <a:endParaRPr lang="en-US"/>
+        </a:p>
+      </dgm:t>
     </dgm:pt>
     <dgm:pt modelId="{8BFF3A73-F0C1-4E71-86E0-B4A468729C59}" type="pres">
       <dgm:prSet presAssocID="{64665E1A-AFF0-43DA-B18D-D3AF74A28B79}" presName="connTx" presStyleLbl="parChTrans1D3" presStyleIdx="3" presStyleCnt="4"/>
       <dgm:spPr/>
+      <dgm:t>
+        <a:bodyPr/>
+        <a:lstStyle/>
+        <a:p>
+          <a:endParaRPr lang="en-US"/>
+        </a:p>
+      </dgm:t>
     </dgm:pt>
     <dgm:pt modelId="{4B2435F6-1CB7-4C49-9BB5-55C14801AA7C}" type="pres">
       <dgm:prSet presAssocID="{F17D0DD2-BF6D-4CBD-A713-53D9A18B0296}" presName="Name30" presStyleCnt="0"/>
@@ -2823,6 +3295,13 @@
     <dgm:pt modelId="{D92946F3-3C10-44A8-8B33-4422A6016779}" type="pres">
       <dgm:prSet presAssocID="{F17D0DD2-BF6D-4CBD-A713-53D9A18B0296}" presName="level2Shape" presStyleLbl="node3" presStyleIdx="3" presStyleCnt="4"/>
       <dgm:spPr/>
+      <dgm:t>
+        <a:bodyPr/>
+        <a:lstStyle/>
+        <a:p>
+          <a:endParaRPr lang="en-US"/>
+        </a:p>
+      </dgm:t>
     </dgm:pt>
     <dgm:pt modelId="{58BB1586-D2D5-4B1A-946F-DE1A8D4BA32E}" type="pres">
       <dgm:prSet presAssocID="{F17D0DD2-BF6D-4CBD-A713-53D9A18B0296}" presName="hierChild3" presStyleCnt="0"/>
@@ -2831,10 +3310,24 @@
     <dgm:pt modelId="{0A2EE00C-43D2-4C8E-95E3-84F11AA1CC90}" type="pres">
       <dgm:prSet presAssocID="{5F8BA5B6-A0FC-4E95-AA0E-7A970892ADC8}" presName="Name25" presStyleLbl="parChTrans1D4" presStyleIdx="18" presStyleCnt="24"/>
       <dgm:spPr/>
+      <dgm:t>
+        <a:bodyPr/>
+        <a:lstStyle/>
+        <a:p>
+          <a:endParaRPr lang="en-US"/>
+        </a:p>
+      </dgm:t>
     </dgm:pt>
     <dgm:pt modelId="{7B822223-4FD0-4D13-9316-97E121718287}" type="pres">
       <dgm:prSet presAssocID="{5F8BA5B6-A0FC-4E95-AA0E-7A970892ADC8}" presName="connTx" presStyleLbl="parChTrans1D4" presStyleIdx="18" presStyleCnt="24"/>
       <dgm:spPr/>
+      <dgm:t>
+        <a:bodyPr/>
+        <a:lstStyle/>
+        <a:p>
+          <a:endParaRPr lang="en-US"/>
+        </a:p>
+      </dgm:t>
     </dgm:pt>
     <dgm:pt modelId="{A098A7F5-40FE-4822-8F6D-3911004746EF}" type="pres">
       <dgm:prSet presAssocID="{1A1E021E-DEDB-4DC8-914D-3CC33BF64070}" presName="Name30" presStyleCnt="0"/>
@@ -2843,6 +3336,13 @@
     <dgm:pt modelId="{05EE9D51-936F-4809-8516-A05D1D6DB641}" type="pres">
       <dgm:prSet presAssocID="{1A1E021E-DEDB-4DC8-914D-3CC33BF64070}" presName="level2Shape" presStyleLbl="node4" presStyleIdx="18" presStyleCnt="24"/>
       <dgm:spPr/>
+      <dgm:t>
+        <a:bodyPr/>
+        <a:lstStyle/>
+        <a:p>
+          <a:endParaRPr lang="en-US"/>
+        </a:p>
+      </dgm:t>
     </dgm:pt>
     <dgm:pt modelId="{8EE1785B-5756-4F7B-A1FD-75A377DD2046}" type="pres">
       <dgm:prSet presAssocID="{1A1E021E-DEDB-4DC8-914D-3CC33BF64070}" presName="hierChild3" presStyleCnt="0"/>
@@ -2851,10 +3351,24 @@
     <dgm:pt modelId="{51C38623-ECAC-43E7-87A7-872FA8331AB6}" type="pres">
       <dgm:prSet presAssocID="{0907BA1B-8C2C-46B2-8919-9D01FC1B262B}" presName="Name25" presStyleLbl="parChTrans1D4" presStyleIdx="19" presStyleCnt="24"/>
       <dgm:spPr/>
+      <dgm:t>
+        <a:bodyPr/>
+        <a:lstStyle/>
+        <a:p>
+          <a:endParaRPr lang="en-US"/>
+        </a:p>
+      </dgm:t>
     </dgm:pt>
     <dgm:pt modelId="{520C6796-1E1A-460F-A9A0-68737CF1A106}" type="pres">
       <dgm:prSet presAssocID="{0907BA1B-8C2C-46B2-8919-9D01FC1B262B}" presName="connTx" presStyleLbl="parChTrans1D4" presStyleIdx="19" presStyleCnt="24"/>
       <dgm:spPr/>
+      <dgm:t>
+        <a:bodyPr/>
+        <a:lstStyle/>
+        <a:p>
+          <a:endParaRPr lang="en-US"/>
+        </a:p>
+      </dgm:t>
     </dgm:pt>
     <dgm:pt modelId="{7193740C-3F85-4DC4-83CA-12BC3B1B6C69}" type="pres">
       <dgm:prSet presAssocID="{2DB01136-9D02-44C3-8D30-151451BED77A}" presName="Name30" presStyleCnt="0"/>
@@ -2878,10 +3392,24 @@
     <dgm:pt modelId="{D1CFFA0A-5F83-4099-95F2-AC364D7F0D31}" type="pres">
       <dgm:prSet presAssocID="{F6FB4C32-4A0B-4C24-BA0C-C1D83A64476F}" presName="Name25" presStyleLbl="parChTrans1D4" presStyleIdx="20" presStyleCnt="24"/>
       <dgm:spPr/>
+      <dgm:t>
+        <a:bodyPr/>
+        <a:lstStyle/>
+        <a:p>
+          <a:endParaRPr lang="en-US"/>
+        </a:p>
+      </dgm:t>
     </dgm:pt>
     <dgm:pt modelId="{028BD7EB-482E-4AFC-AA1C-726DCF0DE4C3}" type="pres">
       <dgm:prSet presAssocID="{F6FB4C32-4A0B-4C24-BA0C-C1D83A64476F}" presName="connTx" presStyleLbl="parChTrans1D4" presStyleIdx="20" presStyleCnt="24"/>
       <dgm:spPr/>
+      <dgm:t>
+        <a:bodyPr/>
+        <a:lstStyle/>
+        <a:p>
+          <a:endParaRPr lang="en-US"/>
+        </a:p>
+      </dgm:t>
     </dgm:pt>
     <dgm:pt modelId="{08221CEE-3C0F-4245-BBAF-3CB33C59E8E8}" type="pres">
       <dgm:prSet presAssocID="{908F626F-B516-4EEB-8541-81A1D2E50FE0}" presName="Name30" presStyleCnt="0"/>
@@ -2890,6 +3418,13 @@
     <dgm:pt modelId="{83223A45-16DF-4293-BF3B-1A601CD6136D}" type="pres">
       <dgm:prSet presAssocID="{908F626F-B516-4EEB-8541-81A1D2E50FE0}" presName="level2Shape" presStyleLbl="node4" presStyleIdx="20" presStyleCnt="24"/>
       <dgm:spPr/>
+      <dgm:t>
+        <a:bodyPr/>
+        <a:lstStyle/>
+        <a:p>
+          <a:endParaRPr lang="en-US"/>
+        </a:p>
+      </dgm:t>
     </dgm:pt>
     <dgm:pt modelId="{C414684A-7E96-40FC-AB7A-B7FACC45084E}" type="pres">
       <dgm:prSet presAssocID="{908F626F-B516-4EEB-8541-81A1D2E50FE0}" presName="hierChild3" presStyleCnt="0"/>
@@ -2898,10 +3433,24 @@
     <dgm:pt modelId="{1B604072-CA25-4129-8EB6-D106EE75C333}" type="pres">
       <dgm:prSet presAssocID="{6B6BB9DE-F38D-4E54-9E28-CC69F328C37F}" presName="Name25" presStyleLbl="parChTrans1D4" presStyleIdx="21" presStyleCnt="24"/>
       <dgm:spPr/>
+      <dgm:t>
+        <a:bodyPr/>
+        <a:lstStyle/>
+        <a:p>
+          <a:endParaRPr lang="en-US"/>
+        </a:p>
+      </dgm:t>
     </dgm:pt>
     <dgm:pt modelId="{4BBC361B-46A0-4451-9EAF-CC8B52B275D1}" type="pres">
       <dgm:prSet presAssocID="{6B6BB9DE-F38D-4E54-9E28-CC69F328C37F}" presName="connTx" presStyleLbl="parChTrans1D4" presStyleIdx="21" presStyleCnt="24"/>
       <dgm:spPr/>
+      <dgm:t>
+        <a:bodyPr/>
+        <a:lstStyle/>
+        <a:p>
+          <a:endParaRPr lang="en-US"/>
+        </a:p>
+      </dgm:t>
     </dgm:pt>
     <dgm:pt modelId="{A16EC651-0C7C-4C84-BE16-F69E9F847590}" type="pres">
       <dgm:prSet presAssocID="{FD200CDD-3708-42B4-9412-BC6BC10F780F}" presName="Name30" presStyleCnt="0"/>
@@ -2910,6 +3459,13 @@
     <dgm:pt modelId="{B2A9F8A5-DA6A-49A2-AC91-D8136DF75C35}" type="pres">
       <dgm:prSet presAssocID="{FD200CDD-3708-42B4-9412-BC6BC10F780F}" presName="level2Shape" presStyleLbl="node4" presStyleIdx="21" presStyleCnt="24"/>
       <dgm:spPr/>
+      <dgm:t>
+        <a:bodyPr/>
+        <a:lstStyle/>
+        <a:p>
+          <a:endParaRPr lang="en-US"/>
+        </a:p>
+      </dgm:t>
     </dgm:pt>
     <dgm:pt modelId="{7B0CACB5-EF12-4D90-8C6A-AC1AC6D60DA5}" type="pres">
       <dgm:prSet presAssocID="{FD200CDD-3708-42B4-9412-BC6BC10F780F}" presName="hierChild3" presStyleCnt="0"/>
@@ -2918,10 +3474,24 @@
     <dgm:pt modelId="{B49DCFD5-3E99-4135-A8FF-952B4708CF53}" type="pres">
       <dgm:prSet presAssocID="{F7F9063E-316E-4ACB-A092-745B51571572}" presName="Name25" presStyleLbl="parChTrans1D4" presStyleIdx="22" presStyleCnt="24"/>
       <dgm:spPr/>
+      <dgm:t>
+        <a:bodyPr/>
+        <a:lstStyle/>
+        <a:p>
+          <a:endParaRPr lang="en-US"/>
+        </a:p>
+      </dgm:t>
     </dgm:pt>
     <dgm:pt modelId="{B2B7C2BE-DB6B-4286-9AF2-0464FB7146DD}" type="pres">
       <dgm:prSet presAssocID="{F7F9063E-316E-4ACB-A092-745B51571572}" presName="connTx" presStyleLbl="parChTrans1D4" presStyleIdx="22" presStyleCnt="24"/>
       <dgm:spPr/>
+      <dgm:t>
+        <a:bodyPr/>
+        <a:lstStyle/>
+        <a:p>
+          <a:endParaRPr lang="en-US"/>
+        </a:p>
+      </dgm:t>
     </dgm:pt>
     <dgm:pt modelId="{8B1FA87F-737A-4D30-B1FB-D70CD342D5CB}" type="pres">
       <dgm:prSet presAssocID="{B6E81698-9A9A-4953-8EB0-57FCFFD6CBBB}" presName="Name30" presStyleCnt="0"/>
@@ -2945,10 +3515,24 @@
     <dgm:pt modelId="{B22F18DC-87CE-4AED-B450-0239C096CB00}" type="pres">
       <dgm:prSet presAssocID="{BC2138B6-2437-495E-8A8E-A6D94EFDEB17}" presName="Name25" presStyleLbl="parChTrans1D4" presStyleIdx="23" presStyleCnt="24"/>
       <dgm:spPr/>
+      <dgm:t>
+        <a:bodyPr/>
+        <a:lstStyle/>
+        <a:p>
+          <a:endParaRPr lang="en-US"/>
+        </a:p>
+      </dgm:t>
     </dgm:pt>
     <dgm:pt modelId="{CD4E2D1D-2803-4866-8244-D42D0E2B7384}" type="pres">
       <dgm:prSet presAssocID="{BC2138B6-2437-495E-8A8E-A6D94EFDEB17}" presName="connTx" presStyleLbl="parChTrans1D4" presStyleIdx="23" presStyleCnt="24"/>
       <dgm:spPr/>
+      <dgm:t>
+        <a:bodyPr/>
+        <a:lstStyle/>
+        <a:p>
+          <a:endParaRPr lang="en-US"/>
+        </a:p>
+      </dgm:t>
     </dgm:pt>
     <dgm:pt modelId="{034FD354-D3B2-46C7-9A4F-7D62DFD6E568}" type="pres">
       <dgm:prSet presAssocID="{3F961278-F127-4801-B067-9BB9A29EA637}" presName="Name30" presStyleCnt="0"/>
@@ -2957,6 +3541,13 @@
     <dgm:pt modelId="{FE7F2866-325D-4B3E-967D-67B7E3E88C14}" type="pres">
       <dgm:prSet presAssocID="{3F961278-F127-4801-B067-9BB9A29EA637}" presName="level2Shape" presStyleLbl="node4" presStyleIdx="23" presStyleCnt="24"/>
       <dgm:spPr/>
+      <dgm:t>
+        <a:bodyPr/>
+        <a:lstStyle/>
+        <a:p>
+          <a:endParaRPr lang="en-US"/>
+        </a:p>
+      </dgm:t>
     </dgm:pt>
     <dgm:pt modelId="{5EFA6435-F0C2-40FC-B3CE-32E401733EA8}" type="pres">
       <dgm:prSet presAssocID="{3F961278-F127-4801-B067-9BB9A29EA637}" presName="hierChild3" presStyleCnt="0"/>
@@ -2973,6 +3564,13 @@
     <dgm:pt modelId="{0ED429C1-77E8-4FA4-A21E-DF5C246FD072}" type="pres">
       <dgm:prSet presAssocID="{DC2CBB48-DF3A-4C5E-BDF6-ABC816F5C797}" presName="bgRect" presStyleLbl="bgShp" presStyleIdx="0" presStyleCnt="5"/>
       <dgm:spPr/>
+      <dgm:t>
+        <a:bodyPr/>
+        <a:lstStyle/>
+        <a:p>
+          <a:endParaRPr lang="en-US"/>
+        </a:p>
+      </dgm:t>
     </dgm:pt>
     <dgm:pt modelId="{73DD586C-FC46-4E6F-81D5-8ECB45DE8E57}" type="pres">
       <dgm:prSet presAssocID="{DC2CBB48-DF3A-4C5E-BDF6-ABC816F5C797}" presName="bgRectTx" presStyleLbl="bgShp" presStyleIdx="0" presStyleCnt="5">
@@ -2981,6 +3579,13 @@
         </dgm:presLayoutVars>
       </dgm:prSet>
       <dgm:spPr/>
+      <dgm:t>
+        <a:bodyPr/>
+        <a:lstStyle/>
+        <a:p>
+          <a:endParaRPr lang="en-US"/>
+        </a:p>
+      </dgm:t>
     </dgm:pt>
     <dgm:pt modelId="{FE29983D-3481-45B8-BF9E-3614797E3FF7}" type="pres">
       <dgm:prSet presAssocID="{DC2CBB48-DF3A-4C5E-BDF6-ABC816F5C797}" presName="spComp" presStyleCnt="0"/>
@@ -2997,6 +3602,13 @@
     <dgm:pt modelId="{FA248D77-6A15-4299-8DE4-3B766CF2728C}" type="pres">
       <dgm:prSet presAssocID="{3D02AF21-A4C9-475D-983D-652A2500649B}" presName="bgRect" presStyleLbl="bgShp" presStyleIdx="1" presStyleCnt="5"/>
       <dgm:spPr/>
+      <dgm:t>
+        <a:bodyPr/>
+        <a:lstStyle/>
+        <a:p>
+          <a:endParaRPr lang="en-US"/>
+        </a:p>
+      </dgm:t>
     </dgm:pt>
     <dgm:pt modelId="{C720D4D6-A118-4D38-9C85-955D2FD4D117}" type="pres">
       <dgm:prSet presAssocID="{3D02AF21-A4C9-475D-983D-652A2500649B}" presName="bgRectTx" presStyleLbl="bgShp" presStyleIdx="1" presStyleCnt="5">
@@ -3005,6 +3617,13 @@
         </dgm:presLayoutVars>
       </dgm:prSet>
       <dgm:spPr/>
+      <dgm:t>
+        <a:bodyPr/>
+        <a:lstStyle/>
+        <a:p>
+          <a:endParaRPr lang="en-US"/>
+        </a:p>
+      </dgm:t>
     </dgm:pt>
     <dgm:pt modelId="{F71B78B5-9335-4732-9614-60CA3A542C2D}" type="pres">
       <dgm:prSet presAssocID="{3D02AF21-A4C9-475D-983D-652A2500649B}" presName="spComp" presStyleCnt="0"/>
@@ -3021,6 +3640,13 @@
     <dgm:pt modelId="{626C1EBD-00F3-4EF0-A61E-6B9B11E3B8AB}" type="pres">
       <dgm:prSet presAssocID="{41D672BA-A028-4F21-B333-39B59A298DBB}" presName="bgRect" presStyleLbl="bgShp" presStyleIdx="2" presStyleCnt="5"/>
       <dgm:spPr/>
+      <dgm:t>
+        <a:bodyPr/>
+        <a:lstStyle/>
+        <a:p>
+          <a:endParaRPr lang="en-US"/>
+        </a:p>
+      </dgm:t>
     </dgm:pt>
     <dgm:pt modelId="{99923E23-69ED-45E1-BBE4-696F2F170579}" type="pres">
       <dgm:prSet presAssocID="{41D672BA-A028-4F21-B333-39B59A298DBB}" presName="bgRectTx" presStyleLbl="bgShp" presStyleIdx="2" presStyleCnt="5">
@@ -3029,6 +3655,13 @@
         </dgm:presLayoutVars>
       </dgm:prSet>
       <dgm:spPr/>
+      <dgm:t>
+        <a:bodyPr/>
+        <a:lstStyle/>
+        <a:p>
+          <a:endParaRPr lang="en-US"/>
+        </a:p>
+      </dgm:t>
     </dgm:pt>
     <dgm:pt modelId="{74BDE48C-2A25-4625-9EB3-8C197D4D9146}" type="pres">
       <dgm:prSet presAssocID="{41D672BA-A028-4F21-B333-39B59A298DBB}" presName="spComp" presStyleCnt="0"/>
@@ -3045,6 +3678,13 @@
     <dgm:pt modelId="{6AC56556-8368-4903-BC0E-4F6CBBCF053A}" type="pres">
       <dgm:prSet presAssocID="{07A62DD5-DEA2-483C-A892-96C00C737FBA}" presName="bgRect" presStyleLbl="bgShp" presStyleIdx="3" presStyleCnt="5"/>
       <dgm:spPr/>
+      <dgm:t>
+        <a:bodyPr/>
+        <a:lstStyle/>
+        <a:p>
+          <a:endParaRPr lang="en-US"/>
+        </a:p>
+      </dgm:t>
     </dgm:pt>
     <dgm:pt modelId="{B8B4F77C-1B6D-4BFF-9A87-B27ABF25ACED}" type="pres">
       <dgm:prSet presAssocID="{07A62DD5-DEA2-483C-A892-96C00C737FBA}" presName="bgRectTx" presStyleLbl="bgShp" presStyleIdx="3" presStyleCnt="5">
@@ -3053,6 +3693,13 @@
         </dgm:presLayoutVars>
       </dgm:prSet>
       <dgm:spPr/>
+      <dgm:t>
+        <a:bodyPr/>
+        <a:lstStyle/>
+        <a:p>
+          <a:endParaRPr lang="en-US"/>
+        </a:p>
+      </dgm:t>
     </dgm:pt>
     <dgm:pt modelId="{6739AB92-D99B-4EF6-BA56-75D1662D242A}" type="pres">
       <dgm:prSet presAssocID="{07A62DD5-DEA2-483C-A892-96C00C737FBA}" presName="spComp" presStyleCnt="0"/>
@@ -3069,6 +3716,13 @@
     <dgm:pt modelId="{1838C9BB-060F-4B9F-8DD7-45F28FC4E293}" type="pres">
       <dgm:prSet presAssocID="{7834B861-A087-47BB-BBBC-65BA175C7835}" presName="bgRect" presStyleLbl="bgShp" presStyleIdx="4" presStyleCnt="5"/>
       <dgm:spPr/>
+      <dgm:t>
+        <a:bodyPr/>
+        <a:lstStyle/>
+        <a:p>
+          <a:endParaRPr lang="en-US"/>
+        </a:p>
+      </dgm:t>
     </dgm:pt>
     <dgm:pt modelId="{4B13F10F-BC66-4B11-8803-C4AD232DED7F}" type="pres">
       <dgm:prSet presAssocID="{7834B861-A087-47BB-BBBC-65BA175C7835}" presName="bgRectTx" presStyleLbl="bgShp" presStyleIdx="4" presStyleCnt="5">
@@ -3077,147 +3731,154 @@
         </dgm:presLayoutVars>
       </dgm:prSet>
       <dgm:spPr/>
+      <dgm:t>
+        <a:bodyPr/>
+        <a:lstStyle/>
+        <a:p>
+          <a:endParaRPr lang="en-US"/>
+        </a:p>
+      </dgm:t>
     </dgm:pt>
   </dgm:ptLst>
   <dgm:cxnLst>
-    <dgm:cxn modelId="{976FB3F1-6C80-43D3-AADB-D879499CA429}" srcId="{F17D0DD2-BF6D-4CBD-A713-53D9A18B0296}" destId="{1A1E021E-DEDB-4DC8-914D-3CC33BF64070}" srcOrd="0" destOrd="0" parTransId="{5F8BA5B6-A0FC-4E95-AA0E-7A970892ADC8}" sibTransId="{326E1A0A-BBCE-42D0-9FFC-1E0BB4074673}"/>
+    <dgm:cxn modelId="{326EB761-3B8F-4946-A6C7-F7683FB48441}" type="presOf" srcId="{5F8BA5B6-A0FC-4E95-AA0E-7A970892ADC8}" destId="{7B822223-4FD0-4D13-9316-97E121718287}" srcOrd="1" destOrd="0" presId="urn:microsoft.com/office/officeart/2005/8/layout/hierarchy5"/>
+    <dgm:cxn modelId="{DE91E85F-7EEB-4BA5-B5AA-429570AECD6C}" type="presOf" srcId="{95F2FF84-D28D-407B-B8FE-2B372DF9BA0B}" destId="{EA81110D-DF21-4D75-B998-280031555119}" srcOrd="0" destOrd="0" presId="urn:microsoft.com/office/officeart/2005/8/layout/hierarchy5"/>
+    <dgm:cxn modelId="{D06C2223-3F80-45A6-8D1C-30B3BF7E7E80}" type="presOf" srcId="{9682CD7E-E678-44BD-9EBA-E4B8EFCC0DA8}" destId="{4B600412-712E-4383-997C-706DB44D18A6}" srcOrd="0" destOrd="0" presId="urn:microsoft.com/office/officeart/2005/8/layout/hierarchy5"/>
+    <dgm:cxn modelId="{28FAA116-02F8-4592-93E7-07107B073EF0}" srcId="{1CD9DD62-71D1-4AB4-9004-F666B647DCD2}" destId="{07A62DD5-DEA2-483C-A892-96C00C737FBA}" srcOrd="4" destOrd="0" parTransId="{6352F050-3A6F-4BC9-98C5-57C244C50A4C}" sibTransId="{14616CE9-EFC3-48A8-8C58-2184370289B7}"/>
+    <dgm:cxn modelId="{5C0F6086-2E50-4F13-9F5F-B97D1BF4FEDD}" srcId="{DA6FA8C2-A357-4386-BF3C-EC6C7ED88816}" destId="{2156149C-D277-4817-9274-0223F9EC0341}" srcOrd="1" destOrd="0" parTransId="{91D44572-66D0-4F1C-B83C-19F5E3B96CD1}" sibTransId="{06FB15C4-2BB1-44E1-BDAB-C99173B7B556}"/>
+    <dgm:cxn modelId="{809024B3-535D-4AD3-BCF4-C307AD562A01}" type="presOf" srcId="{F17D0DD2-BF6D-4CBD-A713-53D9A18B0296}" destId="{D92946F3-3C10-44A8-8B33-4422A6016779}" srcOrd="0" destOrd="0" presId="urn:microsoft.com/office/officeart/2005/8/layout/hierarchy5"/>
+    <dgm:cxn modelId="{EC35812E-7C36-4653-868B-AEB05A7F82E0}" type="presOf" srcId="{95F2FF84-D28D-407B-B8FE-2B372DF9BA0B}" destId="{3DDC2BFA-D029-4FC9-9AF9-77E14E16B3E5}" srcOrd="1" destOrd="0" presId="urn:microsoft.com/office/officeart/2005/8/layout/hierarchy5"/>
+    <dgm:cxn modelId="{570815A3-3C18-4050-8603-C308A7D544DD}" type="presOf" srcId="{DC2CBB48-DF3A-4C5E-BDF6-ABC816F5C797}" destId="{73DD586C-FC46-4E6F-81D5-8ECB45DE8E57}" srcOrd="1" destOrd="0" presId="urn:microsoft.com/office/officeart/2005/8/layout/hierarchy5"/>
+    <dgm:cxn modelId="{499628AD-21B8-496B-B479-5567619496B5}" srcId="{CE6C6459-7675-4D52-9520-93731C259E25}" destId="{A5F1D9FE-94AE-4D9D-8104-127130754F38}" srcOrd="0" destOrd="0" parTransId="{AAA0BB42-E0CA-4855-A47A-DAD9CD3E6AC7}" sibTransId="{68B45EC6-D31D-4F3B-92F8-2C575F12BC24}"/>
+    <dgm:cxn modelId="{215755E8-5202-42D8-BBD5-BF8CF4CFBD0C}" type="presOf" srcId="{3703CCF6-A05B-4A59-8A37-C9334B8CE4EA}" destId="{2CB77F7F-41D2-414F-BFAD-9CE9D858E357}" srcOrd="0" destOrd="0" presId="urn:microsoft.com/office/officeart/2005/8/layout/hierarchy5"/>
+    <dgm:cxn modelId="{54764657-162F-4EF3-BC92-55B34F61D3B8}" type="presOf" srcId="{E10EE0F9-B5B9-4DEE-812B-2DBDC2ACA83A}" destId="{F9452968-5195-4D30-A832-7742F8DB07AE}" srcOrd="1" destOrd="0" presId="urn:microsoft.com/office/officeart/2005/8/layout/hierarchy5"/>
+    <dgm:cxn modelId="{54995DFB-E48B-4A34-890E-C9EEF671B795}" type="presOf" srcId="{F426891C-863F-4A09-A7E9-FC50DCF1E151}" destId="{F8E7612B-DC34-4E03-96F7-7220E78E762A}" srcOrd="0" destOrd="0" presId="urn:microsoft.com/office/officeart/2005/8/layout/hierarchy5"/>
+    <dgm:cxn modelId="{7DE82AA1-31D1-402F-B301-20E761C8C96B}" type="presOf" srcId="{E10EE0F9-B5B9-4DEE-812B-2DBDC2ACA83A}" destId="{DA5E3BEE-FFBB-4462-BCA2-B5CD6BEA797F}" srcOrd="0" destOrd="0" presId="urn:microsoft.com/office/officeart/2005/8/layout/hierarchy5"/>
+    <dgm:cxn modelId="{5EC236DF-CD44-4AFE-8618-A0D0D075FC0A}" srcId="{D0B55527-58A5-453A-AAC9-E7454914D72A}" destId="{2D4BCDE3-0492-4071-8698-EF997550D916}" srcOrd="1" destOrd="0" parTransId="{44771617-08EA-4EA7-B21B-5B248CEE262C}" sibTransId="{3D52BD8D-F3EF-481B-B492-BD4D5F5D4726}"/>
+    <dgm:cxn modelId="{37ABACD5-7AA5-4BAD-8A56-93C12008B453}" type="presOf" srcId="{D0B55527-58A5-453A-AAC9-E7454914D72A}" destId="{DAA02A32-98C7-4F72-8293-DB1D1E82BBF2}" srcOrd="0" destOrd="0" presId="urn:microsoft.com/office/officeart/2005/8/layout/hierarchy5"/>
+    <dgm:cxn modelId="{30FA8037-3E40-469C-94EB-E1062C27ECEE}" type="presOf" srcId="{CE6C6459-7675-4D52-9520-93731C259E25}" destId="{60DED693-263F-4E40-9025-DEEE2B4072C5}" srcOrd="0" destOrd="0" presId="urn:microsoft.com/office/officeart/2005/8/layout/hierarchy5"/>
+    <dgm:cxn modelId="{C18CF4EF-1B13-49A9-988F-3241EE6AA144}" type="presOf" srcId="{E9B644CD-0AD6-4B2F-AE23-8D44A0D9533C}" destId="{9AF4B254-F425-4BA4-89A6-37C9E0B347F8}" srcOrd="0" destOrd="0" presId="urn:microsoft.com/office/officeart/2005/8/layout/hierarchy5"/>
+    <dgm:cxn modelId="{1ECB6473-C7B9-4DDB-8E6D-FF67F7A89881}" type="presOf" srcId="{FFDBC1C7-A7C8-4E99-A5A3-8B54E332C334}" destId="{FF361F37-CE33-40F3-B237-A7D24026C6E6}" srcOrd="1" destOrd="0" presId="urn:microsoft.com/office/officeart/2005/8/layout/hierarchy5"/>
+    <dgm:cxn modelId="{FA90D049-7912-40BC-8079-9DC1311F5CBB}" srcId="{DA6FA8C2-A357-4386-BF3C-EC6C7ED88816}" destId="{07FAF939-5C4F-416F-85AB-52C73C46EA08}" srcOrd="0" destOrd="0" parTransId="{1EDF341C-890A-47D0-904A-D3359101FE57}" sibTransId="{3EE00E86-F56F-44B3-930E-6636AA61935A}"/>
+    <dgm:cxn modelId="{6EC0E6BF-3CC9-44AA-B34C-062767EE3379}" srcId="{2D4BCDE3-0492-4071-8698-EF997550D916}" destId="{1834AC4E-85AB-49FF-B573-A4707299E0E7}" srcOrd="1" destOrd="0" parTransId="{D743D934-A151-4033-85EE-03A8AD73236D}" sibTransId="{52C0C978-BDE3-4465-9909-1AA5689BA8BD}"/>
+    <dgm:cxn modelId="{8A59AB2F-5C58-45D9-B519-223065BC0923}" type="presOf" srcId="{B6E81698-9A9A-4953-8EB0-57FCFFD6CBBB}" destId="{94C0F8F5-DDCF-4708-B2E0-BF92442436E9}" srcOrd="0" destOrd="0" presId="urn:microsoft.com/office/officeart/2005/8/layout/hierarchy5"/>
+    <dgm:cxn modelId="{42AEAD66-8657-44B3-8846-FF871ABA5A72}" srcId="{FD200CDD-3708-42B4-9412-BC6BC10F780F}" destId="{B6E81698-9A9A-4953-8EB0-57FCFFD6CBBB}" srcOrd="0" destOrd="0" parTransId="{F7F9063E-316E-4ACB-A092-745B51571572}" sibTransId="{605FFBE0-350A-415F-A827-12966FD05AAA}"/>
+    <dgm:cxn modelId="{018FB897-4991-44A0-A22A-BAD65C42FC2E}" type="presOf" srcId="{908F626F-B516-4EEB-8541-81A1D2E50FE0}" destId="{83223A45-16DF-4293-BF3B-1A601CD6136D}" srcOrd="0" destOrd="0" presId="urn:microsoft.com/office/officeart/2005/8/layout/hierarchy5"/>
+    <dgm:cxn modelId="{EC7EA44F-608E-459F-91E5-ED286C4694C2}" type="presOf" srcId="{FFDBC1C7-A7C8-4E99-A5A3-8B54E332C334}" destId="{447F965F-96E9-40DC-834F-E91AA721F862}" srcOrd="0" destOrd="0" presId="urn:microsoft.com/office/officeart/2005/8/layout/hierarchy5"/>
+    <dgm:cxn modelId="{2C8A3634-FF1A-4310-BC8B-B04BD133DDC0}" srcId="{1CD9DD62-71D1-4AB4-9004-F666B647DCD2}" destId="{0D687C51-502C-48CF-8DFA-4574BB7E0BDC}" srcOrd="0" destOrd="0" parTransId="{7CD96048-F7A9-42F8-86BB-AA5C34D2A0E6}" sibTransId="{48CB004E-CBED-4B23-90C1-9EA127C2BC69}"/>
+    <dgm:cxn modelId="{E758901D-BF17-49B8-AC86-C5593C2C92D5}" srcId="{F17D0DD2-BF6D-4CBD-A713-53D9A18B0296}" destId="{FD200CDD-3708-42B4-9412-BC6BC10F780F}" srcOrd="1" destOrd="0" parTransId="{6B6BB9DE-F38D-4E54-9E28-CC69F328C37F}" sibTransId="{BB18BA1B-86D6-4A40-A019-E9B2EFA521D1}"/>
+    <dgm:cxn modelId="{21F0DC6A-8B30-4E83-8168-A06A2F0B243A}" srcId="{1CD9DD62-71D1-4AB4-9004-F666B647DCD2}" destId="{7834B861-A087-47BB-BBBC-65BA175C7835}" srcOrd="5" destOrd="0" parTransId="{7E251BF3-1E0A-4EB0-92F1-0328E594CAF7}" sibTransId="{81A6E98E-5065-47C8-A92F-D9ADE1390B73}"/>
+    <dgm:cxn modelId="{FE6687A7-8731-4B45-AE3F-3E116274DF52}" type="presOf" srcId="{A3DB99DA-5742-4A54-9A93-4DE079D5FBA8}" destId="{491E9DA6-DF96-4E0F-A533-FF77FC9B1ED6}" srcOrd="0" destOrd="0" presId="urn:microsoft.com/office/officeart/2005/8/layout/hierarchy5"/>
+    <dgm:cxn modelId="{CB49E4D0-4EBD-4BE1-99C4-568FAFF875A2}" type="presOf" srcId="{A3DB99DA-5742-4A54-9A93-4DE079D5FBA8}" destId="{CA7DA830-ECD6-4150-BA97-1ED71F584FAC}" srcOrd="1" destOrd="0" presId="urn:microsoft.com/office/officeart/2005/8/layout/hierarchy5"/>
+    <dgm:cxn modelId="{A2411785-28C5-40AC-83A3-B196AE46A490}" type="presOf" srcId="{D743D934-A151-4033-85EE-03A8AD73236D}" destId="{6F611C5A-9069-4296-9DBE-6EFF5A7CB28F}" srcOrd="1" destOrd="0" presId="urn:microsoft.com/office/officeart/2005/8/layout/hierarchy5"/>
+    <dgm:cxn modelId="{792A95BF-B138-42D8-8B71-8001D679AC7D}" type="presOf" srcId="{5DF021A5-51AC-4009-942E-DDDC0FEE0D9C}" destId="{A9BDF05C-259A-439E-A67A-BADD22FCFC0A}" srcOrd="1" destOrd="0" presId="urn:microsoft.com/office/officeart/2005/8/layout/hierarchy5"/>
+    <dgm:cxn modelId="{54474368-6DC0-4569-B719-E6153ADB7AED}" type="presOf" srcId="{9682CD7E-E678-44BD-9EBA-E4B8EFCC0DA8}" destId="{3BB25170-7867-49C5-96A3-2C6046FBCACA}" srcOrd="1" destOrd="0" presId="urn:microsoft.com/office/officeart/2005/8/layout/hierarchy5"/>
+    <dgm:cxn modelId="{3A1D86C2-7C2C-410C-8FA1-CA743D4ECEB6}" type="presOf" srcId="{07A62DD5-DEA2-483C-A892-96C00C737FBA}" destId="{6AC56556-8368-4903-BC0E-4F6CBBCF053A}" srcOrd="0" destOrd="0" presId="urn:microsoft.com/office/officeart/2005/8/layout/hierarchy5"/>
+    <dgm:cxn modelId="{6290C773-81F5-4171-9C80-E6B5497B44F8}" type="presOf" srcId="{21018797-09B0-43BC-990E-D2C4363A13E3}" destId="{EC4146AA-9375-444B-9B4A-A54C2C08C7E2}" srcOrd="0" destOrd="0" presId="urn:microsoft.com/office/officeart/2005/8/layout/hierarchy5"/>
+    <dgm:cxn modelId="{C4E80C13-1F0E-4C0E-B9F7-77AB9D420873}" type="presOf" srcId="{5DF021A5-51AC-4009-942E-DDDC0FEE0D9C}" destId="{17839822-E48C-4AB1-8DFC-FB7798F4D700}" srcOrd="0" destOrd="0" presId="urn:microsoft.com/office/officeart/2005/8/layout/hierarchy5"/>
+    <dgm:cxn modelId="{FBF608B6-2682-4FE6-816B-52FA28965180}" type="presOf" srcId="{2156149C-D277-4817-9274-0223F9EC0341}" destId="{7C43E7D1-713D-4DB7-B285-53D222D0F7E4}" srcOrd="0" destOrd="0" presId="urn:microsoft.com/office/officeart/2005/8/layout/hierarchy5"/>
+    <dgm:cxn modelId="{A1FCEC67-EF8A-4B52-BF05-F19F1972E403}" type="presOf" srcId="{0D687C51-502C-48CF-8DFA-4574BB7E0BDC}" destId="{D2D24B57-3EB3-47CA-886C-D78BDDBD6616}" srcOrd="0" destOrd="0" presId="urn:microsoft.com/office/officeart/2005/8/layout/hierarchy5"/>
+    <dgm:cxn modelId="{87EAFED4-B84D-4A33-9C94-405EE12D71AA}" type="presOf" srcId="{7834B861-A087-47BB-BBBC-65BA175C7835}" destId="{1838C9BB-060F-4B9F-8DD7-45F28FC4E293}" srcOrd="0" destOrd="0" presId="urn:microsoft.com/office/officeart/2005/8/layout/hierarchy5"/>
+    <dgm:cxn modelId="{6CC5FA23-222F-4A9C-98DE-9A7AD6638017}" srcId="{0D687C51-502C-48CF-8DFA-4574BB7E0BDC}" destId="{7D08F0DB-94FA-4A95-AE75-B80FC8240301}" srcOrd="1" destOrd="0" parTransId="{B8BCA234-7558-4285-98DC-27C0A68632A0}" sibTransId="{0619CD34-9891-43E8-ACC7-DBF7BDAF7B10}"/>
+    <dgm:cxn modelId="{CDD9A9E3-F3D3-45DF-81F0-D1F8D698D49E}" srcId="{0D687C51-502C-48CF-8DFA-4574BB7E0BDC}" destId="{CE6C6459-7675-4D52-9520-93731C259E25}" srcOrd="0" destOrd="0" parTransId="{0A702134-785B-48E8-A677-613364C9D50E}" sibTransId="{911388C6-FDA5-42ED-9958-30BA17734BE3}"/>
+    <dgm:cxn modelId="{984FF9E0-07D8-4B3A-B039-266DEF3F4A2C}" type="presOf" srcId="{3AA4DD33-29A4-49A2-B812-06861A367F30}" destId="{F55CDB21-B25A-44E2-AC27-A62E893257EA}" srcOrd="0" destOrd="0" presId="urn:microsoft.com/office/officeart/2005/8/layout/hierarchy5"/>
+    <dgm:cxn modelId="{47FC4AFB-4EB1-41CF-9F90-14B6397AD838}" type="presOf" srcId="{7834B861-A087-47BB-BBBC-65BA175C7835}" destId="{4B13F10F-BC66-4B11-8803-C4AD232DED7F}" srcOrd="1" destOrd="0" presId="urn:microsoft.com/office/officeart/2005/8/layout/hierarchy5"/>
+    <dgm:cxn modelId="{63B6E2B6-5CD4-458B-AF5B-113F9CEDE4C1}" type="presOf" srcId="{DA6FA8C2-A357-4386-BF3C-EC6C7ED88816}" destId="{FA718ACE-803C-43D0-A3FF-A49775772DF0}" srcOrd="0" destOrd="0" presId="urn:microsoft.com/office/officeart/2005/8/layout/hierarchy5"/>
+    <dgm:cxn modelId="{EF365414-ED4F-4ABA-8D88-57D6663C2800}" type="presOf" srcId="{6B6BB9DE-F38D-4E54-9E28-CC69F328C37F}" destId="{4BBC361B-46A0-4451-9EAF-CC8B52B275D1}" srcOrd="1" destOrd="0" presId="urn:microsoft.com/office/officeart/2005/8/layout/hierarchy5"/>
+    <dgm:cxn modelId="{0CDC7DA6-5BE2-43D4-87F0-C41F5C22C6DD}" srcId="{1A1E021E-DEDB-4DC8-914D-3CC33BF64070}" destId="{908F626F-B516-4EEB-8541-81A1D2E50FE0}" srcOrd="1" destOrd="0" parTransId="{F6FB4C32-4A0B-4C24-BA0C-C1D83A64476F}" sibTransId="{1384C94D-8589-4D35-B651-3CC4E1B00111}"/>
+    <dgm:cxn modelId="{84858702-D80E-4B81-AE4F-CAF550B3BF64}" type="presOf" srcId="{1EDF341C-890A-47D0-904A-D3359101FE57}" destId="{30B02AC4-22E2-4BFD-9FB9-3EAED9A765A5}" srcOrd="0" destOrd="0" presId="urn:microsoft.com/office/officeart/2005/8/layout/hierarchy5"/>
+    <dgm:cxn modelId="{B8DBC284-431B-4A34-A763-3960B70F15A3}" type="presOf" srcId="{41D672BA-A028-4F21-B333-39B59A298DBB}" destId="{626C1EBD-00F3-4EF0-A61E-6B9B11E3B8AB}" srcOrd="0" destOrd="0" presId="urn:microsoft.com/office/officeart/2005/8/layout/hierarchy5"/>
+    <dgm:cxn modelId="{5FB0775D-F7CA-45D0-87F9-BCCBA4B0EDB8}" type="presOf" srcId="{34792C18-4B61-4DEA-BB2F-CD4D5C94BF59}" destId="{E7CD4DCE-4196-41DD-886C-7F2EEA6B02AF}" srcOrd="1" destOrd="0" presId="urn:microsoft.com/office/officeart/2005/8/layout/hierarchy5"/>
+    <dgm:cxn modelId="{6DB4259C-4BDE-421E-AEE0-7FD81CAAA083}" type="presOf" srcId="{2609CAE7-1E9B-4EA8-9580-6C6B40609156}" destId="{F49D0E06-532E-4A38-B17D-AA9F46ABFD20}" srcOrd="0" destOrd="0" presId="urn:microsoft.com/office/officeart/2005/8/layout/hierarchy5"/>
+    <dgm:cxn modelId="{28EDF33C-1D20-44E1-978E-0653A617C528}" srcId="{E9B644CD-0AD6-4B2F-AE23-8D44A0D9533C}" destId="{74B15A58-032C-46CF-B5FE-463EE477385D}" srcOrd="1" destOrd="0" parTransId="{95F2FF84-D28D-407B-B8FE-2B372DF9BA0B}" sibTransId="{A59CC78B-BFA7-484E-B62E-D7EEC8249C44}"/>
+    <dgm:cxn modelId="{28E80D77-EAF1-4824-AB50-0BA7A0174F36}" srcId="{D0B55527-58A5-453A-AAC9-E7454914D72A}" destId="{3AA4DD33-29A4-49A2-B812-06861A367F30}" srcOrd="0" destOrd="0" parTransId="{3BEFD10E-3FC3-40B4-9F94-725C61E140A6}" sibTransId="{54873295-23A7-4CED-9DCB-18E65CD4BA37}"/>
+    <dgm:cxn modelId="{62EC1894-5BB5-4DA7-AD2E-C7BBDFBE08E6}" srcId="{3AA4DD33-29A4-49A2-B812-06861A367F30}" destId="{F9140787-06FE-4EBE-A4EB-0CB65F2D6A1B}" srcOrd="0" destOrd="0" parTransId="{3703CCF6-A05B-4A59-8A37-C9334B8CE4EA}" sibTransId="{43268F99-0228-4D21-BD78-EB6538024EF8}"/>
+    <dgm:cxn modelId="{66536165-5850-4A79-9D8B-BD52C0833C19}" type="presOf" srcId="{9427EDE2-FA6C-44D5-BE12-8F55AB4D4442}" destId="{01122377-BF51-432C-B5BD-D9659081A77A}" srcOrd="0" destOrd="0" presId="urn:microsoft.com/office/officeart/2005/8/layout/hierarchy5"/>
+    <dgm:cxn modelId="{90318B68-7914-47B4-A766-45A73BD718AA}" srcId="{CE6C6459-7675-4D52-9520-93731C259E25}" destId="{D0B55527-58A5-453A-AAC9-E7454914D72A}" srcOrd="1" destOrd="0" parTransId="{E10EE0F9-B5B9-4DEE-812B-2DBDC2ACA83A}" sibTransId="{28EF489E-8100-4B50-B34B-FEDAB4431C82}"/>
+    <dgm:cxn modelId="{3F34EA5F-7BED-4B1F-981E-51DC127E7D27}" type="presOf" srcId="{1EDF341C-890A-47D0-904A-D3359101FE57}" destId="{9B11BAB6-C5CF-4DE2-9660-1777DDC73FBC}" srcOrd="1" destOrd="0" presId="urn:microsoft.com/office/officeart/2005/8/layout/hierarchy5"/>
+    <dgm:cxn modelId="{22334715-DBC6-4DFD-8958-141CCB34EFF6}" type="presOf" srcId="{07A62DD5-DEA2-483C-A892-96C00C737FBA}" destId="{B8B4F77C-1B6D-4BFF-9A87-B27ABF25ACED}" srcOrd="1" destOrd="0" presId="urn:microsoft.com/office/officeart/2005/8/layout/hierarchy5"/>
+    <dgm:cxn modelId="{19528FD5-9E97-4FCB-A66A-C7D3219B9017}" type="presOf" srcId="{D743D934-A151-4033-85EE-03A8AD73236D}" destId="{86B6B845-5675-4A08-81FA-73B842A94138}" srcOrd="0" destOrd="0" presId="urn:microsoft.com/office/officeart/2005/8/layout/hierarchy5"/>
+    <dgm:cxn modelId="{6095F952-3862-4FF5-A114-D04904E6AA8B}" type="presOf" srcId="{F7F9063E-316E-4ACB-A092-745B51571572}" destId="{B49DCFD5-3E99-4135-A8FF-952B4708CF53}" srcOrd="0" destOrd="0" presId="urn:microsoft.com/office/officeart/2005/8/layout/hierarchy5"/>
+    <dgm:cxn modelId="{363CA59A-FF57-4378-ABC0-95E15810D0FC}" srcId="{1CD9DD62-71D1-4AB4-9004-F666B647DCD2}" destId="{3D02AF21-A4C9-475D-983D-652A2500649B}" srcOrd="2" destOrd="0" parTransId="{5C925451-C102-44A7-A6FE-CEF1952E591B}" sibTransId="{C5007346-C7F7-415D-9987-87B2FFA7F1F1}"/>
+    <dgm:cxn modelId="{9FA1F8C5-957C-417F-A7C0-EF0B4C98E228}" srcId="{F426891C-863F-4A09-A7E9-FC50DCF1E151}" destId="{545E3727-7DFE-429D-814A-6CF01E080B31}" srcOrd="1" destOrd="0" parTransId="{34792C18-4B61-4DEA-BB2F-CD4D5C94BF59}" sibTransId="{3A5CE702-E999-4278-A7C8-FDCB1CF46B46}"/>
+    <dgm:cxn modelId="{E4A32504-9155-4364-878C-B7BAD783F631}" type="presOf" srcId="{3D02AF21-A4C9-475D-983D-652A2500649B}" destId="{C720D4D6-A118-4D38-9C85-955D2FD4D117}" srcOrd="1" destOrd="0" presId="urn:microsoft.com/office/officeart/2005/8/layout/hierarchy5"/>
+    <dgm:cxn modelId="{0E798F92-F32A-4650-BBB3-00EFFF4555AA}" type="presOf" srcId="{58F416B4-4AFA-4C6A-9B3B-A1FF9F489D17}" destId="{E307016A-E994-4E84-987B-8E3D6D020213}" srcOrd="0" destOrd="0" presId="urn:microsoft.com/office/officeart/2005/8/layout/hierarchy5"/>
+    <dgm:cxn modelId="{7967874C-5385-4E61-82CE-C63185D5A50C}" type="presOf" srcId="{81B61790-51E0-4BE6-82A9-4D5328232DF4}" destId="{9B3B63D5-9C25-4694-A396-678698445052}" srcOrd="0" destOrd="0" presId="urn:microsoft.com/office/officeart/2005/8/layout/hierarchy5"/>
+    <dgm:cxn modelId="{1F4492B5-C972-4B59-9320-0637734B6297}" type="presOf" srcId="{1CD9DD62-71D1-4AB4-9004-F666B647DCD2}" destId="{94863F81-6F51-415B-BE40-8777D7E91B03}" srcOrd="0" destOrd="0" presId="urn:microsoft.com/office/officeart/2005/8/layout/hierarchy5"/>
+    <dgm:cxn modelId="{B59D9290-D5DE-464F-8081-6F55631C7E13}" type="presOf" srcId="{B5DEF538-F16F-487A-9CF1-DF79331A26C1}" destId="{BC4C10C4-2D8D-4F72-A93B-E53674A7FAA1}" srcOrd="1" destOrd="0" presId="urn:microsoft.com/office/officeart/2005/8/layout/hierarchy5"/>
+    <dgm:cxn modelId="{DE44CE27-CC1D-4802-A31C-349D1C5986DC}" srcId="{3AA4DD33-29A4-49A2-B812-06861A367F30}" destId="{C6751658-C61A-4CFD-8EFE-23D6286459AC}" srcOrd="1" destOrd="0" parTransId="{9427EDE2-FA6C-44D5-BE12-8F55AB4D4442}" sibTransId="{2DFD55CC-C3A5-4A5A-AC56-0663C310FBCC}"/>
+    <dgm:cxn modelId="{9674C647-4703-4D23-BF09-D1D0C3EEDF20}" srcId="{1F3ABAE5-FE40-4625-B826-2497EF69ACB0}" destId="{E9B644CD-0AD6-4B2F-AE23-8D44A0D9533C}" srcOrd="1" destOrd="0" parTransId="{A3DB99DA-5742-4A54-9A93-4DE079D5FBA8}" sibTransId="{28874741-DC46-4A04-9A96-DBDC920255E2}"/>
+    <dgm:cxn modelId="{89C8FEE6-D342-4DA8-8E4A-F6EF2F1AEA4C}" type="presOf" srcId="{44771617-08EA-4EA7-B21B-5B248CEE262C}" destId="{81FE9397-CF0F-438B-87BA-0C1AA4CBD002}" srcOrd="1" destOrd="0" presId="urn:microsoft.com/office/officeart/2005/8/layout/hierarchy5"/>
+    <dgm:cxn modelId="{DEAC65B4-B722-401F-AA2F-F065B3B615F1}" type="presOf" srcId="{32B53F96-582F-49BE-A2E1-81FCE3D8DEDC}" destId="{1CEED02B-3985-45DB-A3AA-5129BDAA9D03}" srcOrd="0" destOrd="0" presId="urn:microsoft.com/office/officeart/2005/8/layout/hierarchy5"/>
+    <dgm:cxn modelId="{F9C3A461-A3A7-43EF-81B6-E29D86184184}" type="presOf" srcId="{3D02AF21-A4C9-475D-983D-652A2500649B}" destId="{FA248D77-6A15-4299-8DE4-3B766CF2728C}" srcOrd="0" destOrd="0" presId="urn:microsoft.com/office/officeart/2005/8/layout/hierarchy5"/>
+    <dgm:cxn modelId="{450810F9-5BCD-429D-AD50-2FD3177BF64B}" type="presOf" srcId="{AAA0BB42-E0CA-4855-A47A-DAD9CD3E6AC7}" destId="{1F97F4B3-4707-447E-92A7-16B79223936D}" srcOrd="1" destOrd="0" presId="urn:microsoft.com/office/officeart/2005/8/layout/hierarchy5"/>
+    <dgm:cxn modelId="{5493DA63-1E41-40E4-B500-3C3D3E237E5F}" type="presOf" srcId="{0907BA1B-8C2C-46B2-8919-9D01FC1B262B}" destId="{51C38623-ECAC-43E7-87A7-872FA8331AB6}" srcOrd="0" destOrd="0" presId="urn:microsoft.com/office/officeart/2005/8/layout/hierarchy5"/>
+    <dgm:cxn modelId="{255D30BC-FC84-48DC-93A2-370D6F2292DE}" type="presOf" srcId="{AA6E28E9-08E4-4159-B4FD-19CE09705769}" destId="{D515642A-D0FF-484D-B2AC-2A387BF0D6BB}" srcOrd="1" destOrd="0" presId="urn:microsoft.com/office/officeart/2005/8/layout/hierarchy5"/>
+    <dgm:cxn modelId="{1212B0FE-83F6-4575-9835-7DC550197E40}" type="presOf" srcId="{74B15A58-032C-46CF-B5FE-463EE477385D}" destId="{28E57BF7-BA7E-4AFE-A671-CFC047D7FCC6}" srcOrd="0" destOrd="0" presId="urn:microsoft.com/office/officeart/2005/8/layout/hierarchy5"/>
+    <dgm:cxn modelId="{C6EC146C-F697-48B2-9F82-2C4B3E09BBA8}" srcId="{730F001D-F4A5-4EB0-8D88-B5C40674D694}" destId="{2609CAE7-1E9B-4EA8-9580-6C6B40609156}" srcOrd="1" destOrd="0" parTransId="{5DF021A5-51AC-4009-942E-DDDC0FEE0D9C}" sibTransId="{AD7D27B4-DF1D-4788-B0A7-B13542262103}"/>
+    <dgm:cxn modelId="{BF5182AA-5CEA-4EA9-88E4-B94574A7DD13}" type="presOf" srcId="{607BEA54-06A3-4744-8D8D-95019B9FFFE8}" destId="{575743D4-45E3-4259-B33C-B53FA5903ACF}" srcOrd="1" destOrd="0" presId="urn:microsoft.com/office/officeart/2005/8/layout/hierarchy5"/>
+    <dgm:cxn modelId="{60B72EA9-E31D-4FB3-9DD3-B3522A0CF57D}" srcId="{1F3ABAE5-FE40-4625-B826-2497EF69ACB0}" destId="{F426891C-863F-4A09-A7E9-FC50DCF1E151}" srcOrd="0" destOrd="0" parTransId="{5170FC55-8CD2-4575-8664-FE1527F70A57}" sibTransId="{F5455AF1-9047-44FB-9955-03E6834F06D5}"/>
+    <dgm:cxn modelId="{BAAA3875-DF6B-4866-9C6C-79E86F96B476}" type="presOf" srcId="{91D44572-66D0-4F1C-B83C-19F5E3B96CD1}" destId="{1831245D-153F-4759-9E75-ED192268B367}" srcOrd="0" destOrd="0" presId="urn:microsoft.com/office/officeart/2005/8/layout/hierarchy5"/>
+    <dgm:cxn modelId="{273F63B2-8DE0-49D4-8497-2C2D234AB41E}" srcId="{1CD9DD62-71D1-4AB4-9004-F666B647DCD2}" destId="{41D672BA-A028-4F21-B333-39B59A298DBB}" srcOrd="3" destOrd="0" parTransId="{0E118067-7F21-4A41-BA06-2435888BEEEC}" sibTransId="{920E3749-EDE6-4714-BDF7-ECD1F33D7B66}"/>
+    <dgm:cxn modelId="{2BE1B7C8-7C78-4DEA-ABF6-3718A117F6A8}" type="presOf" srcId="{730F001D-F4A5-4EB0-8D88-B5C40674D694}" destId="{9723A4E8-C293-44A7-8D1D-72F3C79538E8}" srcOrd="0" destOrd="0" presId="urn:microsoft.com/office/officeart/2005/8/layout/hierarchy5"/>
+    <dgm:cxn modelId="{FFCC0547-4154-43BC-8BFB-A7F45A629EDF}" type="presOf" srcId="{91D44572-66D0-4F1C-B83C-19F5E3B96CD1}" destId="{A46AD2AE-069B-49D6-95A1-82BE1C0C859C}" srcOrd="1" destOrd="0" presId="urn:microsoft.com/office/officeart/2005/8/layout/hierarchy5"/>
+    <dgm:cxn modelId="{B4BCB597-FC7C-41BF-8B88-1C88AB397C01}" type="presOf" srcId="{41D672BA-A028-4F21-B333-39B59A298DBB}" destId="{99923E23-69ED-45E1-BBE4-696F2F170579}" srcOrd="1" destOrd="0" presId="urn:microsoft.com/office/officeart/2005/8/layout/hierarchy5"/>
     <dgm:cxn modelId="{CD6B908D-8CE4-4195-AD65-681787919286}" type="presOf" srcId="{607BEA54-06A3-4744-8D8D-95019B9FFFE8}" destId="{F3C23DF2-4442-4108-A920-CA0358091E48}" srcOrd="0" destOrd="0" presId="urn:microsoft.com/office/officeart/2005/8/layout/hierarchy5"/>
-    <dgm:cxn modelId="{7DE82AA1-31D1-402F-B301-20E761C8C96B}" type="presOf" srcId="{E10EE0F9-B5B9-4DEE-812B-2DBDC2ACA83A}" destId="{DA5E3BEE-FFBB-4462-BCA2-B5CD6BEA797F}" srcOrd="0" destOrd="0" presId="urn:microsoft.com/office/officeart/2005/8/layout/hierarchy5"/>
-    <dgm:cxn modelId="{3EB96AFB-4BBB-4614-85D4-194BA61CFE88}" type="presOf" srcId="{9427EDE2-FA6C-44D5-BE12-8F55AB4D4442}" destId="{4E7BBCD9-5235-4E66-B597-B5B06CAB7928}" srcOrd="1" destOrd="0" presId="urn:microsoft.com/office/officeart/2005/8/layout/hierarchy5"/>
-    <dgm:cxn modelId="{D36D68F5-B3FC-4E02-8EB4-95F0269E16FA}" type="presOf" srcId="{A502BECD-C25C-46DD-998E-BBE3539A2279}" destId="{30D776E8-77C7-481D-8E73-51D329C63D57}" srcOrd="0" destOrd="0" presId="urn:microsoft.com/office/officeart/2005/8/layout/hierarchy5"/>
-    <dgm:cxn modelId="{28EDF33C-1D20-44E1-978E-0653A617C528}" srcId="{E9B644CD-0AD6-4B2F-AE23-8D44A0D9533C}" destId="{74B15A58-032C-46CF-B5FE-463EE477385D}" srcOrd="1" destOrd="0" parTransId="{95F2FF84-D28D-407B-B8FE-2B372DF9BA0B}" sibTransId="{A59CC78B-BFA7-484E-B62E-D7EEC8249C44}"/>
-    <dgm:cxn modelId="{0E798F92-F32A-4650-BBB3-00EFFF4555AA}" type="presOf" srcId="{58F416B4-4AFA-4C6A-9B3B-A1FF9F489D17}" destId="{E307016A-E994-4E84-987B-8E3D6D020213}" srcOrd="0" destOrd="0" presId="urn:microsoft.com/office/officeart/2005/8/layout/hierarchy5"/>
-    <dgm:cxn modelId="{D91341EE-CC30-4A04-AF38-57F0A831EFC9}" srcId="{FD200CDD-3708-42B4-9412-BC6BC10F780F}" destId="{3F961278-F127-4801-B067-9BB9A29EA637}" srcOrd="1" destOrd="0" parTransId="{BC2138B6-2437-495E-8A8E-A6D94EFDEB17}" sibTransId="{96FCE7FB-CEB5-4B47-87DD-A90FD4FE9CB4}"/>
-    <dgm:cxn modelId="{792A95BF-B138-42D8-8B71-8001D679AC7D}" type="presOf" srcId="{5DF021A5-51AC-4009-942E-DDDC0FEE0D9C}" destId="{A9BDF05C-259A-439E-A67A-BADD22FCFC0A}" srcOrd="1" destOrd="0" presId="urn:microsoft.com/office/officeart/2005/8/layout/hierarchy5"/>
-    <dgm:cxn modelId="{84858702-D80E-4B81-AE4F-CAF550B3BF64}" type="presOf" srcId="{1EDF341C-890A-47D0-904A-D3359101FE57}" destId="{30B02AC4-22E2-4BFD-9FB9-3EAED9A765A5}" srcOrd="0" destOrd="0" presId="urn:microsoft.com/office/officeart/2005/8/layout/hierarchy5"/>
+    <dgm:cxn modelId="{67A6341B-80C3-4082-ACA0-0C878EE9DF50}" type="presOf" srcId="{1A1E021E-DEDB-4DC8-914D-3CC33BF64070}" destId="{05EE9D51-936F-4809-8516-A05D1D6DB641}" srcOrd="0" destOrd="0" presId="urn:microsoft.com/office/officeart/2005/8/layout/hierarchy5"/>
+    <dgm:cxn modelId="{6B9CB254-5B49-4F46-922D-8CD0A2020AE2}" type="presOf" srcId="{DC2CBB48-DF3A-4C5E-BDF6-ABC816F5C797}" destId="{0ED429C1-77E8-4FA4-A21E-DF5C246FD072}" srcOrd="0" destOrd="0" presId="urn:microsoft.com/office/officeart/2005/8/layout/hierarchy5"/>
+    <dgm:cxn modelId="{EA9D19E5-F19D-4AD9-8FBD-82930D2BF3DA}" type="presOf" srcId="{F6FB4C32-4A0B-4C24-BA0C-C1D83A64476F}" destId="{D1CFFA0A-5F83-4099-95F2-AC364D7F0D31}" srcOrd="0" destOrd="0" presId="urn:microsoft.com/office/officeart/2005/8/layout/hierarchy5"/>
+    <dgm:cxn modelId="{09353899-B260-444B-9A13-4897C89D04C6}" srcId="{2D4BCDE3-0492-4071-8698-EF997550D916}" destId="{32B53F96-582F-49BE-A2E1-81FCE3D8DEDC}" srcOrd="0" destOrd="0" parTransId="{FFDBC1C7-A7C8-4E99-A5A3-8B54E332C334}" sibTransId="{D6912F17-8FE3-45FB-9E29-3AB56206B9E3}"/>
+    <dgm:cxn modelId="{064DDFCA-79BD-4998-859E-95187A55724A}" type="presOf" srcId="{5170FC55-8CD2-4575-8664-FE1527F70A57}" destId="{AFB25989-E67A-44A6-AFF4-E96E26E3C9DD}" srcOrd="1" destOrd="0" presId="urn:microsoft.com/office/officeart/2005/8/layout/hierarchy5"/>
+    <dgm:cxn modelId="{98BA1A96-BCD3-4011-914C-4B7F19DC3961}" type="presOf" srcId="{3BEFD10E-3FC3-40B4-9F94-725C61E140A6}" destId="{6159F236-2F76-41A9-A23B-BEBDBBBCB53B}" srcOrd="0" destOrd="0" presId="urn:microsoft.com/office/officeart/2005/8/layout/hierarchy5"/>
+    <dgm:cxn modelId="{FF46CC2F-52F3-43C2-B536-9226A94E7954}" type="presOf" srcId="{F7F9063E-316E-4ACB-A092-745B51571572}" destId="{B2B7C2BE-DB6B-4286-9AF2-0464FB7146DD}" srcOrd="1" destOrd="0" presId="urn:microsoft.com/office/officeart/2005/8/layout/hierarchy5"/>
+    <dgm:cxn modelId="{D9E25721-1AFB-46F1-9DEB-8CF969B0F007}" type="presOf" srcId="{0A702134-785B-48E8-A677-613364C9D50E}" destId="{FB4FC79E-E391-4D90-AB94-B0B9BDA3497A}" srcOrd="1" destOrd="0" presId="urn:microsoft.com/office/officeart/2005/8/layout/hierarchy5"/>
+    <dgm:cxn modelId="{940AC9CD-D293-4280-87D7-DB4AA3752FBD}" type="presOf" srcId="{FD200CDD-3708-42B4-9412-BC6BC10F780F}" destId="{B2A9F8A5-DA6A-49A2-AC91-D8136DF75C35}" srcOrd="0" destOrd="0" presId="urn:microsoft.com/office/officeart/2005/8/layout/hierarchy5"/>
+    <dgm:cxn modelId="{1FD4D801-BF94-4F01-9A70-5A157BCF2E84}" type="presOf" srcId="{F6FB4C32-4A0B-4C24-BA0C-C1D83A64476F}" destId="{028BD7EB-482E-4AFC-AA1C-726DCF0DE4C3}" srcOrd="1" destOrd="0" presId="urn:microsoft.com/office/officeart/2005/8/layout/hierarchy5"/>
+    <dgm:cxn modelId="{4A0FBF2D-FDF5-40D5-B4AB-F47C4664B14C}" type="presOf" srcId="{34792C18-4B61-4DEA-BB2F-CD4D5C94BF59}" destId="{BCD01B47-E752-43DC-9204-4662C4A964FE}" srcOrd="0" destOrd="0" presId="urn:microsoft.com/office/officeart/2005/8/layout/hierarchy5"/>
+    <dgm:cxn modelId="{695F59BA-CD9C-491A-9788-9594F6CAA788}" type="presOf" srcId="{C6751658-C61A-4CFD-8EFE-23D6286459AC}" destId="{552AC263-5454-4740-9492-B8399C4724E1}" srcOrd="0" destOrd="0" presId="urn:microsoft.com/office/officeart/2005/8/layout/hierarchy5"/>
+    <dgm:cxn modelId="{540B4114-3592-4FFD-B577-F65160126E8E}" type="presOf" srcId="{A5F1D9FE-94AE-4D9D-8104-127130754F38}" destId="{3CE3DBC4-EE13-42D3-BCE6-C6B2F278F807}" srcOrd="0" destOrd="0" presId="urn:microsoft.com/office/officeart/2005/8/layout/hierarchy5"/>
+    <dgm:cxn modelId="{2F11473F-056C-4DEC-B448-B1D67E65FF6B}" srcId="{A5F1D9FE-94AE-4D9D-8104-127130754F38}" destId="{730F001D-F4A5-4EB0-8D88-B5C40674D694}" srcOrd="1" destOrd="0" parTransId="{21018797-09B0-43BC-990E-D2C4363A13E3}" sibTransId="{B847B0FF-42AF-4282-99C4-FA18AC812828}"/>
+    <dgm:cxn modelId="{E0BA3EDD-0CBA-46DE-A236-8322EAB1AEA0}" srcId="{730F001D-F4A5-4EB0-8D88-B5C40674D694}" destId="{77A54F8E-465A-4740-AB8E-FEB7A432FB77}" srcOrd="0" destOrd="0" parTransId="{9682CD7E-E678-44BD-9EBA-E4B8EFCC0DA8}" sibTransId="{9C54FE50-7582-4C66-8037-1767C1B32DB4}"/>
+    <dgm:cxn modelId="{EFB99E9B-3FFE-406A-8763-9F39445C6D18}" srcId="{7D08F0DB-94FA-4A95-AE75-B80FC8240301}" destId="{F17D0DD2-BF6D-4CBD-A713-53D9A18B0296}" srcOrd="1" destOrd="0" parTransId="{64665E1A-AFF0-43DA-B18D-D3AF74A28B79}" sibTransId="{4450360C-C8D2-40C9-AA8D-B4D09051EAA6}"/>
+    <dgm:cxn modelId="{DF5AFE07-59DE-4B58-92FE-2E78E143978F}" type="presOf" srcId="{64665E1A-AFF0-43DA-B18D-D3AF74A28B79}" destId="{A2854C72-DA8B-49A4-8120-CA3E12969429}" srcOrd="0" destOrd="0" presId="urn:microsoft.com/office/officeart/2005/8/layout/hierarchy5"/>
     <dgm:cxn modelId="{15754237-1BA8-49B8-A427-5453469D10E5}" type="presOf" srcId="{B8BCA234-7558-4285-98DC-27C0A68632A0}" destId="{E1F725A6-2EDB-4001-A75E-CEEE0AAC9B17}" srcOrd="1" destOrd="0" presId="urn:microsoft.com/office/officeart/2005/8/layout/hierarchy5"/>
-    <dgm:cxn modelId="{930F809C-586B-4A8A-9ED4-73BAF1C26049}" type="presOf" srcId="{6B6BB9DE-F38D-4E54-9E28-CC69F328C37F}" destId="{1B604072-CA25-4129-8EB6-D106EE75C333}" srcOrd="0" destOrd="0" presId="urn:microsoft.com/office/officeart/2005/8/layout/hierarchy5"/>
-    <dgm:cxn modelId="{6DB4259C-4BDE-421E-AEE0-7FD81CAAA083}" type="presOf" srcId="{2609CAE7-1E9B-4EA8-9580-6C6B40609156}" destId="{F49D0E06-532E-4A38-B17D-AA9F46ABFD20}" srcOrd="0" destOrd="0" presId="urn:microsoft.com/office/officeart/2005/8/layout/hierarchy5"/>
-    <dgm:cxn modelId="{FBF608B6-2682-4FE6-816B-52FA28965180}" type="presOf" srcId="{2156149C-D277-4817-9274-0223F9EC0341}" destId="{7C43E7D1-713D-4DB7-B285-53D222D0F7E4}" srcOrd="0" destOrd="0" presId="urn:microsoft.com/office/officeart/2005/8/layout/hierarchy5"/>
-    <dgm:cxn modelId="{6C653AA0-FEDC-4902-B0EC-648BAC65DEAD}" type="presOf" srcId="{64665E1A-AFF0-43DA-B18D-D3AF74A28B79}" destId="{8BFF3A73-F0C1-4E71-86E0-B4A468729C59}" srcOrd="1" destOrd="0" presId="urn:microsoft.com/office/officeart/2005/8/layout/hierarchy5"/>
-    <dgm:cxn modelId="{DE91E85F-7EEB-4BA5-B5AA-429570AECD6C}" type="presOf" srcId="{95F2FF84-D28D-407B-B8FE-2B372DF9BA0B}" destId="{EA81110D-DF21-4D75-B998-280031555119}" srcOrd="0" destOrd="0" presId="urn:microsoft.com/office/officeart/2005/8/layout/hierarchy5"/>
-    <dgm:cxn modelId="{09353899-B260-444B-9A13-4897C89D04C6}" srcId="{2D4BCDE3-0492-4071-8698-EF997550D916}" destId="{32B53F96-582F-49BE-A2E1-81FCE3D8DEDC}" srcOrd="0" destOrd="0" parTransId="{FFDBC1C7-A7C8-4E99-A5A3-8B54E332C334}" sibTransId="{D6912F17-8FE3-45FB-9E29-3AB56206B9E3}"/>
-    <dgm:cxn modelId="{47FC4AFB-4EB1-41CF-9F90-14B6397AD838}" type="presOf" srcId="{7834B861-A087-47BB-BBBC-65BA175C7835}" destId="{4B13F10F-BC66-4B11-8803-C4AD232DED7F}" srcOrd="1" destOrd="0" presId="urn:microsoft.com/office/officeart/2005/8/layout/hierarchy5"/>
-    <dgm:cxn modelId="{E97CAE79-671C-4170-BA0F-C59D13CF649F}" type="presOf" srcId="{BC2138B6-2437-495E-8A8E-A6D94EFDEB17}" destId="{CD4E2D1D-2803-4866-8244-D42D0E2B7384}" srcOrd="1" destOrd="0" presId="urn:microsoft.com/office/officeart/2005/8/layout/hierarchy5"/>
-    <dgm:cxn modelId="{BAAA3875-DF6B-4866-9C6C-79E86F96B476}" type="presOf" srcId="{91D44572-66D0-4F1C-B83C-19F5E3B96CD1}" destId="{1831245D-153F-4759-9E75-ED192268B367}" srcOrd="0" destOrd="0" presId="urn:microsoft.com/office/officeart/2005/8/layout/hierarchy5"/>
     <dgm:cxn modelId="{95E03E6B-F1E8-4EC0-9CE0-9F08C25B446D}" type="presOf" srcId="{7D08F0DB-94FA-4A95-AE75-B80FC8240301}" destId="{229CD80C-330D-4DAC-A3C1-59B6C682DAE6}" srcOrd="0" destOrd="0" presId="urn:microsoft.com/office/officeart/2005/8/layout/hierarchy5"/>
     <dgm:cxn modelId="{637F21F0-6824-432B-BD76-169505A0F0E9}" type="presOf" srcId="{07FAF939-5C4F-416F-85AB-52C73C46EA08}" destId="{73814760-7A80-4BEE-8DB6-6EC494F8B42A}" srcOrd="0" destOrd="0" presId="urn:microsoft.com/office/officeart/2005/8/layout/hierarchy5"/>
-    <dgm:cxn modelId="{C6EC146C-F697-48B2-9F82-2C4B3E09BBA8}" srcId="{730F001D-F4A5-4EB0-8D88-B5C40674D694}" destId="{2609CAE7-1E9B-4EA8-9580-6C6B40609156}" srcOrd="1" destOrd="0" parTransId="{5DF021A5-51AC-4009-942E-DDDC0FEE0D9C}" sibTransId="{AD7D27B4-DF1D-4788-B0A7-B13542262103}"/>
-    <dgm:cxn modelId="{6EC0E6BF-3CC9-44AA-B34C-062767EE3379}" srcId="{2D4BCDE3-0492-4071-8698-EF997550D916}" destId="{1834AC4E-85AB-49FF-B573-A4707299E0E7}" srcOrd="1" destOrd="0" parTransId="{D743D934-A151-4033-85EE-03A8AD73236D}" sibTransId="{52C0C978-BDE3-4465-9909-1AA5689BA8BD}"/>
-    <dgm:cxn modelId="{215755E8-5202-42D8-BBD5-BF8CF4CFBD0C}" type="presOf" srcId="{3703CCF6-A05B-4A59-8A37-C9334B8CE4EA}" destId="{2CB77F7F-41D2-414F-BFAD-9CE9D858E357}" srcOrd="0" destOrd="0" presId="urn:microsoft.com/office/officeart/2005/8/layout/hierarchy5"/>
-    <dgm:cxn modelId="{0D4A46F9-FA03-4043-AD14-81CC3DCABFE4}" type="presOf" srcId="{AA6E28E9-08E4-4159-B4FD-19CE09705769}" destId="{96F733B4-71CF-4F60-B4BF-457F41FD9E8A}" srcOrd="0" destOrd="0" presId="urn:microsoft.com/office/officeart/2005/8/layout/hierarchy5"/>
-    <dgm:cxn modelId="{2BE1B7C8-7C78-4DEA-ABF6-3718A117F6A8}" type="presOf" srcId="{730F001D-F4A5-4EB0-8D88-B5C40674D694}" destId="{9723A4E8-C293-44A7-8D1D-72F3C79538E8}" srcOrd="0" destOrd="0" presId="urn:microsoft.com/office/officeart/2005/8/layout/hierarchy5"/>
-    <dgm:cxn modelId="{CCCAE1F5-AE8E-4690-8D31-2D20F9A2B3D6}" type="presOf" srcId="{F9140787-06FE-4EBE-A4EB-0CB65F2D6A1B}" destId="{D083E61F-555D-4A96-8A77-3691E3DAB520}" srcOrd="0" destOrd="0" presId="urn:microsoft.com/office/officeart/2005/8/layout/hierarchy5"/>
-    <dgm:cxn modelId="{B59D9290-D5DE-464F-8081-6F55631C7E13}" type="presOf" srcId="{B5DEF538-F16F-487A-9CF1-DF79331A26C1}" destId="{BC4C10C4-2D8D-4F72-A93B-E53674A7FAA1}" srcOrd="1" destOrd="0" presId="urn:microsoft.com/office/officeart/2005/8/layout/hierarchy5"/>
-    <dgm:cxn modelId="{DE44CE27-CC1D-4802-A31C-349D1C5986DC}" srcId="{3AA4DD33-29A4-49A2-B812-06861A367F30}" destId="{C6751658-C61A-4CFD-8EFE-23D6286459AC}" srcOrd="1" destOrd="0" parTransId="{9427EDE2-FA6C-44D5-BE12-8F55AB4D4442}" sibTransId="{2DFD55CC-C3A5-4A5A-AC56-0663C310FBCC}"/>
-    <dgm:cxn modelId="{30FA8037-3E40-469C-94EB-E1062C27ECEE}" type="presOf" srcId="{CE6C6459-7675-4D52-9520-93731C259E25}" destId="{60DED693-263F-4E40-9025-DEEE2B4072C5}" srcOrd="0" destOrd="0" presId="urn:microsoft.com/office/officeart/2005/8/layout/hierarchy5"/>
-    <dgm:cxn modelId="{7F542CD7-FAA7-4710-930E-C58BF7601898}" type="presOf" srcId="{2D4BCDE3-0492-4071-8698-EF997550D916}" destId="{C08AD4DC-4EEE-4327-8D4E-4150C94BBD0E}" srcOrd="0" destOrd="0" presId="urn:microsoft.com/office/officeart/2005/8/layout/hierarchy5"/>
-    <dgm:cxn modelId="{064DDFCA-79BD-4998-859E-95187A55724A}" type="presOf" srcId="{5170FC55-8CD2-4575-8664-FE1527F70A57}" destId="{AFB25989-E67A-44A6-AFF4-E96E26E3C9DD}" srcOrd="1" destOrd="0" presId="urn:microsoft.com/office/officeart/2005/8/layout/hierarchy5"/>
-    <dgm:cxn modelId="{FFC0D9B8-0BD0-4CE7-8B7A-60560E3E4532}" type="presOf" srcId="{545E3727-7DFE-429D-814A-6CF01E080B31}" destId="{8FC05931-54A7-429E-A4A9-9A249A4A90D3}" srcOrd="0" destOrd="0" presId="urn:microsoft.com/office/officeart/2005/8/layout/hierarchy5"/>
-    <dgm:cxn modelId="{9FA1F8C5-957C-417F-A7C0-EF0B4C98E228}" srcId="{F426891C-863F-4A09-A7E9-FC50DCF1E151}" destId="{545E3727-7DFE-429D-814A-6CF01E080B31}" srcOrd="1" destOrd="0" parTransId="{34792C18-4B61-4DEA-BB2F-CD4D5C94BF59}" sibTransId="{3A5CE702-E999-4278-A7C8-FDCB1CF46B46}"/>
-    <dgm:cxn modelId="{450810F9-5BCD-429D-AD50-2FD3177BF64B}" type="presOf" srcId="{AAA0BB42-E0CA-4855-A47A-DAD9CD3E6AC7}" destId="{1F97F4B3-4707-447E-92A7-16B79223936D}" srcOrd="1" destOrd="0" presId="urn:microsoft.com/office/officeart/2005/8/layout/hierarchy5"/>
-    <dgm:cxn modelId="{DEAC65B4-B722-401F-AA2F-F065B3B615F1}" type="presOf" srcId="{32B53F96-582F-49BE-A2E1-81FCE3D8DEDC}" destId="{1CEED02B-3985-45DB-A3AA-5129BDAA9D03}" srcOrd="0" destOrd="0" presId="urn:microsoft.com/office/officeart/2005/8/layout/hierarchy5"/>
-    <dgm:cxn modelId="{66536165-5850-4A79-9D8B-BD52C0833C19}" type="presOf" srcId="{9427EDE2-FA6C-44D5-BE12-8F55AB4D4442}" destId="{01122377-BF51-432C-B5BD-D9659081A77A}" srcOrd="0" destOrd="0" presId="urn:microsoft.com/office/officeart/2005/8/layout/hierarchy5"/>
-    <dgm:cxn modelId="{D06C2223-3F80-45A6-8D1C-30B3BF7E7E80}" type="presOf" srcId="{9682CD7E-E678-44BD-9EBA-E4B8EFCC0DA8}" destId="{4B600412-712E-4383-997C-706DB44D18A6}" srcOrd="0" destOrd="0" presId="urn:microsoft.com/office/officeart/2005/8/layout/hierarchy5"/>
-    <dgm:cxn modelId="{BD8C6555-5FD0-4F9B-BD83-C672BC20DF75}" type="presOf" srcId="{3703CCF6-A05B-4A59-8A37-C9334B8CE4EA}" destId="{B8C2E5A0-CC61-472F-B45F-8E1C02483554}" srcOrd="1" destOrd="0" presId="urn:microsoft.com/office/officeart/2005/8/layout/hierarchy5"/>
-    <dgm:cxn modelId="{1F4492B5-C972-4B59-9320-0637734B6297}" type="presOf" srcId="{1CD9DD62-71D1-4AB4-9004-F666B647DCD2}" destId="{94863F81-6F51-415B-BE40-8777D7E91B03}" srcOrd="0" destOrd="0" presId="urn:microsoft.com/office/officeart/2005/8/layout/hierarchy5"/>
+    <dgm:cxn modelId="{A30E9E64-78F8-4802-BAB2-857D6265BFB7}" type="presOf" srcId="{0907BA1B-8C2C-46B2-8919-9D01FC1B262B}" destId="{520C6796-1E1A-460F-A9A0-68737CF1A106}" srcOrd="1" destOrd="0" presId="urn:microsoft.com/office/officeart/2005/8/layout/hierarchy5"/>
     <dgm:cxn modelId="{79A95EFD-E348-4F8D-91CE-48A3EC8924EB}" srcId="{7D08F0DB-94FA-4A95-AE75-B80FC8240301}" destId="{1F3ABAE5-FE40-4625-B826-2497EF69ACB0}" srcOrd="0" destOrd="0" parTransId="{607BEA54-06A3-4744-8D8D-95019B9FFFE8}" sibTransId="{DB4BC700-CFDF-4BC9-B327-37F470167C5B}"/>
     <dgm:cxn modelId="{F7C0BFAD-6588-4C79-82BB-21B8C70D362C}" srcId="{E9B644CD-0AD6-4B2F-AE23-8D44A0D9533C}" destId="{A502BECD-C25C-46DD-998E-BBE3539A2279}" srcOrd="0" destOrd="0" parTransId="{81B61790-51E0-4BE6-82A9-4D5328232DF4}" sibTransId="{CFB6DABA-84D7-4B30-AE33-C378927045CF}"/>
+    <dgm:cxn modelId="{FFC0D9B8-0BD0-4CE7-8B7A-60560E3E4532}" type="presOf" srcId="{545E3727-7DFE-429D-814A-6CF01E080B31}" destId="{8FC05931-54A7-429E-A4A9-9A249A4A90D3}" srcOrd="0" destOrd="0" presId="urn:microsoft.com/office/officeart/2005/8/layout/hierarchy5"/>
+    <dgm:cxn modelId="{2F75B1A4-37C5-4D51-90FC-C66D6CC68621}" type="presOf" srcId="{44771617-08EA-4EA7-B21B-5B248CEE262C}" destId="{B13B3C32-1189-418C-BC67-FD16797FA497}" srcOrd="0" destOrd="0" presId="urn:microsoft.com/office/officeart/2005/8/layout/hierarchy5"/>
+    <dgm:cxn modelId="{07ADD566-1F38-428C-BCE3-7D4411D6BC15}" type="presOf" srcId="{77A54F8E-465A-4740-AB8E-FEB7A432FB77}" destId="{C53D64E5-754C-4B3E-96B6-051D1710BB21}" srcOrd="0" destOrd="0" presId="urn:microsoft.com/office/officeart/2005/8/layout/hierarchy5"/>
+    <dgm:cxn modelId="{4BAD174D-D0EF-4AAD-9E82-483D00688906}" type="presOf" srcId="{5F8BA5B6-A0FC-4E95-AA0E-7A970892ADC8}" destId="{0A2EE00C-43D2-4C8E-95E3-84F11AA1CC90}" srcOrd="0" destOrd="0" presId="urn:microsoft.com/office/officeart/2005/8/layout/hierarchy5"/>
+    <dgm:cxn modelId="{4338A8F5-1855-4967-9959-958B7C519A88}" type="presOf" srcId="{5170FC55-8CD2-4575-8664-FE1527F70A57}" destId="{C85981BA-B3EC-4E1E-B5CC-4C957248A8F4}" srcOrd="0" destOrd="0" presId="urn:microsoft.com/office/officeart/2005/8/layout/hierarchy5"/>
+    <dgm:cxn modelId="{11DBCF88-A519-4C74-9EC2-4468386930C7}" srcId="{F426891C-863F-4A09-A7E9-FC50DCF1E151}" destId="{58F416B4-4AFA-4C6A-9B3B-A1FF9F489D17}" srcOrd="0" destOrd="0" parTransId="{B5DEF538-F16F-487A-9CF1-DF79331A26C1}" sibTransId="{579C376D-2ED9-4F11-9ECA-2B7BACA5A705}"/>
+    <dgm:cxn modelId="{CCCAE1F5-AE8E-4690-8D31-2D20F9A2B3D6}" type="presOf" srcId="{F9140787-06FE-4EBE-A4EB-0CB65F2D6A1B}" destId="{D083E61F-555D-4A96-8A77-3691E3DAB520}" srcOrd="0" destOrd="0" presId="urn:microsoft.com/office/officeart/2005/8/layout/hierarchy5"/>
+    <dgm:cxn modelId="{8F8F50EE-2A52-439F-939B-6A06C2C03A59}" type="presOf" srcId="{21018797-09B0-43BC-990E-D2C4363A13E3}" destId="{6BE3305E-F05E-4807-B948-D6048E81DFB0}" srcOrd="1" destOrd="0" presId="urn:microsoft.com/office/officeart/2005/8/layout/hierarchy5"/>
+    <dgm:cxn modelId="{4A2F8508-D217-4F8C-9727-48CE45D3D3FA}" type="presOf" srcId="{3BEFD10E-3FC3-40B4-9F94-725C61E140A6}" destId="{5B3DBCAE-487B-45C9-B557-F679B80AC45A}" srcOrd="1" destOrd="0" presId="urn:microsoft.com/office/officeart/2005/8/layout/hierarchy5"/>
     <dgm:cxn modelId="{A4C581A1-919E-447B-9CBF-BAF2C105583C}" srcId="{A5F1D9FE-94AE-4D9D-8104-127130754F38}" destId="{DA6FA8C2-A357-4386-BF3C-EC6C7ED88816}" srcOrd="0" destOrd="0" parTransId="{AA6E28E9-08E4-4159-B4FD-19CE09705769}" sibTransId="{FBACBC3E-1C80-4F18-8487-9AA0FC70B6DA}"/>
-    <dgm:cxn modelId="{98BA1A96-BCD3-4011-914C-4B7F19DC3961}" type="presOf" srcId="{3BEFD10E-3FC3-40B4-9F94-725C61E140A6}" destId="{6159F236-2F76-41A9-A23B-BEBDBBBCB53B}" srcOrd="0" destOrd="0" presId="urn:microsoft.com/office/officeart/2005/8/layout/hierarchy5"/>
-    <dgm:cxn modelId="{87EAFED4-B84D-4A33-9C94-405EE12D71AA}" type="presOf" srcId="{7834B861-A087-47BB-BBBC-65BA175C7835}" destId="{1838C9BB-060F-4B9F-8DD7-45F28FC4E293}" srcOrd="0" destOrd="0" presId="urn:microsoft.com/office/officeart/2005/8/layout/hierarchy5"/>
-    <dgm:cxn modelId="{CDD9A9E3-F3D3-45DF-81F0-D1F8D698D49E}" srcId="{0D687C51-502C-48CF-8DFA-4574BB7E0BDC}" destId="{CE6C6459-7675-4D52-9520-93731C259E25}" srcOrd="0" destOrd="0" parTransId="{0A702134-785B-48E8-A677-613364C9D50E}" sibTransId="{911388C6-FDA5-42ED-9958-30BA17734BE3}"/>
-    <dgm:cxn modelId="{EA9D19E5-F19D-4AD9-8FBD-82930D2BF3DA}" type="presOf" srcId="{F6FB4C32-4A0B-4C24-BA0C-C1D83A64476F}" destId="{D1CFFA0A-5F83-4099-95F2-AC364D7F0D31}" srcOrd="0" destOrd="0" presId="urn:microsoft.com/office/officeart/2005/8/layout/hierarchy5"/>
+    <dgm:cxn modelId="{E97CAE79-671C-4170-BA0F-C59D13CF649F}" type="presOf" srcId="{BC2138B6-2437-495E-8A8E-A6D94EFDEB17}" destId="{CD4E2D1D-2803-4866-8244-D42D0E2B7384}" srcOrd="1" destOrd="0" presId="urn:microsoft.com/office/officeart/2005/8/layout/hierarchy5"/>
+    <dgm:cxn modelId="{B8E9F457-6037-427A-921C-CC0FBA18B822}" srcId="{1CD9DD62-71D1-4AB4-9004-F666B647DCD2}" destId="{DC2CBB48-DF3A-4C5E-BDF6-ABC816F5C797}" srcOrd="1" destOrd="0" parTransId="{669E2E36-BE92-4756-9E24-4489A1124CD0}" sibTransId="{59E3A54D-0285-43FC-AAC0-E6ECC30617B1}"/>
+    <dgm:cxn modelId="{D91341EE-CC30-4A04-AF38-57F0A831EFC9}" srcId="{FD200CDD-3708-42B4-9412-BC6BC10F780F}" destId="{3F961278-F127-4801-B067-9BB9A29EA637}" srcOrd="1" destOrd="0" parTransId="{BC2138B6-2437-495E-8A8E-A6D94EFDEB17}" sibTransId="{96FCE7FB-CEB5-4B47-87DD-A90FD4FE9CB4}"/>
+    <dgm:cxn modelId="{FEC7ADC7-D455-4A20-AE16-D16FA59241D9}" type="presOf" srcId="{BC2138B6-2437-495E-8A8E-A6D94EFDEB17}" destId="{B22F18DC-87CE-4AED-B450-0239C096CB00}" srcOrd="0" destOrd="0" presId="urn:microsoft.com/office/officeart/2005/8/layout/hierarchy5"/>
+    <dgm:cxn modelId="{3EB96AFB-4BBB-4614-85D4-194BA61CFE88}" type="presOf" srcId="{9427EDE2-FA6C-44D5-BE12-8F55AB4D4442}" destId="{4E7BBCD9-5235-4E66-B597-B5B06CAB7928}" srcOrd="1" destOrd="0" presId="urn:microsoft.com/office/officeart/2005/8/layout/hierarchy5"/>
+    <dgm:cxn modelId="{67AAC91D-372E-41B6-AE78-199F7972761C}" type="presOf" srcId="{AAA0BB42-E0CA-4855-A47A-DAD9CD3E6AC7}" destId="{9C27FF12-1874-4BFC-8976-392ECF8E121C}" srcOrd="0" destOrd="0" presId="urn:microsoft.com/office/officeart/2005/8/layout/hierarchy5"/>
+    <dgm:cxn modelId="{D36D68F5-B3FC-4E02-8EB4-95F0269E16FA}" type="presOf" srcId="{A502BECD-C25C-46DD-998E-BBE3539A2279}" destId="{30D776E8-77C7-481D-8E73-51D329C63D57}" srcOrd="0" destOrd="0" presId="urn:microsoft.com/office/officeart/2005/8/layout/hierarchy5"/>
+    <dgm:cxn modelId="{BDED1751-42B5-4CF1-ADFC-5905D151A9A6}" type="presOf" srcId="{3F961278-F127-4801-B067-9BB9A29EA637}" destId="{FE7F2866-325D-4B3E-967D-67B7E3E88C14}" srcOrd="0" destOrd="0" presId="urn:microsoft.com/office/officeart/2005/8/layout/hierarchy5"/>
+    <dgm:cxn modelId="{4B380693-B4AF-48B7-8D30-CC5243ADC152}" type="presOf" srcId="{B8BCA234-7558-4285-98DC-27C0A68632A0}" destId="{D3D1D14B-DC9D-4496-8982-375857092585}" srcOrd="0" destOrd="0" presId="urn:microsoft.com/office/officeart/2005/8/layout/hierarchy5"/>
+    <dgm:cxn modelId="{9D63E75B-AE28-4D1C-9E4F-B5A08E18E946}" type="presOf" srcId="{0A702134-785B-48E8-A677-613364C9D50E}" destId="{80B81E04-174D-45C2-86AF-F63D1F112A73}" srcOrd="0" destOrd="0" presId="urn:microsoft.com/office/officeart/2005/8/layout/hierarchy5"/>
+    <dgm:cxn modelId="{44AFB108-F6F3-45BC-8F5E-E6BAF1CFF73B}" srcId="{1A1E021E-DEDB-4DC8-914D-3CC33BF64070}" destId="{2DB01136-9D02-44C3-8D30-151451BED77A}" srcOrd="0" destOrd="0" parTransId="{0907BA1B-8C2C-46B2-8919-9D01FC1B262B}" sibTransId="{528F1096-9DDD-4775-A3CF-FA1E95D167DA}"/>
+    <dgm:cxn modelId="{4010B087-8DBC-4776-A6B7-87202ED533DE}" type="presOf" srcId="{1F3ABAE5-FE40-4625-B826-2497EF69ACB0}" destId="{DDB88BFF-D45A-4708-B1D6-9985179F7DBD}" srcOrd="0" destOrd="0" presId="urn:microsoft.com/office/officeart/2005/8/layout/hierarchy5"/>
+    <dgm:cxn modelId="{9C1C473F-A36C-4689-B685-857169970B9A}" type="presOf" srcId="{B5DEF538-F16F-487A-9CF1-DF79331A26C1}" destId="{F5C90689-0D93-4983-824F-43F8C0C1014C}" srcOrd="0" destOrd="0" presId="urn:microsoft.com/office/officeart/2005/8/layout/hierarchy5"/>
+    <dgm:cxn modelId="{BA02EFC0-5B96-4A6A-9645-8BADAB7DCE09}" type="presOf" srcId="{2DB01136-9D02-44C3-8D30-151451BED77A}" destId="{F3538FEE-6D80-44FB-A6F9-4CD03EA1E756}" srcOrd="0" destOrd="0" presId="urn:microsoft.com/office/officeart/2005/8/layout/hierarchy5"/>
+    <dgm:cxn modelId="{6C653AA0-FEDC-4902-B0EC-648BAC65DEAD}" type="presOf" srcId="{64665E1A-AFF0-43DA-B18D-D3AF74A28B79}" destId="{8BFF3A73-F0C1-4E71-86E0-B4A468729C59}" srcOrd="1" destOrd="0" presId="urn:microsoft.com/office/officeart/2005/8/layout/hierarchy5"/>
+    <dgm:cxn modelId="{BD8C6555-5FD0-4F9B-BD83-C672BC20DF75}" type="presOf" srcId="{3703CCF6-A05B-4A59-8A37-C9334B8CE4EA}" destId="{B8C2E5A0-CC61-472F-B45F-8E1C02483554}" srcOrd="1" destOrd="0" presId="urn:microsoft.com/office/officeart/2005/8/layout/hierarchy5"/>
+    <dgm:cxn modelId="{923ABBAA-84C7-49E6-BDB4-01C61BC91387}" type="presOf" srcId="{1834AC4E-85AB-49FF-B573-A4707299E0E7}" destId="{99C06FA2-59E4-4652-9628-1AE4948833D7}" srcOrd="0" destOrd="0" presId="urn:microsoft.com/office/officeart/2005/8/layout/hierarchy5"/>
+    <dgm:cxn modelId="{0D4A46F9-FA03-4043-AD14-81CC3DCABFE4}" type="presOf" srcId="{AA6E28E9-08E4-4159-B4FD-19CE09705769}" destId="{96F733B4-71CF-4F60-B4BF-457F41FD9E8A}" srcOrd="0" destOrd="0" presId="urn:microsoft.com/office/officeart/2005/8/layout/hierarchy5"/>
+    <dgm:cxn modelId="{930F809C-586B-4A8A-9ED4-73BAF1C26049}" type="presOf" srcId="{6B6BB9DE-F38D-4E54-9E28-CC69F328C37F}" destId="{1B604072-CA25-4129-8EB6-D106EE75C333}" srcOrd="0" destOrd="0" presId="urn:microsoft.com/office/officeart/2005/8/layout/hierarchy5"/>
+    <dgm:cxn modelId="{7F542CD7-FAA7-4710-930E-C58BF7601898}" type="presOf" srcId="{2D4BCDE3-0492-4071-8698-EF997550D916}" destId="{C08AD4DC-4EEE-4327-8D4E-4150C94BBD0E}" srcOrd="0" destOrd="0" presId="urn:microsoft.com/office/officeart/2005/8/layout/hierarchy5"/>
+    <dgm:cxn modelId="{976FB3F1-6C80-43D3-AADB-D879499CA429}" srcId="{F17D0DD2-BF6D-4CBD-A713-53D9A18B0296}" destId="{1A1E021E-DEDB-4DC8-914D-3CC33BF64070}" srcOrd="0" destOrd="0" parTransId="{5F8BA5B6-A0FC-4E95-AA0E-7A970892ADC8}" sibTransId="{326E1A0A-BBCE-42D0-9FFC-1E0BB4074673}"/>
     <dgm:cxn modelId="{15DAB7B0-2396-4BAE-B003-C5F7B9B2FBE7}" type="presOf" srcId="{81B61790-51E0-4BE6-82A9-4D5328232DF4}" destId="{458D0804-25FD-4A67-88D8-B0E9E8A08FED}" srcOrd="1" destOrd="0" presId="urn:microsoft.com/office/officeart/2005/8/layout/hierarchy5"/>
-    <dgm:cxn modelId="{C4E80C13-1F0E-4C0E-B9F7-77AB9D420873}" type="presOf" srcId="{5DF021A5-51AC-4009-942E-DDDC0FEE0D9C}" destId="{17839822-E48C-4AB1-8DFC-FB7798F4D700}" srcOrd="0" destOrd="0" presId="urn:microsoft.com/office/officeart/2005/8/layout/hierarchy5"/>
-    <dgm:cxn modelId="{19528FD5-9E97-4FCB-A66A-C7D3219B9017}" type="presOf" srcId="{D743D934-A151-4033-85EE-03A8AD73236D}" destId="{86B6B845-5675-4A08-81FA-73B842A94138}" srcOrd="0" destOrd="0" presId="urn:microsoft.com/office/officeart/2005/8/layout/hierarchy5"/>
-    <dgm:cxn modelId="{BA02EFC0-5B96-4A6A-9645-8BADAB7DCE09}" type="presOf" srcId="{2DB01136-9D02-44C3-8D30-151451BED77A}" destId="{F3538FEE-6D80-44FB-A6F9-4CD03EA1E756}" srcOrd="0" destOrd="0" presId="urn:microsoft.com/office/officeart/2005/8/layout/hierarchy5"/>
-    <dgm:cxn modelId="{255D30BC-FC84-48DC-93A2-370D6F2292DE}" type="presOf" srcId="{AA6E28E9-08E4-4159-B4FD-19CE09705769}" destId="{D515642A-D0FF-484D-B2AC-2A387BF0D6BB}" srcOrd="1" destOrd="0" presId="urn:microsoft.com/office/officeart/2005/8/layout/hierarchy5"/>
-    <dgm:cxn modelId="{8F8F50EE-2A52-439F-939B-6A06C2C03A59}" type="presOf" srcId="{21018797-09B0-43BC-990E-D2C4363A13E3}" destId="{6BE3305E-F05E-4807-B948-D6048E81DFB0}" srcOrd="1" destOrd="0" presId="urn:microsoft.com/office/officeart/2005/8/layout/hierarchy5"/>
-    <dgm:cxn modelId="{326EB761-3B8F-4946-A6C7-F7683FB48441}" type="presOf" srcId="{5F8BA5B6-A0FC-4E95-AA0E-7A970892ADC8}" destId="{7B822223-4FD0-4D13-9316-97E121718287}" srcOrd="1" destOrd="0" presId="urn:microsoft.com/office/officeart/2005/8/layout/hierarchy5"/>
-    <dgm:cxn modelId="{540B4114-3592-4FFD-B577-F65160126E8E}" type="presOf" srcId="{A5F1D9FE-94AE-4D9D-8104-127130754F38}" destId="{3CE3DBC4-EE13-42D3-BCE6-C6B2F278F807}" srcOrd="0" destOrd="0" presId="urn:microsoft.com/office/officeart/2005/8/layout/hierarchy5"/>
-    <dgm:cxn modelId="{3A1D86C2-7C2C-410C-8FA1-CA743D4ECEB6}" type="presOf" srcId="{07A62DD5-DEA2-483C-A892-96C00C737FBA}" destId="{6AC56556-8368-4903-BC0E-4F6CBBCF053A}" srcOrd="0" destOrd="0" presId="urn:microsoft.com/office/officeart/2005/8/layout/hierarchy5"/>
-    <dgm:cxn modelId="{E4A32504-9155-4364-878C-B7BAD783F631}" type="presOf" srcId="{3D02AF21-A4C9-475D-983D-652A2500649B}" destId="{C720D4D6-A118-4D38-9C85-955D2FD4D117}" srcOrd="1" destOrd="0" presId="urn:microsoft.com/office/officeart/2005/8/layout/hierarchy5"/>
-    <dgm:cxn modelId="{C18CF4EF-1B13-49A9-988F-3241EE6AA144}" type="presOf" srcId="{E9B644CD-0AD6-4B2F-AE23-8D44A0D9533C}" destId="{9AF4B254-F425-4BA4-89A6-37C9E0B347F8}" srcOrd="0" destOrd="0" presId="urn:microsoft.com/office/officeart/2005/8/layout/hierarchy5"/>
-    <dgm:cxn modelId="{4A0FBF2D-FDF5-40D5-B4AB-F47C4664B14C}" type="presOf" srcId="{34792C18-4B61-4DEA-BB2F-CD4D5C94BF59}" destId="{BCD01B47-E752-43DC-9204-4662C4A964FE}" srcOrd="0" destOrd="0" presId="urn:microsoft.com/office/officeart/2005/8/layout/hierarchy5"/>
-    <dgm:cxn modelId="{42AEAD66-8657-44B3-8846-FF871ABA5A72}" srcId="{FD200CDD-3708-42B4-9412-BC6BC10F780F}" destId="{B6E81698-9A9A-4953-8EB0-57FCFFD6CBBB}" srcOrd="0" destOrd="0" parTransId="{F7F9063E-316E-4ACB-A092-745B51571572}" sibTransId="{605FFBE0-350A-415F-A827-12966FD05AAA}"/>
-    <dgm:cxn modelId="{07ADD566-1F38-428C-BCE3-7D4411D6BC15}" type="presOf" srcId="{77A54F8E-465A-4740-AB8E-FEB7A432FB77}" destId="{C53D64E5-754C-4B3E-96B6-051D1710BB21}" srcOrd="0" destOrd="0" presId="urn:microsoft.com/office/officeart/2005/8/layout/hierarchy5"/>
-    <dgm:cxn modelId="{1212B0FE-83F6-4575-9835-7DC550197E40}" type="presOf" srcId="{74B15A58-032C-46CF-B5FE-463EE477385D}" destId="{28E57BF7-BA7E-4AFE-A671-CFC047D7FCC6}" srcOrd="0" destOrd="0" presId="urn:microsoft.com/office/officeart/2005/8/layout/hierarchy5"/>
-    <dgm:cxn modelId="{D9E25721-1AFB-46F1-9DEB-8CF969B0F007}" type="presOf" srcId="{0A702134-785B-48E8-A677-613364C9D50E}" destId="{FB4FC79E-E391-4D90-AB94-B0B9BDA3497A}" srcOrd="1" destOrd="0" presId="urn:microsoft.com/office/officeart/2005/8/layout/hierarchy5"/>
-    <dgm:cxn modelId="{BF5182AA-5CEA-4EA9-88E4-B94574A7DD13}" type="presOf" srcId="{607BEA54-06A3-4744-8D8D-95019B9FFFE8}" destId="{575743D4-45E3-4259-B33C-B53FA5903ACF}" srcOrd="1" destOrd="0" presId="urn:microsoft.com/office/officeart/2005/8/layout/hierarchy5"/>
-    <dgm:cxn modelId="{67A6341B-80C3-4082-ACA0-0C878EE9DF50}" type="presOf" srcId="{1A1E021E-DEDB-4DC8-914D-3CC33BF64070}" destId="{05EE9D51-936F-4809-8516-A05D1D6DB641}" srcOrd="0" destOrd="0" presId="urn:microsoft.com/office/officeart/2005/8/layout/hierarchy5"/>
-    <dgm:cxn modelId="{499628AD-21B8-496B-B479-5567619496B5}" srcId="{CE6C6459-7675-4D52-9520-93731C259E25}" destId="{A5F1D9FE-94AE-4D9D-8104-127130754F38}" srcOrd="0" destOrd="0" parTransId="{AAA0BB42-E0CA-4855-A47A-DAD9CD3E6AC7}" sibTransId="{68B45EC6-D31D-4F3B-92F8-2C575F12BC24}"/>
-    <dgm:cxn modelId="{37ABACD5-7AA5-4BAD-8A56-93C12008B453}" type="presOf" srcId="{D0B55527-58A5-453A-AAC9-E7454914D72A}" destId="{DAA02A32-98C7-4F72-8293-DB1D1E82BBF2}" srcOrd="0" destOrd="0" presId="urn:microsoft.com/office/officeart/2005/8/layout/hierarchy5"/>
-    <dgm:cxn modelId="{67AAC91D-372E-41B6-AE78-199F7972761C}" type="presOf" srcId="{AAA0BB42-E0CA-4855-A47A-DAD9CD3E6AC7}" destId="{9C27FF12-1874-4BFC-8976-392ECF8E121C}" srcOrd="0" destOrd="0" presId="urn:microsoft.com/office/officeart/2005/8/layout/hierarchy5"/>
-    <dgm:cxn modelId="{3F34EA5F-7BED-4B1F-981E-51DC127E7D27}" type="presOf" srcId="{1EDF341C-890A-47D0-904A-D3359101FE57}" destId="{9B11BAB6-C5CF-4DE2-9660-1777DDC73FBC}" srcOrd="1" destOrd="0" presId="urn:microsoft.com/office/officeart/2005/8/layout/hierarchy5"/>
-    <dgm:cxn modelId="{6290C773-81F5-4171-9C80-E6B5497B44F8}" type="presOf" srcId="{21018797-09B0-43BC-990E-D2C4363A13E3}" destId="{EC4146AA-9375-444B-9B4A-A54C2C08C7E2}" srcOrd="0" destOrd="0" presId="urn:microsoft.com/office/officeart/2005/8/layout/hierarchy5"/>
-    <dgm:cxn modelId="{2C8A3634-FF1A-4310-BC8B-B04BD133DDC0}" srcId="{1CD9DD62-71D1-4AB4-9004-F666B647DCD2}" destId="{0D687C51-502C-48CF-8DFA-4574BB7E0BDC}" srcOrd="0" destOrd="0" parTransId="{7CD96048-F7A9-42F8-86BB-AA5C34D2A0E6}" sibTransId="{48CB004E-CBED-4B23-90C1-9EA127C2BC69}"/>
-    <dgm:cxn modelId="{21F0DC6A-8B30-4E83-8168-A06A2F0B243A}" srcId="{1CD9DD62-71D1-4AB4-9004-F666B647DCD2}" destId="{7834B861-A087-47BB-BBBC-65BA175C7835}" srcOrd="5" destOrd="0" parTransId="{7E251BF3-1E0A-4EB0-92F1-0328E594CAF7}" sibTransId="{81A6E98E-5065-47C8-A92F-D9ADE1390B73}"/>
-    <dgm:cxn modelId="{4B380693-B4AF-48B7-8D30-CC5243ADC152}" type="presOf" srcId="{B8BCA234-7558-4285-98DC-27C0A68632A0}" destId="{D3D1D14B-DC9D-4496-8982-375857092585}" srcOrd="0" destOrd="0" presId="urn:microsoft.com/office/officeart/2005/8/layout/hierarchy5"/>
-    <dgm:cxn modelId="{5FB0775D-F7CA-45D0-87F9-BCCBA4B0EDB8}" type="presOf" srcId="{34792C18-4B61-4DEA-BB2F-CD4D5C94BF59}" destId="{E7CD4DCE-4196-41DD-886C-7F2EEA6B02AF}" srcOrd="1" destOrd="0" presId="urn:microsoft.com/office/officeart/2005/8/layout/hierarchy5"/>
-    <dgm:cxn modelId="{FA90D049-7912-40BC-8079-9DC1311F5CBB}" srcId="{DA6FA8C2-A357-4386-BF3C-EC6C7ED88816}" destId="{07FAF939-5C4F-416F-85AB-52C73C46EA08}" srcOrd="0" destOrd="0" parTransId="{1EDF341C-890A-47D0-904A-D3359101FE57}" sibTransId="{3EE00E86-F56F-44B3-930E-6636AA61935A}"/>
-    <dgm:cxn modelId="{923ABBAA-84C7-49E6-BDB4-01C61BC91387}" type="presOf" srcId="{1834AC4E-85AB-49FF-B573-A4707299E0E7}" destId="{99C06FA2-59E4-4652-9628-1AE4948833D7}" srcOrd="0" destOrd="0" presId="urn:microsoft.com/office/officeart/2005/8/layout/hierarchy5"/>
-    <dgm:cxn modelId="{54995DFB-E48B-4A34-890E-C9EEF671B795}" type="presOf" srcId="{F426891C-863F-4A09-A7E9-FC50DCF1E151}" destId="{F8E7612B-DC34-4E03-96F7-7220E78E762A}" srcOrd="0" destOrd="0" presId="urn:microsoft.com/office/officeart/2005/8/layout/hierarchy5"/>
-    <dgm:cxn modelId="{6B9CB254-5B49-4F46-922D-8CD0A2020AE2}" type="presOf" srcId="{DC2CBB48-DF3A-4C5E-BDF6-ABC816F5C797}" destId="{0ED429C1-77E8-4FA4-A21E-DF5C246FD072}" srcOrd="0" destOrd="0" presId="urn:microsoft.com/office/officeart/2005/8/layout/hierarchy5"/>
-    <dgm:cxn modelId="{FF46CC2F-52F3-43C2-B536-9226A94E7954}" type="presOf" srcId="{F7F9063E-316E-4ACB-A092-745B51571572}" destId="{B2B7C2BE-DB6B-4286-9AF2-0464FB7146DD}" srcOrd="1" destOrd="0" presId="urn:microsoft.com/office/officeart/2005/8/layout/hierarchy5"/>
-    <dgm:cxn modelId="{DF5AFE07-59DE-4B58-92FE-2E78E143978F}" type="presOf" srcId="{64665E1A-AFF0-43DA-B18D-D3AF74A28B79}" destId="{A2854C72-DA8B-49A4-8120-CA3E12969429}" srcOrd="0" destOrd="0" presId="urn:microsoft.com/office/officeart/2005/8/layout/hierarchy5"/>
-    <dgm:cxn modelId="{273F63B2-8DE0-49D4-8497-2C2D234AB41E}" srcId="{1CD9DD62-71D1-4AB4-9004-F666B647DCD2}" destId="{41D672BA-A028-4F21-B333-39B59A298DBB}" srcOrd="3" destOrd="0" parTransId="{0E118067-7F21-4A41-BA06-2435888BEEEC}" sibTransId="{920E3749-EDE6-4714-BDF7-ECD1F33D7B66}"/>
-    <dgm:cxn modelId="{1FD4D801-BF94-4F01-9A70-5A157BCF2E84}" type="presOf" srcId="{F6FB4C32-4A0B-4C24-BA0C-C1D83A64476F}" destId="{028BD7EB-482E-4AFC-AA1C-726DCF0DE4C3}" srcOrd="1" destOrd="0" presId="urn:microsoft.com/office/officeart/2005/8/layout/hierarchy5"/>
-    <dgm:cxn modelId="{BDED1751-42B5-4CF1-ADFC-5905D151A9A6}" type="presOf" srcId="{3F961278-F127-4801-B067-9BB9A29EA637}" destId="{FE7F2866-325D-4B3E-967D-67B7E3E88C14}" srcOrd="0" destOrd="0" presId="urn:microsoft.com/office/officeart/2005/8/layout/hierarchy5"/>
-    <dgm:cxn modelId="{9D63E75B-AE28-4D1C-9E4F-B5A08E18E946}" type="presOf" srcId="{0A702134-785B-48E8-A677-613364C9D50E}" destId="{80B81E04-174D-45C2-86AF-F63D1F112A73}" srcOrd="0" destOrd="0" presId="urn:microsoft.com/office/officeart/2005/8/layout/hierarchy5"/>
-    <dgm:cxn modelId="{60B72EA9-E31D-4FB3-9DD3-B3522A0CF57D}" srcId="{1F3ABAE5-FE40-4625-B826-2497EF69ACB0}" destId="{F426891C-863F-4A09-A7E9-FC50DCF1E151}" srcOrd="0" destOrd="0" parTransId="{5170FC55-8CD2-4575-8664-FE1527F70A57}" sibTransId="{F5455AF1-9047-44FB-9955-03E6834F06D5}"/>
-    <dgm:cxn modelId="{EFB99E9B-3FFE-406A-8763-9F39445C6D18}" srcId="{7D08F0DB-94FA-4A95-AE75-B80FC8240301}" destId="{F17D0DD2-BF6D-4CBD-A713-53D9A18B0296}" srcOrd="1" destOrd="0" parTransId="{64665E1A-AFF0-43DA-B18D-D3AF74A28B79}" sibTransId="{4450360C-C8D2-40C9-AA8D-B4D09051EAA6}"/>
-    <dgm:cxn modelId="{6CC5FA23-222F-4A9C-98DE-9A7AD6638017}" srcId="{0D687C51-502C-48CF-8DFA-4574BB7E0BDC}" destId="{7D08F0DB-94FA-4A95-AE75-B80FC8240301}" srcOrd="1" destOrd="0" parTransId="{B8BCA234-7558-4285-98DC-27C0A68632A0}" sibTransId="{0619CD34-9891-43E8-ACC7-DBF7BDAF7B10}"/>
-    <dgm:cxn modelId="{E0BA3EDD-0CBA-46DE-A236-8322EAB1AEA0}" srcId="{730F001D-F4A5-4EB0-8D88-B5C40674D694}" destId="{77A54F8E-465A-4740-AB8E-FEB7A432FB77}" srcOrd="0" destOrd="0" parTransId="{9682CD7E-E678-44BD-9EBA-E4B8EFCC0DA8}" sibTransId="{9C54FE50-7582-4C66-8037-1767C1B32DB4}"/>
-    <dgm:cxn modelId="{A1FCEC67-EF8A-4B52-BF05-F19F1972E403}" type="presOf" srcId="{0D687C51-502C-48CF-8DFA-4574BB7E0BDC}" destId="{D2D24B57-3EB3-47CA-886C-D78BDDBD6616}" srcOrd="0" destOrd="0" presId="urn:microsoft.com/office/officeart/2005/8/layout/hierarchy5"/>
-    <dgm:cxn modelId="{363CA59A-FF57-4378-ABC0-95E15810D0FC}" srcId="{1CD9DD62-71D1-4AB4-9004-F666B647DCD2}" destId="{3D02AF21-A4C9-475D-983D-652A2500649B}" srcOrd="2" destOrd="0" parTransId="{5C925451-C102-44A7-A6FE-CEF1952E591B}" sibTransId="{C5007346-C7F7-415D-9987-87B2FFA7F1F1}"/>
-    <dgm:cxn modelId="{984FF9E0-07D8-4B3A-B039-266DEF3F4A2C}" type="presOf" srcId="{3AA4DD33-29A4-49A2-B812-06861A367F30}" destId="{F55CDB21-B25A-44E2-AC27-A62E893257EA}" srcOrd="0" destOrd="0" presId="urn:microsoft.com/office/officeart/2005/8/layout/hierarchy5"/>
-    <dgm:cxn modelId="{28FAA116-02F8-4592-93E7-07107B073EF0}" srcId="{1CD9DD62-71D1-4AB4-9004-F666B647DCD2}" destId="{07A62DD5-DEA2-483C-A892-96C00C737FBA}" srcOrd="4" destOrd="0" parTransId="{6352F050-3A6F-4BC9-98C5-57C244C50A4C}" sibTransId="{14616CE9-EFC3-48A8-8C58-2184370289B7}"/>
-    <dgm:cxn modelId="{EC35812E-7C36-4653-868B-AEB05A7F82E0}" type="presOf" srcId="{95F2FF84-D28D-407B-B8FE-2B372DF9BA0B}" destId="{3DDC2BFA-D029-4FC9-9AF9-77E14E16B3E5}" srcOrd="1" destOrd="0" presId="urn:microsoft.com/office/officeart/2005/8/layout/hierarchy5"/>
-    <dgm:cxn modelId="{0CDC7DA6-5BE2-43D4-87F0-C41F5C22C6DD}" srcId="{1A1E021E-DEDB-4DC8-914D-3CC33BF64070}" destId="{908F626F-B516-4EEB-8541-81A1D2E50FE0}" srcOrd="1" destOrd="0" parTransId="{F6FB4C32-4A0B-4C24-BA0C-C1D83A64476F}" sibTransId="{1384C94D-8589-4D35-B651-3CC4E1B00111}"/>
-    <dgm:cxn modelId="{5EC236DF-CD44-4AFE-8618-A0D0D075FC0A}" srcId="{D0B55527-58A5-453A-AAC9-E7454914D72A}" destId="{2D4BCDE3-0492-4071-8698-EF997550D916}" srcOrd="1" destOrd="0" parTransId="{44771617-08EA-4EA7-B21B-5B248CEE262C}" sibTransId="{3D52BD8D-F3EF-481B-B492-BD4D5F5D4726}"/>
-    <dgm:cxn modelId="{4010B087-8DBC-4776-A6B7-87202ED533DE}" type="presOf" srcId="{1F3ABAE5-FE40-4625-B826-2497EF69ACB0}" destId="{DDB88BFF-D45A-4708-B1D6-9985179F7DBD}" srcOrd="0" destOrd="0" presId="urn:microsoft.com/office/officeart/2005/8/layout/hierarchy5"/>
-    <dgm:cxn modelId="{809024B3-535D-4AD3-BCF4-C307AD562A01}" type="presOf" srcId="{F17D0DD2-BF6D-4CBD-A713-53D9A18B0296}" destId="{D92946F3-3C10-44A8-8B33-4422A6016779}" srcOrd="0" destOrd="0" presId="urn:microsoft.com/office/officeart/2005/8/layout/hierarchy5"/>
-    <dgm:cxn modelId="{5493DA63-1E41-40E4-B500-3C3D3E237E5F}" type="presOf" srcId="{0907BA1B-8C2C-46B2-8919-9D01FC1B262B}" destId="{51C38623-ECAC-43E7-87A7-872FA8331AB6}" srcOrd="0" destOrd="0" presId="urn:microsoft.com/office/officeart/2005/8/layout/hierarchy5"/>
-    <dgm:cxn modelId="{CB49E4D0-4EBD-4BE1-99C4-568FAFF875A2}" type="presOf" srcId="{A3DB99DA-5742-4A54-9A93-4DE079D5FBA8}" destId="{CA7DA830-ECD6-4150-BA97-1ED71F584FAC}" srcOrd="1" destOrd="0" presId="urn:microsoft.com/office/officeart/2005/8/layout/hierarchy5"/>
-    <dgm:cxn modelId="{B4BCB597-FC7C-41BF-8B88-1C88AB397C01}" type="presOf" srcId="{41D672BA-A028-4F21-B333-39B59A298DBB}" destId="{99923E23-69ED-45E1-BBE4-696F2F170579}" srcOrd="1" destOrd="0" presId="urn:microsoft.com/office/officeart/2005/8/layout/hierarchy5"/>
-    <dgm:cxn modelId="{7967874C-5385-4E61-82CE-C63185D5A50C}" type="presOf" srcId="{81B61790-51E0-4BE6-82A9-4D5328232DF4}" destId="{9B3B63D5-9C25-4694-A396-678698445052}" srcOrd="0" destOrd="0" presId="urn:microsoft.com/office/officeart/2005/8/layout/hierarchy5"/>
-    <dgm:cxn modelId="{5C0F6086-2E50-4F13-9F5F-B97D1BF4FEDD}" srcId="{DA6FA8C2-A357-4386-BF3C-EC6C7ED88816}" destId="{2156149C-D277-4817-9274-0223F9EC0341}" srcOrd="1" destOrd="0" parTransId="{91D44572-66D0-4F1C-B83C-19F5E3B96CD1}" sibTransId="{06FB15C4-2BB1-44E1-BDAB-C99173B7B556}"/>
-    <dgm:cxn modelId="{E758901D-BF17-49B8-AC86-C5593C2C92D5}" srcId="{F17D0DD2-BF6D-4CBD-A713-53D9A18B0296}" destId="{FD200CDD-3708-42B4-9412-BC6BC10F780F}" srcOrd="1" destOrd="0" parTransId="{6B6BB9DE-F38D-4E54-9E28-CC69F328C37F}" sibTransId="{BB18BA1B-86D6-4A40-A019-E9B2EFA521D1}"/>
-    <dgm:cxn modelId="{28E80D77-EAF1-4824-AB50-0BA7A0174F36}" srcId="{D0B55527-58A5-453A-AAC9-E7454914D72A}" destId="{3AA4DD33-29A4-49A2-B812-06861A367F30}" srcOrd="0" destOrd="0" parTransId="{3BEFD10E-3FC3-40B4-9F94-725C61E140A6}" sibTransId="{54873295-23A7-4CED-9DCB-18E65CD4BA37}"/>
-    <dgm:cxn modelId="{FE6687A7-8731-4B45-AE3F-3E116274DF52}" type="presOf" srcId="{A3DB99DA-5742-4A54-9A93-4DE079D5FBA8}" destId="{491E9DA6-DF96-4E0F-A533-FF77FC9B1ED6}" srcOrd="0" destOrd="0" presId="urn:microsoft.com/office/officeart/2005/8/layout/hierarchy5"/>
-    <dgm:cxn modelId="{695F59BA-CD9C-491A-9788-9594F6CAA788}" type="presOf" srcId="{C6751658-C61A-4CFD-8EFE-23D6286459AC}" destId="{552AC263-5454-4740-9492-B8399C4724E1}" srcOrd="0" destOrd="0" presId="urn:microsoft.com/office/officeart/2005/8/layout/hierarchy5"/>
-    <dgm:cxn modelId="{FFCC0547-4154-43BC-8BFB-A7F45A629EDF}" type="presOf" srcId="{91D44572-66D0-4F1C-B83C-19F5E3B96CD1}" destId="{A46AD2AE-069B-49D6-95A1-82BE1C0C859C}" srcOrd="1" destOrd="0" presId="urn:microsoft.com/office/officeart/2005/8/layout/hierarchy5"/>
-    <dgm:cxn modelId="{570815A3-3C18-4050-8603-C308A7D544DD}" type="presOf" srcId="{DC2CBB48-DF3A-4C5E-BDF6-ABC816F5C797}" destId="{73DD586C-FC46-4E6F-81D5-8ECB45DE8E57}" srcOrd="1" destOrd="0" presId="urn:microsoft.com/office/officeart/2005/8/layout/hierarchy5"/>
-    <dgm:cxn modelId="{54764657-162F-4EF3-BC92-55B34F61D3B8}" type="presOf" srcId="{E10EE0F9-B5B9-4DEE-812B-2DBDC2ACA83A}" destId="{F9452968-5195-4D30-A832-7742F8DB07AE}" srcOrd="1" destOrd="0" presId="urn:microsoft.com/office/officeart/2005/8/layout/hierarchy5"/>
-    <dgm:cxn modelId="{62EC1894-5BB5-4DA7-AD2E-C7BBDFBE08E6}" srcId="{3AA4DD33-29A4-49A2-B812-06861A367F30}" destId="{F9140787-06FE-4EBE-A4EB-0CB65F2D6A1B}" srcOrd="0" destOrd="0" parTransId="{3703CCF6-A05B-4A59-8A37-C9334B8CE4EA}" sibTransId="{43268F99-0228-4D21-BD78-EB6538024EF8}"/>
-    <dgm:cxn modelId="{90318B68-7914-47B4-A766-45A73BD718AA}" srcId="{CE6C6459-7675-4D52-9520-93731C259E25}" destId="{D0B55527-58A5-453A-AAC9-E7454914D72A}" srcOrd="1" destOrd="0" parTransId="{E10EE0F9-B5B9-4DEE-812B-2DBDC2ACA83A}" sibTransId="{28EF489E-8100-4B50-B34B-FEDAB4431C82}"/>
-    <dgm:cxn modelId="{FEC7ADC7-D455-4A20-AE16-D16FA59241D9}" type="presOf" srcId="{BC2138B6-2437-495E-8A8E-A6D94EFDEB17}" destId="{B22F18DC-87CE-4AED-B450-0239C096CB00}" srcOrd="0" destOrd="0" presId="urn:microsoft.com/office/officeart/2005/8/layout/hierarchy5"/>
-    <dgm:cxn modelId="{018FB897-4991-44A0-A22A-BAD65C42FC2E}" type="presOf" srcId="{908F626F-B516-4EEB-8541-81A1D2E50FE0}" destId="{83223A45-16DF-4293-BF3B-1A601CD6136D}" srcOrd="0" destOrd="0" presId="urn:microsoft.com/office/officeart/2005/8/layout/hierarchy5"/>
-    <dgm:cxn modelId="{89C8FEE6-D342-4DA8-8E4A-F6EF2F1AEA4C}" type="presOf" srcId="{44771617-08EA-4EA7-B21B-5B248CEE262C}" destId="{81FE9397-CF0F-438B-87BA-0C1AA4CBD002}" srcOrd="1" destOrd="0" presId="urn:microsoft.com/office/officeart/2005/8/layout/hierarchy5"/>
-    <dgm:cxn modelId="{44AFB108-F6F3-45BC-8F5E-E6BAF1CFF73B}" srcId="{1A1E021E-DEDB-4DC8-914D-3CC33BF64070}" destId="{2DB01136-9D02-44C3-8D30-151451BED77A}" srcOrd="0" destOrd="0" parTransId="{0907BA1B-8C2C-46B2-8919-9D01FC1B262B}" sibTransId="{528F1096-9DDD-4775-A3CF-FA1E95D167DA}"/>
-    <dgm:cxn modelId="{EF365414-ED4F-4ABA-8D88-57D6663C2800}" type="presOf" srcId="{6B6BB9DE-F38D-4E54-9E28-CC69F328C37F}" destId="{4BBC361B-46A0-4451-9EAF-CC8B52B275D1}" srcOrd="1" destOrd="0" presId="urn:microsoft.com/office/officeart/2005/8/layout/hierarchy5"/>
-    <dgm:cxn modelId="{8A59AB2F-5C58-45D9-B519-223065BC0923}" type="presOf" srcId="{B6E81698-9A9A-4953-8EB0-57FCFFD6CBBB}" destId="{94C0F8F5-DDCF-4708-B2E0-BF92442436E9}" srcOrd="0" destOrd="0" presId="urn:microsoft.com/office/officeart/2005/8/layout/hierarchy5"/>
-    <dgm:cxn modelId="{4BAD174D-D0EF-4AAD-9E82-483D00688906}" type="presOf" srcId="{5F8BA5B6-A0FC-4E95-AA0E-7A970892ADC8}" destId="{0A2EE00C-43D2-4C8E-95E3-84F11AA1CC90}" srcOrd="0" destOrd="0" presId="urn:microsoft.com/office/officeart/2005/8/layout/hierarchy5"/>
-    <dgm:cxn modelId="{A2411785-28C5-40AC-83A3-B196AE46A490}" type="presOf" srcId="{D743D934-A151-4033-85EE-03A8AD73236D}" destId="{6F611C5A-9069-4296-9DBE-6EFF5A7CB28F}" srcOrd="1" destOrd="0" presId="urn:microsoft.com/office/officeart/2005/8/layout/hierarchy5"/>
-    <dgm:cxn modelId="{B8E9F457-6037-427A-921C-CC0FBA18B822}" srcId="{1CD9DD62-71D1-4AB4-9004-F666B647DCD2}" destId="{DC2CBB48-DF3A-4C5E-BDF6-ABC816F5C797}" srcOrd="1" destOrd="0" parTransId="{669E2E36-BE92-4756-9E24-4489A1124CD0}" sibTransId="{59E3A54D-0285-43FC-AAC0-E6ECC30617B1}"/>
-    <dgm:cxn modelId="{11DBCF88-A519-4C74-9EC2-4468386930C7}" srcId="{F426891C-863F-4A09-A7E9-FC50DCF1E151}" destId="{58F416B4-4AFA-4C6A-9B3B-A1FF9F489D17}" srcOrd="0" destOrd="0" parTransId="{B5DEF538-F16F-487A-9CF1-DF79331A26C1}" sibTransId="{579C376D-2ED9-4F11-9ECA-2B7BACA5A705}"/>
-    <dgm:cxn modelId="{4A2F8508-D217-4F8C-9727-48CE45D3D3FA}" type="presOf" srcId="{3BEFD10E-3FC3-40B4-9F94-725C61E140A6}" destId="{5B3DBCAE-487B-45C9-B557-F679B80AC45A}" srcOrd="1" destOrd="0" presId="urn:microsoft.com/office/officeart/2005/8/layout/hierarchy5"/>
-    <dgm:cxn modelId="{B8DBC284-431B-4A34-A763-3960B70F15A3}" type="presOf" srcId="{41D672BA-A028-4F21-B333-39B59A298DBB}" destId="{626C1EBD-00F3-4EF0-A61E-6B9B11E3B8AB}" srcOrd="0" destOrd="0" presId="urn:microsoft.com/office/officeart/2005/8/layout/hierarchy5"/>
-    <dgm:cxn modelId="{A30E9E64-78F8-4802-BAB2-857D6265BFB7}" type="presOf" srcId="{0907BA1B-8C2C-46B2-8919-9D01FC1B262B}" destId="{520C6796-1E1A-460F-A9A0-68737CF1A106}" srcOrd="1" destOrd="0" presId="urn:microsoft.com/office/officeart/2005/8/layout/hierarchy5"/>
-    <dgm:cxn modelId="{1ECB6473-C7B9-4DDB-8E6D-FF67F7A89881}" type="presOf" srcId="{FFDBC1C7-A7C8-4E99-A5A3-8B54E332C334}" destId="{FF361F37-CE33-40F3-B237-A7D24026C6E6}" srcOrd="1" destOrd="0" presId="urn:microsoft.com/office/officeart/2005/8/layout/hierarchy5"/>
-    <dgm:cxn modelId="{22334715-DBC6-4DFD-8958-141CCB34EFF6}" type="presOf" srcId="{07A62DD5-DEA2-483C-A892-96C00C737FBA}" destId="{B8B4F77C-1B6D-4BFF-9A87-B27ABF25ACED}" srcOrd="1" destOrd="0" presId="urn:microsoft.com/office/officeart/2005/8/layout/hierarchy5"/>
-    <dgm:cxn modelId="{EC7EA44F-608E-459F-91E5-ED286C4694C2}" type="presOf" srcId="{FFDBC1C7-A7C8-4E99-A5A3-8B54E332C334}" destId="{447F965F-96E9-40DC-834F-E91AA721F862}" srcOrd="0" destOrd="0" presId="urn:microsoft.com/office/officeart/2005/8/layout/hierarchy5"/>
-    <dgm:cxn modelId="{940AC9CD-D293-4280-87D7-DB4AA3752FBD}" type="presOf" srcId="{FD200CDD-3708-42B4-9412-BC6BC10F780F}" destId="{B2A9F8A5-DA6A-49A2-AC91-D8136DF75C35}" srcOrd="0" destOrd="0" presId="urn:microsoft.com/office/officeart/2005/8/layout/hierarchy5"/>
-    <dgm:cxn modelId="{4338A8F5-1855-4967-9959-958B7C519A88}" type="presOf" srcId="{5170FC55-8CD2-4575-8664-FE1527F70A57}" destId="{C85981BA-B3EC-4E1E-B5CC-4C957248A8F4}" srcOrd="0" destOrd="0" presId="urn:microsoft.com/office/officeart/2005/8/layout/hierarchy5"/>
-    <dgm:cxn modelId="{63B6E2B6-5CD4-458B-AF5B-113F9CEDE4C1}" type="presOf" srcId="{DA6FA8C2-A357-4386-BF3C-EC6C7ED88816}" destId="{FA718ACE-803C-43D0-A3FF-A49775772DF0}" srcOrd="0" destOrd="0" presId="urn:microsoft.com/office/officeart/2005/8/layout/hierarchy5"/>
-    <dgm:cxn modelId="{9674C647-4703-4D23-BF09-D1D0C3EEDF20}" srcId="{1F3ABAE5-FE40-4625-B826-2497EF69ACB0}" destId="{E9B644CD-0AD6-4B2F-AE23-8D44A0D9533C}" srcOrd="1" destOrd="0" parTransId="{A3DB99DA-5742-4A54-9A93-4DE079D5FBA8}" sibTransId="{28874741-DC46-4A04-9A96-DBDC920255E2}"/>
-    <dgm:cxn modelId="{2F75B1A4-37C5-4D51-90FC-C66D6CC68621}" type="presOf" srcId="{44771617-08EA-4EA7-B21B-5B248CEE262C}" destId="{B13B3C32-1189-418C-BC67-FD16797FA497}" srcOrd="0" destOrd="0" presId="urn:microsoft.com/office/officeart/2005/8/layout/hierarchy5"/>
-    <dgm:cxn modelId="{2F11473F-056C-4DEC-B448-B1D67E65FF6B}" srcId="{A5F1D9FE-94AE-4D9D-8104-127130754F38}" destId="{730F001D-F4A5-4EB0-8D88-B5C40674D694}" srcOrd="1" destOrd="0" parTransId="{21018797-09B0-43BC-990E-D2C4363A13E3}" sibTransId="{B847B0FF-42AF-4282-99C4-FA18AC812828}"/>
-    <dgm:cxn modelId="{F9C3A461-A3A7-43EF-81B6-E29D86184184}" type="presOf" srcId="{3D02AF21-A4C9-475D-983D-652A2500649B}" destId="{FA248D77-6A15-4299-8DE4-3B766CF2728C}" srcOrd="0" destOrd="0" presId="urn:microsoft.com/office/officeart/2005/8/layout/hierarchy5"/>
-    <dgm:cxn modelId="{54474368-6DC0-4569-B719-E6153ADB7AED}" type="presOf" srcId="{9682CD7E-E678-44BD-9EBA-E4B8EFCC0DA8}" destId="{3BB25170-7867-49C5-96A3-2C6046FBCACA}" srcOrd="1" destOrd="0" presId="urn:microsoft.com/office/officeart/2005/8/layout/hierarchy5"/>
-    <dgm:cxn modelId="{9C1C473F-A36C-4689-B685-857169970B9A}" type="presOf" srcId="{B5DEF538-F16F-487A-9CF1-DF79331A26C1}" destId="{F5C90689-0D93-4983-824F-43F8C0C1014C}" srcOrd="0" destOrd="0" presId="urn:microsoft.com/office/officeart/2005/8/layout/hierarchy5"/>
-    <dgm:cxn modelId="{6095F952-3862-4FF5-A114-D04904E6AA8B}" type="presOf" srcId="{F7F9063E-316E-4ACB-A092-745B51571572}" destId="{B49DCFD5-3E99-4135-A8FF-952B4708CF53}" srcOrd="0" destOrd="0" presId="urn:microsoft.com/office/officeart/2005/8/layout/hierarchy5"/>
     <dgm:cxn modelId="{F32FB75D-82F3-4276-A65C-5221B6D7CE90}" type="presParOf" srcId="{94863F81-6F51-415B-BE40-8777D7E91B03}" destId="{BA894299-97DB-4667-BF57-DEC7597AD851}" srcOrd="0" destOrd="0" presId="urn:microsoft.com/office/officeart/2005/8/layout/hierarchy5"/>
     <dgm:cxn modelId="{530E356E-34A3-49B8-BACF-3BB09998149B}" type="presParOf" srcId="{BA894299-97DB-4667-BF57-DEC7597AD851}" destId="{C46F04B1-0A59-409F-8A7B-43A5BD1D5A98}" srcOrd="0" destOrd="0" presId="urn:microsoft.com/office/officeart/2005/8/layout/hierarchy5"/>
     <dgm:cxn modelId="{94B069D1-F3DC-42C1-B407-7E7563325AAF}" type="presParOf" srcId="{BA894299-97DB-4667-BF57-DEC7597AD851}" destId="{C3B457EC-6170-4A59-8BE4-5E6C374E73DB}" srcOrd="1" destOrd="0" presId="urn:microsoft.com/office/officeart/2005/8/layout/hierarchy5"/>
@@ -11652,7 +12313,7 @@
           <a:p>
             <a:fld id="{FE8BC13A-84C2-4F23-B046-9F1FD285F1D3}" type="datetimeFigureOut">
               <a:rPr lang="en-US" smtClean="0"/>
-              <a:t>10/31/2017</a:t>
+              <a:t>11/1/2017</a:t>
             </a:fld>
             <a:endParaRPr lang="en-US"/>
           </a:p>
@@ -11925,7 +12586,7 @@
           <a:p>
             <a:fld id="{FE8BC13A-84C2-4F23-B046-9F1FD285F1D3}" type="datetimeFigureOut">
               <a:rPr lang="en-US" smtClean="0"/>
-              <a:t>10/31/2017</a:t>
+              <a:t>11/1/2017</a:t>
             </a:fld>
             <a:endParaRPr lang="en-US"/>
           </a:p>
@@ -12182,7 +12843,7 @@
           <a:p>
             <a:fld id="{FE8BC13A-84C2-4F23-B046-9F1FD285F1D3}" type="datetimeFigureOut">
               <a:rPr lang="en-US" smtClean="0"/>
-              <a:t>10/31/2017</a:t>
+              <a:t>11/1/2017</a:t>
             </a:fld>
             <a:endParaRPr lang="en-US"/>
           </a:p>
@@ -12529,7 +13190,7 @@
           <a:p>
             <a:fld id="{FE8BC13A-84C2-4F23-B046-9F1FD285F1D3}" type="datetimeFigureOut">
               <a:rPr lang="en-US" smtClean="0"/>
-              <a:t>10/31/2017</a:t>
+              <a:t>11/1/2017</a:t>
             </a:fld>
             <a:endParaRPr lang="en-US"/>
           </a:p>
@@ -12931,7 +13592,7 @@
           <a:p>
             <a:fld id="{FE8BC13A-84C2-4F23-B046-9F1FD285F1D3}" type="datetimeFigureOut">
               <a:rPr lang="en-US" smtClean="0"/>
-              <a:t>10/31/2017</a:t>
+              <a:t>11/1/2017</a:t>
             </a:fld>
             <a:endParaRPr lang="en-US"/>
           </a:p>
@@ -13049,7 +13710,7 @@
           <a:p>
             <a:fld id="{FE8BC13A-84C2-4F23-B046-9F1FD285F1D3}" type="datetimeFigureOut">
               <a:rPr lang="en-US" smtClean="0"/>
-              <a:t>10/31/2017</a:t>
+              <a:t>11/1/2017</a:t>
             </a:fld>
             <a:endParaRPr lang="en-US"/>
           </a:p>
@@ -13144,7 +13805,7 @@
           <a:p>
             <a:fld id="{FE8BC13A-84C2-4F23-B046-9F1FD285F1D3}" type="datetimeFigureOut">
               <a:rPr lang="en-US" smtClean="0"/>
-              <a:t>10/31/2017</a:t>
+              <a:t>11/1/2017</a:t>
             </a:fld>
             <a:endParaRPr lang="en-US"/>
           </a:p>
@@ -13434,7 +14095,7 @@
           <a:p>
             <a:fld id="{FE8BC13A-84C2-4F23-B046-9F1FD285F1D3}" type="datetimeFigureOut">
               <a:rPr lang="en-US" smtClean="0"/>
-              <a:t>10/31/2017</a:t>
+              <a:t>11/1/2017</a:t>
             </a:fld>
             <a:endParaRPr lang="en-US"/>
           </a:p>
@@ -13711,7 +14372,7 @@
           <a:p>
             <a:fld id="{FE8BC13A-84C2-4F23-B046-9F1FD285F1D3}" type="datetimeFigureOut">
               <a:rPr lang="en-US" smtClean="0"/>
-              <a:t>10/31/2017</a:t>
+              <a:t>11/1/2017</a:t>
             </a:fld>
             <a:endParaRPr lang="en-US"/>
           </a:p>
@@ -13964,7 +14625,7 @@
           <a:p>
             <a:fld id="{FE8BC13A-84C2-4F23-B046-9F1FD285F1D3}" type="datetimeFigureOut">
               <a:rPr lang="en-US" smtClean="0"/>
-              <a:t>10/31/2017</a:t>
+              <a:t>11/1/2017</a:t>
             </a:fld>
             <a:endParaRPr lang="en-US"/>
           </a:p>
@@ -14595,7 +15256,367 @@
           <a:p>
             <a:r>
               <a:rPr lang="en-US" dirty="0" smtClean="0"/>
-              <a:t>Thanks to all the new </a:t>
+              <a:t>Converting Algorithms</a:t>
+            </a:r>
+            <a:endParaRPr lang="en-US" dirty="0"/>
+          </a:p>
+        </p:txBody>
+      </p:sp>
+      <p:sp>
+        <p:nvSpPr>
+          <p:cNvPr id="3" name="Content Placeholder 2"/>
+          <p:cNvSpPr>
+            <a:spLocks noGrp="1"/>
+          </p:cNvSpPr>
+          <p:nvPr>
+            <p:ph sz="half" idx="1"/>
+          </p:nvPr>
+        </p:nvSpPr>
+        <p:spPr/>
+        <p:txBody>
+          <a:bodyPr>
+            <a:normAutofit lnSpcReduction="10000"/>
+          </a:bodyPr>
+          <a:lstStyle/>
+          <a:p>
+            <a:pPr lvl="1"/>
+            <a:r>
+              <a:rPr lang="en-US" dirty="0" smtClean="0"/>
+              <a:t>Algorithms are at the heart of the business logic in your applications</a:t>
+            </a:r>
+          </a:p>
+          <a:p>
+            <a:pPr lvl="1"/>
+            <a:r>
+              <a:rPr lang="en-US" dirty="0" smtClean="0"/>
+              <a:t>I find the that important and valuable algorithms are also the complicated and difficult ones</a:t>
+            </a:r>
+          </a:p>
+          <a:p>
+            <a:pPr lvl="1"/>
+            <a:r>
+              <a:rPr lang="en-US" dirty="0" smtClean="0"/>
+              <a:t>The often represent the “hot spots” in your business requirements that change frequently</a:t>
+            </a:r>
+          </a:p>
+          <a:p>
+            <a:pPr lvl="1"/>
+            <a:r>
+              <a:rPr lang="en-US" dirty="0" smtClean="0"/>
+              <a:t>Lots of little changes over time add up to technical debt and slowly grow into a mess</a:t>
+            </a:r>
+          </a:p>
+          <a:p>
+            <a:pPr lvl="1"/>
+            <a:r>
+              <a:rPr lang="en-US" dirty="0" smtClean="0"/>
+              <a:t>Separating the code into classes then composing them together can often make it much easier to adapt changes over time</a:t>
+            </a:r>
+          </a:p>
+          <a:p>
+            <a:pPr lvl="1"/>
+            <a:endParaRPr lang="en-US" dirty="0" smtClean="0"/>
+          </a:p>
+          <a:p>
+            <a:pPr lvl="1"/>
+            <a:r>
+              <a:rPr lang="en-US" dirty="0" smtClean="0"/>
+              <a:t>Let’s look at the Object Oriented technique called the Strategy Pattern</a:t>
+            </a:r>
+            <a:endParaRPr lang="en-US" dirty="0"/>
+          </a:p>
+        </p:txBody>
+      </p:sp>
+      <p:pic>
+        <p:nvPicPr>
+          <p:cNvPr id="8" name="Content Placeholder 7"/>
+          <p:cNvPicPr>
+            <a:picLocks noGrp="1" noChangeAspect="1"/>
+          </p:cNvPicPr>
+          <p:nvPr>
+            <p:ph sz="half" idx="2"/>
+          </p:nvPr>
+        </p:nvPicPr>
+        <p:blipFill>
+          <a:blip r:embed="rId2">
+            <a:extLst>
+              <a:ext uri="{28A0092B-C50C-407E-A947-70E740481C1C}">
+                <a14:useLocalDpi xmlns:a14="http://schemas.microsoft.com/office/drawing/2010/main" val="0"/>
+              </a:ext>
+            </a:extLst>
+          </a:blip>
+          <a:stretch>
+            <a:fillRect/>
+          </a:stretch>
+        </p:blipFill>
+        <p:spPr>
+          <a:xfrm>
+            <a:off x="5989638" y="2889416"/>
+            <a:ext cx="4754562" cy="2815893"/>
+          </a:xfrm>
+        </p:spPr>
+      </p:pic>
+    </p:spTree>
+    <p:extLst>
+      <p:ext uri="{BB962C8B-B14F-4D97-AF65-F5344CB8AC3E}">
+        <p14:creationId xmlns:p14="http://schemas.microsoft.com/office/powerpoint/2010/main" val="758222744"/>
+      </p:ext>
+    </p:extLst>
+  </p:cSld>
+  <p:clrMapOvr>
+    <a:masterClrMapping/>
+  </p:clrMapOvr>
+  <p:timing>
+    <p:tnLst>
+      <p:par>
+        <p:cTn id="1" dur="indefinite" restart="never" nodeType="tmRoot"/>
+      </p:par>
+    </p:tnLst>
+  </p:timing>
+</p:sld>
+</file>
+
+<file path=ppt/slides/slide11.xml><?xml version="1.0" encoding="utf-8"?>
+<p:sld xmlns:a="http://schemas.openxmlformats.org/drawingml/2006/main" xmlns:r="http://schemas.openxmlformats.org/officeDocument/2006/relationships" xmlns:p="http://schemas.openxmlformats.org/presentationml/2006/main">
+  <p:cSld>
+    <p:spTree>
+      <p:nvGrpSpPr>
+        <p:cNvPr id="1" name=""/>
+        <p:cNvGrpSpPr/>
+        <p:nvPr/>
+      </p:nvGrpSpPr>
+      <p:grpSpPr>
+        <a:xfrm>
+          <a:off x="0" y="0"/>
+          <a:ext cx="0" cy="0"/>
+          <a:chOff x="0" y="0"/>
+          <a:chExt cx="0" cy="0"/>
+        </a:xfrm>
+      </p:grpSpPr>
+      <p:sp>
+        <p:nvSpPr>
+          <p:cNvPr id="2" name="Title 1"/>
+          <p:cNvSpPr>
+            <a:spLocks noGrp="1"/>
+          </p:cNvSpPr>
+          <p:nvPr>
+            <p:ph type="title"/>
+          </p:nvPr>
+        </p:nvSpPr>
+        <p:spPr/>
+        <p:txBody>
+          <a:bodyPr/>
+          <a:lstStyle/>
+          <a:p>
+            <a:r>
+              <a:rPr lang="en-US" dirty="0" smtClean="0"/>
+              <a:t>Code Demo</a:t>
+            </a:r>
+            <a:endParaRPr lang="en-US" dirty="0"/>
+          </a:p>
+        </p:txBody>
+      </p:sp>
+      <p:pic>
+        <p:nvPicPr>
+          <p:cNvPr id="4" name="Content Placeholder 3"/>
+          <p:cNvPicPr>
+            <a:picLocks noGrp="1" noChangeAspect="1"/>
+          </p:cNvPicPr>
+          <p:nvPr>
+            <p:ph idx="1"/>
+          </p:nvPr>
+        </p:nvPicPr>
+        <p:blipFill>
+          <a:blip r:embed="rId2"/>
+          <a:stretch>
+            <a:fillRect/>
+          </a:stretch>
+        </p:blipFill>
+        <p:spPr>
+          <a:xfrm>
+            <a:off x="2726531" y="2644775"/>
+            <a:ext cx="6315075" cy="3305175"/>
+          </a:xfrm>
+          <a:prstGeom prst="rect">
+            <a:avLst/>
+          </a:prstGeom>
+        </p:spPr>
+      </p:pic>
+    </p:spTree>
+    <p:extLst>
+      <p:ext uri="{BB962C8B-B14F-4D97-AF65-F5344CB8AC3E}">
+        <p14:creationId xmlns:p14="http://schemas.microsoft.com/office/powerpoint/2010/main" val="26118511"/>
+      </p:ext>
+    </p:extLst>
+  </p:cSld>
+  <p:clrMapOvr>
+    <a:masterClrMapping/>
+  </p:clrMapOvr>
+  <p:timing>
+    <p:tnLst>
+      <p:par>
+        <p:cTn id="1" dur="indefinite" restart="never" nodeType="tmRoot"/>
+      </p:par>
+    </p:tnLst>
+  </p:timing>
+</p:sld>
+</file>
+
+<file path=ppt/slides/slide12.xml><?xml version="1.0" encoding="utf-8"?>
+<p:sld xmlns:a="http://schemas.openxmlformats.org/drawingml/2006/main" xmlns:r="http://schemas.openxmlformats.org/officeDocument/2006/relationships" xmlns:p="http://schemas.openxmlformats.org/presentationml/2006/main">
+  <p:cSld>
+    <p:spTree>
+      <p:nvGrpSpPr>
+        <p:cNvPr id="1" name=""/>
+        <p:cNvGrpSpPr/>
+        <p:nvPr/>
+      </p:nvGrpSpPr>
+      <p:grpSpPr>
+        <a:xfrm>
+          <a:off x="0" y="0"/>
+          <a:ext cx="0" cy="0"/>
+          <a:chOff x="0" y="0"/>
+          <a:chExt cx="0" cy="0"/>
+        </a:xfrm>
+      </p:grpSpPr>
+      <p:sp>
+        <p:nvSpPr>
+          <p:cNvPr id="2" name="Title 1"/>
+          <p:cNvSpPr>
+            <a:spLocks noGrp="1"/>
+          </p:cNvSpPr>
+          <p:nvPr>
+            <p:ph type="title"/>
+          </p:nvPr>
+        </p:nvSpPr>
+        <p:spPr/>
+        <p:txBody>
+          <a:bodyPr/>
+          <a:lstStyle/>
+          <a:p>
+            <a:r>
+              <a:rPr lang="en-US" dirty="0" smtClean="0"/>
+              <a:t>Transition Tactic: Strategy Objects</a:t>
+            </a:r>
+            <a:endParaRPr lang="en-US" dirty="0"/>
+          </a:p>
+        </p:txBody>
+      </p:sp>
+      <p:sp>
+        <p:nvSpPr>
+          <p:cNvPr id="3" name="Content Placeholder 2"/>
+          <p:cNvSpPr>
+            <a:spLocks noGrp="1"/>
+          </p:cNvSpPr>
+          <p:nvPr>
+            <p:ph idx="1"/>
+          </p:nvPr>
+        </p:nvSpPr>
+        <p:spPr/>
+        <p:txBody>
+          <a:bodyPr/>
+          <a:lstStyle/>
+          <a:p>
+            <a:pPr marL="457200" indent="-457200">
+              <a:buFont typeface="+mj-lt"/>
+              <a:buAutoNum type="arabicPeriod"/>
+            </a:pPr>
+            <a:r>
+              <a:rPr lang="en-US" dirty="0" smtClean="0"/>
+              <a:t>Algorithms often contain some of the most important and complex business logic of an application.</a:t>
+            </a:r>
+          </a:p>
+          <a:p>
+            <a:pPr marL="457200" indent="-457200">
+              <a:buFont typeface="+mj-lt"/>
+              <a:buAutoNum type="arabicPeriod"/>
+            </a:pPr>
+            <a:r>
+              <a:rPr lang="en-US" dirty="0" smtClean="0"/>
+              <a:t>They also are often the most commonly changed parts of an application.</a:t>
+            </a:r>
+          </a:p>
+          <a:p>
+            <a:pPr marL="457200" indent="-457200">
+              <a:buFont typeface="+mj-lt"/>
+              <a:buAutoNum type="arabicPeriod"/>
+            </a:pPr>
+            <a:r>
+              <a:rPr lang="en-US" dirty="0" smtClean="0"/>
+              <a:t>You can avoid much of the code decay and associated headaches by wrapping the algorithm into a Strategy object</a:t>
+            </a:r>
+          </a:p>
+          <a:p>
+            <a:pPr marL="457200" indent="-457200">
+              <a:buFont typeface="+mj-lt"/>
+              <a:buAutoNum type="arabicPeriod"/>
+            </a:pPr>
+            <a:r>
+              <a:rPr lang="en-US" dirty="0" smtClean="0"/>
+              <a:t>Strategy objects work very well with Dependency Injection frameworks.</a:t>
+            </a:r>
+          </a:p>
+          <a:p>
+            <a:pPr marL="457200" indent="-457200">
+              <a:buFont typeface="+mj-lt"/>
+              <a:buAutoNum type="arabicPeriod"/>
+            </a:pPr>
+            <a:r>
+              <a:rPr lang="en-US" dirty="0" smtClean="0"/>
+              <a:t>Strategy objects also give you the option to switch implementations at runtime instead of only at compile time … nothing says you can’t have some objects with strategy A and some with strategy B.</a:t>
+            </a:r>
+            <a:endParaRPr lang="en-US" dirty="0"/>
+          </a:p>
+        </p:txBody>
+      </p:sp>
+    </p:spTree>
+    <p:extLst>
+      <p:ext uri="{BB962C8B-B14F-4D97-AF65-F5344CB8AC3E}">
+        <p14:creationId xmlns:p14="http://schemas.microsoft.com/office/powerpoint/2010/main" val="43224220"/>
+      </p:ext>
+    </p:extLst>
+  </p:cSld>
+  <p:clrMapOvr>
+    <a:masterClrMapping/>
+  </p:clrMapOvr>
+</p:sld>
+</file>
+
+<file path=ppt/slides/slide13.xml><?xml version="1.0" encoding="utf-8"?>
+<p:sld xmlns:a="http://schemas.openxmlformats.org/drawingml/2006/main" xmlns:r="http://schemas.openxmlformats.org/officeDocument/2006/relationships" xmlns:p="http://schemas.openxmlformats.org/presentationml/2006/main">
+  <p:cSld>
+    <p:spTree>
+      <p:nvGrpSpPr>
+        <p:cNvPr id="1" name=""/>
+        <p:cNvGrpSpPr/>
+        <p:nvPr/>
+      </p:nvGrpSpPr>
+      <p:grpSpPr>
+        <a:xfrm>
+          <a:off x="0" y="0"/>
+          <a:ext cx="0" cy="0"/>
+          <a:chOff x="0" y="0"/>
+          <a:chExt cx="0" cy="0"/>
+        </a:xfrm>
+      </p:grpSpPr>
+      <p:sp>
+        <p:nvSpPr>
+          <p:cNvPr id="2" name="Title 1"/>
+          <p:cNvSpPr>
+            <a:spLocks noGrp="1"/>
+          </p:cNvSpPr>
+          <p:nvPr>
+            <p:ph type="title"/>
+          </p:nvPr>
+        </p:nvSpPr>
+        <p:spPr/>
+        <p:txBody>
+          <a:bodyPr/>
+          <a:lstStyle/>
+          <a:p>
+            <a:r>
+              <a:rPr lang="en-US" dirty="0" smtClean="0"/>
+              <a:t>Thanks to all the </a:t>
             </a:r>
             <a:r>
               <a:rPr lang="en-US" dirty="0" err="1" smtClean="0"/>
@@ -14625,12 +15646,14 @@
         </p:nvSpPr>
         <p:spPr>
           <a:xfrm>
-            <a:off x="6056181" y="5098832"/>
-            <a:ext cx="4747618" cy="1202987"/>
+            <a:off x="1160798" y="2270834"/>
+            <a:ext cx="8377666" cy="1202987"/>
           </a:xfrm>
         </p:spPr>
         <p:txBody>
-          <a:bodyPr/>
+          <a:bodyPr>
+            <a:normAutofit/>
+          </a:bodyPr>
           <a:lstStyle/>
           <a:p>
             <a:r>
@@ -14640,18 +15663,12 @@
           </a:p>
           <a:p>
             <a:r>
-              <a:rPr lang="en-US" sz="1800" dirty="0" smtClean="0">
+              <a:rPr lang="en-US" sz="2800" dirty="0" smtClean="0">
                 <a:hlinkClick r:id="rId2"/>
               </a:rPr>
-              <a:t>https://</a:t>
+              <a:t>https://github.com/MarkEwer/JaxDugSamples</a:t>
             </a:r>
-            <a:r>
-              <a:rPr lang="en-US" sz="1800" dirty="0" smtClean="0">
-                <a:hlinkClick r:id="rId2"/>
-              </a:rPr>
-              <a:t>github.com/MarkEwer/JaxDugSamples</a:t>
-            </a:r>
-            <a:endParaRPr lang="en-US" dirty="0" smtClean="0"/>
+            <a:endParaRPr lang="en-US" sz="3300" dirty="0" smtClean="0"/>
           </a:p>
         </p:txBody>
       </p:sp>
@@ -14679,7 +15696,7 @@
         </p:blipFill>
         <p:spPr>
           <a:xfrm>
-            <a:off x="1166191" y="2273030"/>
+            <a:off x="9538464" y="3240726"/>
             <a:ext cx="2305050" cy="2305050"/>
           </a:xfrm>
         </p:spPr>
@@ -14692,7 +15709,7 @@
         </p:nvSpPr>
         <p:spPr>
           <a:xfrm>
-            <a:off x="3658570" y="2776814"/>
+            <a:off x="5053267" y="3813995"/>
             <a:ext cx="4499693" cy="1477328"/>
           </a:xfrm>
           <a:prstGeom prst="rect">
@@ -14790,7 +15807,7 @@
         </p:blipFill>
         <p:spPr>
           <a:xfrm>
-            <a:off x="2190858" y="4518704"/>
+            <a:off x="10563131" y="5486400"/>
             <a:ext cx="1371600" cy="1371600"/>
           </a:xfrm>
           <a:prstGeom prst="rect">
@@ -14820,12 +15837,60 @@
         </p:blipFill>
         <p:spPr>
           <a:xfrm>
-            <a:off x="1180687" y="4735633"/>
+            <a:off x="9552960" y="5703329"/>
             <a:ext cx="1010171" cy="1010171"/>
           </a:xfrm>
           <a:prstGeom prst="rect">
             <a:avLst/>
           </a:prstGeom>
+        </p:spPr>
+      </p:pic>
+      <p:pic>
+        <p:nvPicPr>
+          <p:cNvPr id="1026" name="Picture 2" descr="https://static1.squarespace.com/static/540bd4b1e4b0c6cf504ed567/t/56579eeae4b06edc0ac64974/1448582891269/thanks-logo-gray-noapp.png"/>
+          <p:cNvPicPr>
+            <a:picLocks noChangeAspect="1" noChangeArrowheads="1"/>
+          </p:cNvPicPr>
+          <p:nvPr/>
+        </p:nvPicPr>
+        <p:blipFill>
+          <a:blip r:embed="rId10">
+            <a:duotone>
+              <a:schemeClr val="accent2">
+                <a:shade val="45000"/>
+                <a:satMod val="135000"/>
+              </a:schemeClr>
+              <a:prstClr val="white"/>
+            </a:duotone>
+            <a:extLst>
+              <a:ext uri="{28A0092B-C50C-407E-A947-70E740481C1C}">
+                <a14:useLocalDpi xmlns:a14="http://schemas.microsoft.com/office/drawing/2010/main" val="0"/>
+              </a:ext>
+            </a:extLst>
+          </a:blip>
+          <a:srcRect/>
+          <a:stretch>
+            <a:fillRect/>
+          </a:stretch>
+        </p:blipFill>
+        <p:spPr bwMode="auto">
+          <a:xfrm rot="20918362">
+            <a:off x="431132" y="3881048"/>
+            <a:ext cx="4024175" cy="1343220"/>
+          </a:xfrm>
+          <a:prstGeom prst="rect">
+            <a:avLst/>
+          </a:prstGeom>
+          <a:noFill/>
+          <a:extLst>
+            <a:ext uri="{909E8E84-426E-40DD-AFC4-6F175D3DCCD1}">
+              <a14:hiddenFill xmlns:a14="http://schemas.microsoft.com/office/drawing/2010/main">
+                <a:solidFill>
+                  <a:srgbClr val="FFFFFF"/>
+                </a:solidFill>
+              </a14:hiddenFill>
+            </a:ext>
+          </a:extLst>
         </p:spPr>
       </p:pic>
     </p:spTree>
@@ -17801,6 +18866,132 @@
           <a:p>
             <a:r>
               <a:rPr lang="en-US" dirty="0" smtClean="0"/>
+              <a:t>Transition Tactic: Action&lt;T&gt;</a:t>
+            </a:r>
+            <a:endParaRPr lang="en-US" dirty="0"/>
+          </a:p>
+        </p:txBody>
+      </p:sp>
+      <p:sp>
+        <p:nvSpPr>
+          <p:cNvPr id="3" name="Content Placeholder 2"/>
+          <p:cNvSpPr>
+            <a:spLocks noGrp="1"/>
+          </p:cNvSpPr>
+          <p:nvPr>
+            <p:ph idx="1"/>
+          </p:nvPr>
+        </p:nvSpPr>
+        <p:spPr/>
+        <p:txBody>
+          <a:bodyPr/>
+          <a:lstStyle/>
+          <a:p>
+            <a:pPr marL="457200" indent="-457200">
+              <a:buFont typeface="+mj-lt"/>
+              <a:buAutoNum type="arabicPeriod"/>
+            </a:pPr>
+            <a:r>
+              <a:rPr lang="en-US" dirty="0" smtClean="0"/>
+              <a:t>To remove much of the branching complexity we will change the boolean flags into a single </a:t>
+            </a:r>
+            <a:r>
+              <a:rPr lang="en-US" dirty="0" smtClean="0">
+                <a:solidFill>
+                  <a:srgbClr val="92D050"/>
+                </a:solidFill>
+                <a:latin typeface="Consolas" panose="020B0609020204030204" pitchFamily="49" charset="0"/>
+              </a:rPr>
+              <a:t>Action&lt;T&gt;</a:t>
+            </a:r>
+            <a:r>
+              <a:rPr lang="en-US" dirty="0" smtClean="0"/>
+              <a:t> property.</a:t>
+            </a:r>
+          </a:p>
+          <a:p>
+            <a:pPr marL="457200" indent="-457200">
+              <a:buFont typeface="+mj-lt"/>
+              <a:buAutoNum type="arabicPeriod"/>
+            </a:pPr>
+            <a:r>
+              <a:rPr lang="en-US" dirty="0" smtClean="0"/>
+              <a:t>Next, we change the conditional </a:t>
+            </a:r>
+            <a:r>
+              <a:rPr lang="en-US" dirty="0" smtClean="0">
+                <a:solidFill>
+                  <a:srgbClr val="92D050"/>
+                </a:solidFill>
+                <a:latin typeface="Consolas" panose="020B0609020204030204" pitchFamily="49" charset="0"/>
+              </a:rPr>
+              <a:t>if() </a:t>
+            </a:r>
+            <a:r>
+              <a:rPr lang="en-US" dirty="0" smtClean="0"/>
+              <a:t>statements into an assignment that sets the value of the new action property to point to the correct implementation for the current state of the object.</a:t>
+            </a:r>
+          </a:p>
+          <a:p>
+            <a:pPr marL="457200" indent="-457200">
+              <a:buFont typeface="+mj-lt"/>
+              <a:buAutoNum type="arabicPeriod"/>
+            </a:pPr>
+            <a:r>
+              <a:rPr lang="en-US" dirty="0" smtClean="0"/>
+              <a:t>The new code should now be shorter and each private method on the class will have only a single responsibility.</a:t>
+            </a:r>
+            <a:endParaRPr lang="en-US" dirty="0"/>
+          </a:p>
+        </p:txBody>
+      </p:sp>
+    </p:spTree>
+    <p:extLst>
+      <p:ext uri="{BB962C8B-B14F-4D97-AF65-F5344CB8AC3E}">
+        <p14:creationId xmlns:p14="http://schemas.microsoft.com/office/powerpoint/2010/main" val="2624599476"/>
+      </p:ext>
+    </p:extLst>
+  </p:cSld>
+  <p:clrMapOvr>
+    <a:masterClrMapping/>
+  </p:clrMapOvr>
+</p:sld>
+</file>
+
+<file path=ppt/slides/slide7.xml><?xml version="1.0" encoding="utf-8"?>
+<p:sld xmlns:a="http://schemas.openxmlformats.org/drawingml/2006/main" xmlns:r="http://schemas.openxmlformats.org/officeDocument/2006/relationships" xmlns:p="http://schemas.openxmlformats.org/presentationml/2006/main">
+  <p:cSld>
+    <p:spTree>
+      <p:nvGrpSpPr>
+        <p:cNvPr id="1" name=""/>
+        <p:cNvGrpSpPr/>
+        <p:nvPr/>
+      </p:nvGrpSpPr>
+      <p:grpSpPr>
+        <a:xfrm>
+          <a:off x="0" y="0"/>
+          <a:ext cx="0" cy="0"/>
+          <a:chOff x="0" y="0"/>
+          <a:chExt cx="0" cy="0"/>
+        </a:xfrm>
+      </p:grpSpPr>
+      <p:sp>
+        <p:nvSpPr>
+          <p:cNvPr id="2" name="Title 1"/>
+          <p:cNvSpPr>
+            <a:spLocks noGrp="1"/>
+          </p:cNvSpPr>
+          <p:nvPr>
+            <p:ph type="title"/>
+          </p:nvPr>
+        </p:nvSpPr>
+        <p:spPr/>
+        <p:txBody>
+          <a:bodyPr/>
+          <a:lstStyle/>
+          <a:p>
+            <a:r>
+              <a:rPr lang="en-US" dirty="0" smtClean="0"/>
               <a:t>Converting Iterators</a:t>
             </a:r>
             <a:endParaRPr lang="en-US" dirty="0"/>
@@ -17916,7 +19107,7 @@
 </p:sld>
 </file>
 
-<file path=ppt/slides/slide7.xml><?xml version="1.0" encoding="utf-8"?>
+<file path=ppt/slides/slide8.xml><?xml version="1.0" encoding="utf-8"?>
 <p:sld xmlns:a="http://schemas.openxmlformats.org/drawingml/2006/main" xmlns:r="http://schemas.openxmlformats.org/officeDocument/2006/relationships" xmlns:p="http://schemas.openxmlformats.org/presentationml/2006/main">
   <p:cSld>
     <p:spTree>
@@ -18002,160 +19193,6 @@
 </p:sld>
 </file>
 
-<file path=ppt/slides/slide8.xml><?xml version="1.0" encoding="utf-8"?>
-<p:sld xmlns:a="http://schemas.openxmlformats.org/drawingml/2006/main" xmlns:r="http://schemas.openxmlformats.org/officeDocument/2006/relationships" xmlns:p="http://schemas.openxmlformats.org/presentationml/2006/main">
-  <p:cSld>
-    <p:spTree>
-      <p:nvGrpSpPr>
-        <p:cNvPr id="1" name=""/>
-        <p:cNvGrpSpPr/>
-        <p:nvPr/>
-      </p:nvGrpSpPr>
-      <p:grpSpPr>
-        <a:xfrm>
-          <a:off x="0" y="0"/>
-          <a:ext cx="0" cy="0"/>
-          <a:chOff x="0" y="0"/>
-          <a:chExt cx="0" cy="0"/>
-        </a:xfrm>
-      </p:grpSpPr>
-      <p:sp>
-        <p:nvSpPr>
-          <p:cNvPr id="2" name="Title 1"/>
-          <p:cNvSpPr>
-            <a:spLocks noGrp="1"/>
-          </p:cNvSpPr>
-          <p:nvPr>
-            <p:ph type="title"/>
-          </p:nvPr>
-        </p:nvSpPr>
-        <p:spPr/>
-        <p:txBody>
-          <a:bodyPr/>
-          <a:lstStyle/>
-          <a:p>
-            <a:r>
-              <a:rPr lang="en-US" dirty="0" smtClean="0"/>
-              <a:t>Converting Algorithms</a:t>
-            </a:r>
-            <a:endParaRPr lang="en-US" dirty="0"/>
-          </a:p>
-        </p:txBody>
-      </p:sp>
-      <p:sp>
-        <p:nvSpPr>
-          <p:cNvPr id="3" name="Content Placeholder 2"/>
-          <p:cNvSpPr>
-            <a:spLocks noGrp="1"/>
-          </p:cNvSpPr>
-          <p:nvPr>
-            <p:ph sz="half" idx="1"/>
-          </p:nvPr>
-        </p:nvSpPr>
-        <p:spPr/>
-        <p:txBody>
-          <a:bodyPr>
-            <a:normAutofit lnSpcReduction="10000"/>
-          </a:bodyPr>
-          <a:lstStyle/>
-          <a:p>
-            <a:pPr lvl="1"/>
-            <a:r>
-              <a:rPr lang="en-US" dirty="0" smtClean="0"/>
-              <a:t>Algorithms are at the heart of the business logic in your applications</a:t>
-            </a:r>
-          </a:p>
-          <a:p>
-            <a:pPr lvl="1"/>
-            <a:r>
-              <a:rPr lang="en-US" dirty="0" smtClean="0"/>
-              <a:t>I find the that important and valuable algorithms are also the complicated and difficult ones</a:t>
-            </a:r>
-          </a:p>
-          <a:p>
-            <a:pPr lvl="1"/>
-            <a:r>
-              <a:rPr lang="en-US" dirty="0" smtClean="0"/>
-              <a:t>The often represent the “hot spots” in your business requirements that change frequently</a:t>
-            </a:r>
-          </a:p>
-          <a:p>
-            <a:pPr lvl="1"/>
-            <a:r>
-              <a:rPr lang="en-US" dirty="0" smtClean="0"/>
-              <a:t>Lots of little changes over time add up to technical debt and slowly grow into a mess</a:t>
-            </a:r>
-          </a:p>
-          <a:p>
-            <a:pPr lvl="1"/>
-            <a:r>
-              <a:rPr lang="en-US" dirty="0" smtClean="0"/>
-              <a:t>Separating the code into classes then composing them together can often make it much easier to adapt changes over time</a:t>
-            </a:r>
-          </a:p>
-          <a:p>
-            <a:pPr lvl="1"/>
-            <a:endParaRPr lang="en-US" dirty="0" smtClean="0"/>
-          </a:p>
-          <a:p>
-            <a:pPr lvl="1"/>
-            <a:r>
-              <a:rPr lang="en-US" dirty="0" smtClean="0"/>
-              <a:t>Let’s look at the Object Oriented technique called the Strategy Pattern</a:t>
-            </a:r>
-            <a:endParaRPr lang="en-US" dirty="0"/>
-          </a:p>
-        </p:txBody>
-      </p:sp>
-      <p:pic>
-        <p:nvPicPr>
-          <p:cNvPr id="8" name="Content Placeholder 7"/>
-          <p:cNvPicPr>
-            <a:picLocks noGrp="1" noChangeAspect="1"/>
-          </p:cNvPicPr>
-          <p:nvPr>
-            <p:ph sz="half" idx="2"/>
-          </p:nvPr>
-        </p:nvPicPr>
-        <p:blipFill>
-          <a:blip r:embed="rId2">
-            <a:extLst>
-              <a:ext uri="{28A0092B-C50C-407E-A947-70E740481C1C}">
-                <a14:useLocalDpi xmlns:a14="http://schemas.microsoft.com/office/drawing/2010/main" val="0"/>
-              </a:ext>
-            </a:extLst>
-          </a:blip>
-          <a:stretch>
-            <a:fillRect/>
-          </a:stretch>
-        </p:blipFill>
-        <p:spPr>
-          <a:xfrm>
-            <a:off x="5989638" y="2889416"/>
-            <a:ext cx="4754562" cy="2815893"/>
-          </a:xfrm>
-        </p:spPr>
-      </p:pic>
-    </p:spTree>
-    <p:extLst>
-      <p:ext uri="{BB962C8B-B14F-4D97-AF65-F5344CB8AC3E}">
-        <p14:creationId xmlns:p14="http://schemas.microsoft.com/office/powerpoint/2010/main" val="758222744"/>
-      </p:ext>
-    </p:extLst>
-  </p:cSld>
-  <p:clrMapOvr>
-    <a:masterClrMapping/>
-  </p:clrMapOvr>
-  <p:timing>
-    <p:tnLst>
-      <p:par>
-        <p:cTn id="1" dur="indefinite" restart="never" nodeType="tmRoot"/>
-      </p:par>
-    </p:tnLst>
-  </p:timing>
-</p:sld>
-</file>
-
 <file path=ppt/slides/slide9.xml><?xml version="1.0" encoding="utf-8"?>
 <p:sld xmlns:a="http://schemas.openxmlformats.org/drawingml/2006/main" xmlns:r="http://schemas.openxmlformats.org/officeDocument/2006/relationships" xmlns:p="http://schemas.openxmlformats.org/presentationml/2006/main">
   <p:cSld>
@@ -18190,55 +19227,69 @@
           <a:p>
             <a:r>
               <a:rPr lang="en-US" dirty="0" smtClean="0"/>
-              <a:t>Code Demo</a:t>
+              <a:t>Transition Tactic: Linq</a:t>
             </a:r>
             <a:endParaRPr lang="en-US" dirty="0"/>
           </a:p>
         </p:txBody>
       </p:sp>
-      <p:pic>
-        <p:nvPicPr>
-          <p:cNvPr id="4" name="Content Placeholder 3"/>
-          <p:cNvPicPr>
-            <a:picLocks noGrp="1" noChangeAspect="1"/>
-          </p:cNvPicPr>
+      <p:sp>
+        <p:nvSpPr>
+          <p:cNvPr id="3" name="Content Placeholder 2"/>
+          <p:cNvSpPr>
+            <a:spLocks noGrp="1"/>
+          </p:cNvSpPr>
           <p:nvPr>
             <p:ph idx="1"/>
           </p:nvPr>
-        </p:nvPicPr>
-        <p:blipFill>
-          <a:blip r:embed="rId2"/>
-          <a:stretch>
-            <a:fillRect/>
-          </a:stretch>
-        </p:blipFill>
-        <p:spPr>
-          <a:xfrm>
-            <a:off x="2726531" y="2644775"/>
-            <a:ext cx="6315075" cy="3305175"/>
-          </a:xfrm>
-          <a:prstGeom prst="rect">
-            <a:avLst/>
-          </a:prstGeom>
-        </p:spPr>
-      </p:pic>
+        </p:nvSpPr>
+        <p:spPr/>
+        <p:txBody>
+          <a:bodyPr/>
+          <a:lstStyle/>
+          <a:p>
+            <a:pPr marL="457200" indent="-457200">
+              <a:buFont typeface="+mj-lt"/>
+              <a:buAutoNum type="arabicPeriod"/>
+            </a:pPr>
+            <a:r>
+              <a:rPr lang="en-US" dirty="0" smtClean="0"/>
+              <a:t>To remove much of the iteration logic that loops over sequences of objects, we can use the Language Integrated Query, or Linq.</a:t>
+            </a:r>
+          </a:p>
+          <a:p>
+            <a:pPr marL="457200" indent="-457200">
+              <a:buFont typeface="+mj-lt"/>
+              <a:buAutoNum type="arabicPeriod"/>
+            </a:pPr>
+            <a:r>
+              <a:rPr lang="en-US" dirty="0" smtClean="0"/>
+              <a:t>Linq will enable us to express our loop operations declaratively to the sequence object instead of iteratively to each object in the sequence.</a:t>
+            </a:r>
+          </a:p>
+          <a:p>
+            <a:pPr marL="457200" indent="-457200">
+              <a:buFont typeface="+mj-lt"/>
+              <a:buAutoNum type="arabicPeriod"/>
+            </a:pPr>
+            <a:r>
+              <a:rPr lang="en-US" dirty="0" smtClean="0"/>
+              <a:t>If you add some Linq extension methods with real meaning in your domain then this can become very easy to read.</a:t>
+            </a:r>
+            <a:endParaRPr lang="en-US" dirty="0"/>
+          </a:p>
+        </p:txBody>
+      </p:sp>
     </p:spTree>
     <p:extLst>
       <p:ext uri="{BB962C8B-B14F-4D97-AF65-F5344CB8AC3E}">
-        <p14:creationId xmlns:p14="http://schemas.microsoft.com/office/powerpoint/2010/main" val="26118511"/>
+        <p14:creationId xmlns:p14="http://schemas.microsoft.com/office/powerpoint/2010/main" val="2729244820"/>
       </p:ext>
     </p:extLst>
   </p:cSld>
   <p:clrMapOvr>
     <a:masterClrMapping/>
   </p:clrMapOvr>
-  <p:timing>
-    <p:tnLst>
-      <p:par>
-        <p:cTn id="1" dur="indefinite" restart="never" nodeType="tmRoot"/>
-      </p:par>
-    </p:tnLst>
-  </p:timing>
 </p:sld>
 </file>
 

</xml_diff>

<commit_message>
Added bonus topic for execution pipeline
</commit_message>
<xml_diff>
--- a/Refactoring_Procedural_Code/Refactoring_Procedural_Code.pptx
+++ b/Refactoring_Procedural_Code/Refactoring_Procedural_Code.pptx
@@ -17,7 +17,10 @@
     <p:sldId id="285" r:id="rId11"/>
     <p:sldId id="283" r:id="rId12"/>
     <p:sldId id="288" r:id="rId13"/>
-    <p:sldId id="273" r:id="rId14"/>
+    <p:sldId id="289" r:id="rId14"/>
+    <p:sldId id="290" r:id="rId15"/>
+    <p:sldId id="291" r:id="rId16"/>
+    <p:sldId id="273" r:id="rId17"/>
   </p:sldIdLst>
   <p:sldSz cx="12192000" cy="6858000"/>
   <p:notesSz cx="6858000" cy="9144000"/>
@@ -3741,144 +3744,144 @@
     </dgm:pt>
   </dgm:ptLst>
   <dgm:cxnLst>
+    <dgm:cxn modelId="{C6EC146C-F697-48B2-9F82-2C4B3E09BBA8}" srcId="{730F001D-F4A5-4EB0-8D88-B5C40674D694}" destId="{2609CAE7-1E9B-4EA8-9580-6C6B40609156}" srcOrd="1" destOrd="0" parTransId="{5DF021A5-51AC-4009-942E-DDDC0FEE0D9C}" sibTransId="{AD7D27B4-DF1D-4788-B0A7-B13542262103}"/>
+    <dgm:cxn modelId="{CD6B908D-8CE4-4195-AD65-681787919286}" type="presOf" srcId="{607BEA54-06A3-4744-8D8D-95019B9FFFE8}" destId="{F3C23DF2-4442-4108-A920-CA0358091E48}" srcOrd="0" destOrd="0" presId="urn:microsoft.com/office/officeart/2005/8/layout/hierarchy5"/>
+    <dgm:cxn modelId="{89C8FEE6-D342-4DA8-8E4A-F6EF2F1AEA4C}" type="presOf" srcId="{44771617-08EA-4EA7-B21B-5B248CEE262C}" destId="{81FE9397-CF0F-438B-87BA-0C1AA4CBD002}" srcOrd="1" destOrd="0" presId="urn:microsoft.com/office/officeart/2005/8/layout/hierarchy5"/>
+    <dgm:cxn modelId="{EC35812E-7C36-4653-868B-AEB05A7F82E0}" type="presOf" srcId="{95F2FF84-D28D-407B-B8FE-2B372DF9BA0B}" destId="{3DDC2BFA-D029-4FC9-9AF9-77E14E16B3E5}" srcOrd="1" destOrd="0" presId="urn:microsoft.com/office/officeart/2005/8/layout/hierarchy5"/>
+    <dgm:cxn modelId="{273F63B2-8DE0-49D4-8497-2C2D234AB41E}" srcId="{1CD9DD62-71D1-4AB4-9004-F666B647DCD2}" destId="{41D672BA-A028-4F21-B333-39B59A298DBB}" srcOrd="3" destOrd="0" parTransId="{0E118067-7F21-4A41-BA06-2435888BEEEC}" sibTransId="{920E3749-EDE6-4714-BDF7-ECD1F33D7B66}"/>
+    <dgm:cxn modelId="{54995DFB-E48B-4A34-890E-C9EEF671B795}" type="presOf" srcId="{F426891C-863F-4A09-A7E9-FC50DCF1E151}" destId="{F8E7612B-DC34-4E03-96F7-7220E78E762A}" srcOrd="0" destOrd="0" presId="urn:microsoft.com/office/officeart/2005/8/layout/hierarchy5"/>
+    <dgm:cxn modelId="{0E798F92-F32A-4650-BBB3-00EFFF4555AA}" type="presOf" srcId="{58F416B4-4AFA-4C6A-9B3B-A1FF9F489D17}" destId="{E307016A-E994-4E84-987B-8E3D6D020213}" srcOrd="0" destOrd="0" presId="urn:microsoft.com/office/officeart/2005/8/layout/hierarchy5"/>
+    <dgm:cxn modelId="{D36D68F5-B3FC-4E02-8EB4-95F0269E16FA}" type="presOf" srcId="{A502BECD-C25C-46DD-998E-BBE3539A2279}" destId="{30D776E8-77C7-481D-8E73-51D329C63D57}" srcOrd="0" destOrd="0" presId="urn:microsoft.com/office/officeart/2005/8/layout/hierarchy5"/>
+    <dgm:cxn modelId="{0D4A46F9-FA03-4043-AD14-81CC3DCABFE4}" type="presOf" srcId="{AA6E28E9-08E4-4159-B4FD-19CE09705769}" destId="{96F733B4-71CF-4F60-B4BF-457F41FD9E8A}" srcOrd="0" destOrd="0" presId="urn:microsoft.com/office/officeart/2005/8/layout/hierarchy5"/>
+    <dgm:cxn modelId="{FF46CC2F-52F3-43C2-B536-9226A94E7954}" type="presOf" srcId="{F7F9063E-316E-4ACB-A092-745B51571572}" destId="{B2B7C2BE-DB6B-4286-9AF2-0464FB7146DD}" srcOrd="1" destOrd="0" presId="urn:microsoft.com/office/officeart/2005/8/layout/hierarchy5"/>
+    <dgm:cxn modelId="{67AAC91D-372E-41B6-AE78-199F7972761C}" type="presOf" srcId="{AAA0BB42-E0CA-4855-A47A-DAD9CD3E6AC7}" destId="{9C27FF12-1874-4BFC-8976-392ECF8E121C}" srcOrd="0" destOrd="0" presId="urn:microsoft.com/office/officeart/2005/8/layout/hierarchy5"/>
+    <dgm:cxn modelId="{87EAFED4-B84D-4A33-9C94-405EE12D71AA}" type="presOf" srcId="{7834B861-A087-47BB-BBBC-65BA175C7835}" destId="{1838C9BB-060F-4B9F-8DD7-45F28FC4E293}" srcOrd="0" destOrd="0" presId="urn:microsoft.com/office/officeart/2005/8/layout/hierarchy5"/>
+    <dgm:cxn modelId="{EF365414-ED4F-4ABA-8D88-57D6663C2800}" type="presOf" srcId="{6B6BB9DE-F38D-4E54-9E28-CC69F328C37F}" destId="{4BBC361B-46A0-4451-9EAF-CC8B52B275D1}" srcOrd="1" destOrd="0" presId="urn:microsoft.com/office/officeart/2005/8/layout/hierarchy5"/>
+    <dgm:cxn modelId="{30FA8037-3E40-469C-94EB-E1062C27ECEE}" type="presOf" srcId="{CE6C6459-7675-4D52-9520-93731C259E25}" destId="{60DED693-263F-4E40-9025-DEEE2B4072C5}" srcOrd="0" destOrd="0" presId="urn:microsoft.com/office/officeart/2005/8/layout/hierarchy5"/>
+    <dgm:cxn modelId="{15754237-1BA8-49B8-A427-5453469D10E5}" type="presOf" srcId="{B8BCA234-7558-4285-98DC-27C0A68632A0}" destId="{E1F725A6-2EDB-4001-A75E-CEEE0AAC9B17}" srcOrd="1" destOrd="0" presId="urn:microsoft.com/office/officeart/2005/8/layout/hierarchy5"/>
+    <dgm:cxn modelId="{4A2F8508-D217-4F8C-9727-48CE45D3D3FA}" type="presOf" srcId="{3BEFD10E-3FC3-40B4-9F94-725C61E140A6}" destId="{5B3DBCAE-487B-45C9-B557-F679B80AC45A}" srcOrd="1" destOrd="0" presId="urn:microsoft.com/office/officeart/2005/8/layout/hierarchy5"/>
+    <dgm:cxn modelId="{B4BCB597-FC7C-41BF-8B88-1C88AB397C01}" type="presOf" srcId="{41D672BA-A028-4F21-B333-39B59A298DBB}" destId="{99923E23-69ED-45E1-BBE4-696F2F170579}" srcOrd="1" destOrd="0" presId="urn:microsoft.com/office/officeart/2005/8/layout/hierarchy5"/>
+    <dgm:cxn modelId="{809024B3-535D-4AD3-BCF4-C307AD562A01}" type="presOf" srcId="{F17D0DD2-BF6D-4CBD-A713-53D9A18B0296}" destId="{D92946F3-3C10-44A8-8B33-4422A6016779}" srcOrd="0" destOrd="0" presId="urn:microsoft.com/office/officeart/2005/8/layout/hierarchy5"/>
+    <dgm:cxn modelId="{F7C0BFAD-6588-4C79-82BB-21B8C70D362C}" srcId="{E9B644CD-0AD6-4B2F-AE23-8D44A0D9533C}" destId="{A502BECD-C25C-46DD-998E-BBE3539A2279}" srcOrd="0" destOrd="0" parTransId="{81B61790-51E0-4BE6-82A9-4D5328232DF4}" sibTransId="{CFB6DABA-84D7-4B30-AE33-C378927045CF}"/>
+    <dgm:cxn modelId="{018FB897-4991-44A0-A22A-BAD65C42FC2E}" type="presOf" srcId="{908F626F-B516-4EEB-8541-81A1D2E50FE0}" destId="{83223A45-16DF-4293-BF3B-1A601CD6136D}" srcOrd="0" destOrd="0" presId="urn:microsoft.com/office/officeart/2005/8/layout/hierarchy5"/>
+    <dgm:cxn modelId="{A30E9E64-78F8-4802-BAB2-857D6265BFB7}" type="presOf" srcId="{0907BA1B-8C2C-46B2-8919-9D01FC1B262B}" destId="{520C6796-1E1A-460F-A9A0-68737CF1A106}" srcOrd="1" destOrd="0" presId="urn:microsoft.com/office/officeart/2005/8/layout/hierarchy5"/>
+    <dgm:cxn modelId="{DE91E85F-7EEB-4BA5-B5AA-429570AECD6C}" type="presOf" srcId="{95F2FF84-D28D-407B-B8FE-2B372DF9BA0B}" destId="{EA81110D-DF21-4D75-B998-280031555119}" srcOrd="0" destOrd="0" presId="urn:microsoft.com/office/officeart/2005/8/layout/hierarchy5"/>
+    <dgm:cxn modelId="{60B72EA9-E31D-4FB3-9DD3-B3522A0CF57D}" srcId="{1F3ABAE5-FE40-4625-B826-2497EF69ACB0}" destId="{F426891C-863F-4A09-A7E9-FC50DCF1E151}" srcOrd="0" destOrd="0" parTransId="{5170FC55-8CD2-4575-8664-FE1527F70A57}" sibTransId="{F5455AF1-9047-44FB-9955-03E6834F06D5}"/>
     <dgm:cxn modelId="{326EB761-3B8F-4946-A6C7-F7683FB48441}" type="presOf" srcId="{5F8BA5B6-A0FC-4E95-AA0E-7A970892ADC8}" destId="{7B822223-4FD0-4D13-9316-97E121718287}" srcOrd="1" destOrd="0" presId="urn:microsoft.com/office/officeart/2005/8/layout/hierarchy5"/>
-    <dgm:cxn modelId="{DE91E85F-7EEB-4BA5-B5AA-429570AECD6C}" type="presOf" srcId="{95F2FF84-D28D-407B-B8FE-2B372DF9BA0B}" destId="{EA81110D-DF21-4D75-B998-280031555119}" srcOrd="0" destOrd="0" presId="urn:microsoft.com/office/officeart/2005/8/layout/hierarchy5"/>
+    <dgm:cxn modelId="{984FF9E0-07D8-4B3A-B039-266DEF3F4A2C}" type="presOf" srcId="{3AA4DD33-29A4-49A2-B812-06861A367F30}" destId="{F55CDB21-B25A-44E2-AC27-A62E893257EA}" srcOrd="0" destOrd="0" presId="urn:microsoft.com/office/officeart/2005/8/layout/hierarchy5"/>
+    <dgm:cxn modelId="{4A0FBF2D-FDF5-40D5-B4AB-F47C4664B14C}" type="presOf" srcId="{34792C18-4B61-4DEA-BB2F-CD4D5C94BF59}" destId="{BCD01B47-E752-43DC-9204-4662C4A964FE}" srcOrd="0" destOrd="0" presId="urn:microsoft.com/office/officeart/2005/8/layout/hierarchy5"/>
+    <dgm:cxn modelId="{FFC0D9B8-0BD0-4CE7-8B7A-60560E3E4532}" type="presOf" srcId="{545E3727-7DFE-429D-814A-6CF01E080B31}" destId="{8FC05931-54A7-429E-A4A9-9A249A4A90D3}" srcOrd="0" destOrd="0" presId="urn:microsoft.com/office/officeart/2005/8/layout/hierarchy5"/>
+    <dgm:cxn modelId="{84858702-D80E-4B81-AE4F-CAF550B3BF64}" type="presOf" srcId="{1EDF341C-890A-47D0-904A-D3359101FE57}" destId="{30B02AC4-22E2-4BFD-9FB9-3EAED9A765A5}" srcOrd="0" destOrd="0" presId="urn:microsoft.com/office/officeart/2005/8/layout/hierarchy5"/>
+    <dgm:cxn modelId="{42AEAD66-8657-44B3-8846-FF871ABA5A72}" srcId="{FD200CDD-3708-42B4-9412-BC6BC10F780F}" destId="{B6E81698-9A9A-4953-8EB0-57FCFFD6CBBB}" srcOrd="0" destOrd="0" parTransId="{F7F9063E-316E-4ACB-A092-745B51571572}" sibTransId="{605FFBE0-350A-415F-A827-12966FD05AAA}"/>
+    <dgm:cxn modelId="{95E03E6B-F1E8-4EC0-9CE0-9F08C25B446D}" type="presOf" srcId="{7D08F0DB-94FA-4A95-AE75-B80FC8240301}" destId="{229CD80C-330D-4DAC-A3C1-59B6C682DAE6}" srcOrd="0" destOrd="0" presId="urn:microsoft.com/office/officeart/2005/8/layout/hierarchy5"/>
+    <dgm:cxn modelId="{4BAD174D-D0EF-4AAD-9E82-483D00688906}" type="presOf" srcId="{5F8BA5B6-A0FC-4E95-AA0E-7A970892ADC8}" destId="{0A2EE00C-43D2-4C8E-95E3-84F11AA1CC90}" srcOrd="0" destOrd="0" presId="urn:microsoft.com/office/officeart/2005/8/layout/hierarchy5"/>
+    <dgm:cxn modelId="{5FB0775D-F7CA-45D0-87F9-BCCBA4B0EDB8}" type="presOf" srcId="{34792C18-4B61-4DEA-BB2F-CD4D5C94BF59}" destId="{E7CD4DCE-4196-41DD-886C-7F2EEA6B02AF}" srcOrd="1" destOrd="0" presId="urn:microsoft.com/office/officeart/2005/8/layout/hierarchy5"/>
+    <dgm:cxn modelId="{FEC7ADC7-D455-4A20-AE16-D16FA59241D9}" type="presOf" srcId="{BC2138B6-2437-495E-8A8E-A6D94EFDEB17}" destId="{B22F18DC-87CE-4AED-B450-0239C096CB00}" srcOrd="0" destOrd="0" presId="urn:microsoft.com/office/officeart/2005/8/layout/hierarchy5"/>
+    <dgm:cxn modelId="{79A95EFD-E348-4F8D-91CE-48A3EC8924EB}" srcId="{7D08F0DB-94FA-4A95-AE75-B80FC8240301}" destId="{1F3ABAE5-FE40-4625-B826-2497EF69ACB0}" srcOrd="0" destOrd="0" parTransId="{607BEA54-06A3-4744-8D8D-95019B9FFFE8}" sibTransId="{DB4BC700-CFDF-4BC9-B327-37F470167C5B}"/>
+    <dgm:cxn modelId="{923ABBAA-84C7-49E6-BDB4-01C61BC91387}" type="presOf" srcId="{1834AC4E-85AB-49FF-B573-A4707299E0E7}" destId="{99C06FA2-59E4-4652-9628-1AE4948833D7}" srcOrd="0" destOrd="0" presId="urn:microsoft.com/office/officeart/2005/8/layout/hierarchy5"/>
+    <dgm:cxn modelId="{21F0DC6A-8B30-4E83-8168-A06A2F0B243A}" srcId="{1CD9DD62-71D1-4AB4-9004-F666B647DCD2}" destId="{7834B861-A087-47BB-BBBC-65BA175C7835}" srcOrd="5" destOrd="0" parTransId="{7E251BF3-1E0A-4EB0-92F1-0328E594CAF7}" sibTransId="{81A6E98E-5065-47C8-A92F-D9ADE1390B73}"/>
+    <dgm:cxn modelId="{637F21F0-6824-432B-BD76-169505A0F0E9}" type="presOf" srcId="{07FAF939-5C4F-416F-85AB-52C73C46EA08}" destId="{73814760-7A80-4BEE-8DB6-6EC494F8B42A}" srcOrd="0" destOrd="0" presId="urn:microsoft.com/office/officeart/2005/8/layout/hierarchy5"/>
+    <dgm:cxn modelId="{BF5182AA-5CEA-4EA9-88E4-B94574A7DD13}" type="presOf" srcId="{607BEA54-06A3-4744-8D8D-95019B9FFFE8}" destId="{575743D4-45E3-4259-B33C-B53FA5903ACF}" srcOrd="1" destOrd="0" presId="urn:microsoft.com/office/officeart/2005/8/layout/hierarchy5"/>
+    <dgm:cxn modelId="{28E80D77-EAF1-4824-AB50-0BA7A0174F36}" srcId="{D0B55527-58A5-453A-AAC9-E7454914D72A}" destId="{3AA4DD33-29A4-49A2-B812-06861A367F30}" srcOrd="0" destOrd="0" parTransId="{3BEFD10E-3FC3-40B4-9F94-725C61E140A6}" sibTransId="{54873295-23A7-4CED-9DCB-18E65CD4BA37}"/>
+    <dgm:cxn modelId="{1212B0FE-83F6-4575-9835-7DC550197E40}" type="presOf" srcId="{74B15A58-032C-46CF-B5FE-463EE477385D}" destId="{28E57BF7-BA7E-4AFE-A671-CFC047D7FCC6}" srcOrd="0" destOrd="0" presId="urn:microsoft.com/office/officeart/2005/8/layout/hierarchy5"/>
+    <dgm:cxn modelId="{15DAB7B0-2396-4BAE-B003-C5F7B9B2FBE7}" type="presOf" srcId="{81B61790-51E0-4BE6-82A9-4D5328232DF4}" destId="{458D0804-25FD-4A67-88D8-B0E9E8A08FED}" srcOrd="1" destOrd="0" presId="urn:microsoft.com/office/officeart/2005/8/layout/hierarchy5"/>
+    <dgm:cxn modelId="{A4C581A1-919E-447B-9CBF-BAF2C105583C}" srcId="{A5F1D9FE-94AE-4D9D-8104-127130754F38}" destId="{DA6FA8C2-A357-4386-BF3C-EC6C7ED88816}" srcOrd="0" destOrd="0" parTransId="{AA6E28E9-08E4-4159-B4FD-19CE09705769}" sibTransId="{FBACBC3E-1C80-4F18-8487-9AA0FC70B6DA}"/>
+    <dgm:cxn modelId="{CCCAE1F5-AE8E-4690-8D31-2D20F9A2B3D6}" type="presOf" srcId="{F9140787-06FE-4EBE-A4EB-0CB65F2D6A1B}" destId="{D083E61F-555D-4A96-8A77-3691E3DAB520}" srcOrd="0" destOrd="0" presId="urn:microsoft.com/office/officeart/2005/8/layout/hierarchy5"/>
+    <dgm:cxn modelId="{064DDFCA-79BD-4998-859E-95187A55724A}" type="presOf" srcId="{5170FC55-8CD2-4575-8664-FE1527F70A57}" destId="{AFB25989-E67A-44A6-AFF4-E96E26E3C9DD}" srcOrd="1" destOrd="0" presId="urn:microsoft.com/office/officeart/2005/8/layout/hierarchy5"/>
+    <dgm:cxn modelId="{7F542CD7-FAA7-4710-930E-C58BF7601898}" type="presOf" srcId="{2D4BCDE3-0492-4071-8698-EF997550D916}" destId="{C08AD4DC-4EEE-4327-8D4E-4150C94BBD0E}" srcOrd="0" destOrd="0" presId="urn:microsoft.com/office/officeart/2005/8/layout/hierarchy5"/>
+    <dgm:cxn modelId="{4010B087-8DBC-4776-A6B7-87202ED533DE}" type="presOf" srcId="{1F3ABAE5-FE40-4625-B826-2497EF69ACB0}" destId="{DDB88BFF-D45A-4708-B1D6-9985179F7DBD}" srcOrd="0" destOrd="0" presId="urn:microsoft.com/office/officeart/2005/8/layout/hierarchy5"/>
+    <dgm:cxn modelId="{09353899-B260-444B-9A13-4897C89D04C6}" srcId="{2D4BCDE3-0492-4071-8698-EF997550D916}" destId="{32B53F96-582F-49BE-A2E1-81FCE3D8DEDC}" srcOrd="0" destOrd="0" parTransId="{FFDBC1C7-A7C8-4E99-A5A3-8B54E332C334}" sibTransId="{D6912F17-8FE3-45FB-9E29-3AB56206B9E3}"/>
+    <dgm:cxn modelId="{4338A8F5-1855-4967-9959-958B7C519A88}" type="presOf" srcId="{5170FC55-8CD2-4575-8664-FE1527F70A57}" destId="{C85981BA-B3EC-4E1E-B5CC-4C957248A8F4}" srcOrd="0" destOrd="0" presId="urn:microsoft.com/office/officeart/2005/8/layout/hierarchy5"/>
+    <dgm:cxn modelId="{E0BA3EDD-0CBA-46DE-A236-8322EAB1AEA0}" srcId="{730F001D-F4A5-4EB0-8D88-B5C40674D694}" destId="{77A54F8E-465A-4740-AB8E-FEB7A432FB77}" srcOrd="0" destOrd="0" parTransId="{9682CD7E-E678-44BD-9EBA-E4B8EFCC0DA8}" sibTransId="{9C54FE50-7582-4C66-8037-1767C1B32DB4}"/>
+    <dgm:cxn modelId="{7DE82AA1-31D1-402F-B301-20E761C8C96B}" type="presOf" srcId="{E10EE0F9-B5B9-4DEE-812B-2DBDC2ACA83A}" destId="{DA5E3BEE-FFBB-4462-BCA2-B5CD6BEA797F}" srcOrd="0" destOrd="0" presId="urn:microsoft.com/office/officeart/2005/8/layout/hierarchy5"/>
+    <dgm:cxn modelId="{FA90D049-7912-40BC-8079-9DC1311F5CBB}" srcId="{DA6FA8C2-A357-4386-BF3C-EC6C7ED88816}" destId="{07FAF939-5C4F-416F-85AB-52C73C46EA08}" srcOrd="0" destOrd="0" parTransId="{1EDF341C-890A-47D0-904A-D3359101FE57}" sibTransId="{3EE00E86-F56F-44B3-930E-6636AA61935A}"/>
+    <dgm:cxn modelId="{9C1C473F-A36C-4689-B685-857169970B9A}" type="presOf" srcId="{B5DEF538-F16F-487A-9CF1-DF79331A26C1}" destId="{F5C90689-0D93-4983-824F-43F8C0C1014C}" srcOrd="0" destOrd="0" presId="urn:microsoft.com/office/officeart/2005/8/layout/hierarchy5"/>
+    <dgm:cxn modelId="{54474368-6DC0-4569-B719-E6153ADB7AED}" type="presOf" srcId="{9682CD7E-E678-44BD-9EBA-E4B8EFCC0DA8}" destId="{3BB25170-7867-49C5-96A3-2C6046FBCACA}" srcOrd="1" destOrd="0" presId="urn:microsoft.com/office/officeart/2005/8/layout/hierarchy5"/>
+    <dgm:cxn modelId="{FE6687A7-8731-4B45-AE3F-3E116274DF52}" type="presOf" srcId="{A3DB99DA-5742-4A54-9A93-4DE079D5FBA8}" destId="{491E9DA6-DF96-4E0F-A533-FF77FC9B1ED6}" srcOrd="0" destOrd="0" presId="urn:microsoft.com/office/officeart/2005/8/layout/hierarchy5"/>
+    <dgm:cxn modelId="{570815A3-3C18-4050-8603-C308A7D544DD}" type="presOf" srcId="{DC2CBB48-DF3A-4C5E-BDF6-ABC816F5C797}" destId="{73DD586C-FC46-4E6F-81D5-8ECB45DE8E57}" srcOrd="1" destOrd="0" presId="urn:microsoft.com/office/officeart/2005/8/layout/hierarchy5"/>
+    <dgm:cxn modelId="{450810F9-5BCD-429D-AD50-2FD3177BF64B}" type="presOf" srcId="{AAA0BB42-E0CA-4855-A47A-DAD9CD3E6AC7}" destId="{1F97F4B3-4707-447E-92A7-16B79223936D}" srcOrd="1" destOrd="0" presId="urn:microsoft.com/office/officeart/2005/8/layout/hierarchy5"/>
+    <dgm:cxn modelId="{DEAC65B4-B722-401F-AA2F-F065B3B615F1}" type="presOf" srcId="{32B53F96-582F-49BE-A2E1-81FCE3D8DEDC}" destId="{1CEED02B-3985-45DB-A3AA-5129BDAA9D03}" srcOrd="0" destOrd="0" presId="urn:microsoft.com/office/officeart/2005/8/layout/hierarchy5"/>
+    <dgm:cxn modelId="{DE44CE27-CC1D-4802-A31C-349D1C5986DC}" srcId="{3AA4DD33-29A4-49A2-B812-06861A367F30}" destId="{C6751658-C61A-4CFD-8EFE-23D6286459AC}" srcOrd="1" destOrd="0" parTransId="{9427EDE2-FA6C-44D5-BE12-8F55AB4D4442}" sibTransId="{2DFD55CC-C3A5-4A5A-AC56-0663C310FBCC}"/>
+    <dgm:cxn modelId="{EFB99E9B-3FFE-406A-8763-9F39445C6D18}" srcId="{7D08F0DB-94FA-4A95-AE75-B80FC8240301}" destId="{F17D0DD2-BF6D-4CBD-A713-53D9A18B0296}" srcOrd="1" destOrd="0" parTransId="{64665E1A-AFF0-43DA-B18D-D3AF74A28B79}" sibTransId="{4450360C-C8D2-40C9-AA8D-B4D09051EAA6}"/>
+    <dgm:cxn modelId="{A1FCEC67-EF8A-4B52-BF05-F19F1972E403}" type="presOf" srcId="{0D687C51-502C-48CF-8DFA-4574BB7E0BDC}" destId="{D2D24B57-3EB3-47CA-886C-D78BDDBD6616}" srcOrd="0" destOrd="0" presId="urn:microsoft.com/office/officeart/2005/8/layout/hierarchy5"/>
+    <dgm:cxn modelId="{499628AD-21B8-496B-B479-5567619496B5}" srcId="{CE6C6459-7675-4D52-9520-93731C259E25}" destId="{A5F1D9FE-94AE-4D9D-8104-127130754F38}" srcOrd="0" destOrd="0" parTransId="{AAA0BB42-E0CA-4855-A47A-DAD9CD3E6AC7}" sibTransId="{68B45EC6-D31D-4F3B-92F8-2C575F12BC24}"/>
+    <dgm:cxn modelId="{5C0F6086-2E50-4F13-9F5F-B97D1BF4FEDD}" srcId="{DA6FA8C2-A357-4386-BF3C-EC6C7ED88816}" destId="{2156149C-D277-4817-9274-0223F9EC0341}" srcOrd="1" destOrd="0" parTransId="{91D44572-66D0-4F1C-B83C-19F5E3B96CD1}" sibTransId="{06FB15C4-2BB1-44E1-BDAB-C99173B7B556}"/>
+    <dgm:cxn modelId="{3A1D86C2-7C2C-410C-8FA1-CA743D4ECEB6}" type="presOf" srcId="{07A62DD5-DEA2-483C-A892-96C00C737FBA}" destId="{6AC56556-8368-4903-BC0E-4F6CBBCF053A}" srcOrd="0" destOrd="0" presId="urn:microsoft.com/office/officeart/2005/8/layout/hierarchy5"/>
+    <dgm:cxn modelId="{19528FD5-9E97-4FCB-A66A-C7D3219B9017}" type="presOf" srcId="{D743D934-A151-4033-85EE-03A8AD73236D}" destId="{86B6B845-5675-4A08-81FA-73B842A94138}" srcOrd="0" destOrd="0" presId="urn:microsoft.com/office/officeart/2005/8/layout/hierarchy5"/>
     <dgm:cxn modelId="{D06C2223-3F80-45A6-8D1C-30B3BF7E7E80}" type="presOf" srcId="{9682CD7E-E678-44BD-9EBA-E4B8EFCC0DA8}" destId="{4B600412-712E-4383-997C-706DB44D18A6}" srcOrd="0" destOrd="0" presId="urn:microsoft.com/office/officeart/2005/8/layout/hierarchy5"/>
+    <dgm:cxn modelId="{5493DA63-1E41-40E4-B500-3C3D3E237E5F}" type="presOf" srcId="{0907BA1B-8C2C-46B2-8919-9D01FC1B262B}" destId="{51C38623-ECAC-43E7-87A7-872FA8331AB6}" srcOrd="0" destOrd="0" presId="urn:microsoft.com/office/officeart/2005/8/layout/hierarchy5"/>
+    <dgm:cxn modelId="{6B9CB254-5B49-4F46-922D-8CD0A2020AE2}" type="presOf" srcId="{DC2CBB48-DF3A-4C5E-BDF6-ABC816F5C797}" destId="{0ED429C1-77E8-4FA4-A21E-DF5C246FD072}" srcOrd="0" destOrd="0" presId="urn:microsoft.com/office/officeart/2005/8/layout/hierarchy5"/>
+    <dgm:cxn modelId="{07ADD566-1F38-428C-BCE3-7D4411D6BC15}" type="presOf" srcId="{77A54F8E-465A-4740-AB8E-FEB7A432FB77}" destId="{C53D64E5-754C-4B3E-96B6-051D1710BB21}" srcOrd="0" destOrd="0" presId="urn:microsoft.com/office/officeart/2005/8/layout/hierarchy5"/>
+    <dgm:cxn modelId="{BAAA3875-DF6B-4866-9C6C-79E86F96B476}" type="presOf" srcId="{91D44572-66D0-4F1C-B83C-19F5E3B96CD1}" destId="{1831245D-153F-4759-9E75-ED192268B367}" srcOrd="0" destOrd="0" presId="urn:microsoft.com/office/officeart/2005/8/layout/hierarchy5"/>
+    <dgm:cxn modelId="{BA02EFC0-5B96-4A6A-9645-8BADAB7DCE09}" type="presOf" srcId="{2DB01136-9D02-44C3-8D30-151451BED77A}" destId="{F3538FEE-6D80-44FB-A6F9-4CD03EA1E756}" srcOrd="0" destOrd="0" presId="urn:microsoft.com/office/officeart/2005/8/layout/hierarchy5"/>
+    <dgm:cxn modelId="{0CDC7DA6-5BE2-43D4-87F0-C41F5C22C6DD}" srcId="{1A1E021E-DEDB-4DC8-914D-3CC33BF64070}" destId="{908F626F-B516-4EEB-8541-81A1D2E50FE0}" srcOrd="1" destOrd="0" parTransId="{F6FB4C32-4A0B-4C24-BA0C-C1D83A64476F}" sibTransId="{1384C94D-8589-4D35-B651-3CC4E1B00111}"/>
+    <dgm:cxn modelId="{E97CAE79-671C-4170-BA0F-C59D13CF649F}" type="presOf" srcId="{BC2138B6-2437-495E-8A8E-A6D94EFDEB17}" destId="{CD4E2D1D-2803-4866-8244-D42D0E2B7384}" srcOrd="1" destOrd="0" presId="urn:microsoft.com/office/officeart/2005/8/layout/hierarchy5"/>
+    <dgm:cxn modelId="{940AC9CD-D293-4280-87D7-DB4AA3752FBD}" type="presOf" srcId="{FD200CDD-3708-42B4-9412-BC6BC10F780F}" destId="{B2A9F8A5-DA6A-49A2-AC91-D8136DF75C35}" srcOrd="0" destOrd="0" presId="urn:microsoft.com/office/officeart/2005/8/layout/hierarchy5"/>
+    <dgm:cxn modelId="{B8DBC284-431B-4A34-A763-3960B70F15A3}" type="presOf" srcId="{41D672BA-A028-4F21-B333-39B59A298DBB}" destId="{626C1EBD-00F3-4EF0-A61E-6B9B11E3B8AB}" srcOrd="0" destOrd="0" presId="urn:microsoft.com/office/officeart/2005/8/layout/hierarchy5"/>
+    <dgm:cxn modelId="{C18CF4EF-1B13-49A9-988F-3241EE6AA144}" type="presOf" srcId="{E9B644CD-0AD6-4B2F-AE23-8D44A0D9533C}" destId="{9AF4B254-F425-4BA4-89A6-37C9E0B347F8}" srcOrd="0" destOrd="0" presId="urn:microsoft.com/office/officeart/2005/8/layout/hierarchy5"/>
+    <dgm:cxn modelId="{66536165-5850-4A79-9D8B-BD52C0833C19}" type="presOf" srcId="{9427EDE2-FA6C-44D5-BE12-8F55AB4D4442}" destId="{01122377-BF51-432C-B5BD-D9659081A77A}" srcOrd="0" destOrd="0" presId="urn:microsoft.com/office/officeart/2005/8/layout/hierarchy5"/>
+    <dgm:cxn modelId="{9D63E75B-AE28-4D1C-9E4F-B5A08E18E946}" type="presOf" srcId="{0A702134-785B-48E8-A677-613364C9D50E}" destId="{80B81E04-174D-45C2-86AF-F63D1F112A73}" srcOrd="0" destOrd="0" presId="urn:microsoft.com/office/officeart/2005/8/layout/hierarchy5"/>
+    <dgm:cxn modelId="{930F809C-586B-4A8A-9ED4-73BAF1C26049}" type="presOf" srcId="{6B6BB9DE-F38D-4E54-9E28-CC69F328C37F}" destId="{1B604072-CA25-4129-8EB6-D106EE75C333}" srcOrd="0" destOrd="0" presId="urn:microsoft.com/office/officeart/2005/8/layout/hierarchy5"/>
+    <dgm:cxn modelId="{67A6341B-80C3-4082-ACA0-0C878EE9DF50}" type="presOf" srcId="{1A1E021E-DEDB-4DC8-914D-3CC33BF64070}" destId="{05EE9D51-936F-4809-8516-A05D1D6DB641}" srcOrd="0" destOrd="0" presId="urn:microsoft.com/office/officeart/2005/8/layout/hierarchy5"/>
+    <dgm:cxn modelId="{6EC0E6BF-3CC9-44AA-B34C-062767EE3379}" srcId="{2D4BCDE3-0492-4071-8698-EF997550D916}" destId="{1834AC4E-85AB-49FF-B573-A4707299E0E7}" srcOrd="1" destOrd="0" parTransId="{D743D934-A151-4033-85EE-03A8AD73236D}" sibTransId="{52C0C978-BDE3-4465-9909-1AA5689BA8BD}"/>
+    <dgm:cxn modelId="{EC7EA44F-608E-459F-91E5-ED286C4694C2}" type="presOf" srcId="{FFDBC1C7-A7C8-4E99-A5A3-8B54E332C334}" destId="{447F965F-96E9-40DC-834F-E91AA721F862}" srcOrd="0" destOrd="0" presId="urn:microsoft.com/office/officeart/2005/8/layout/hierarchy5"/>
+    <dgm:cxn modelId="{90318B68-7914-47B4-A766-45A73BD718AA}" srcId="{CE6C6459-7675-4D52-9520-93731C259E25}" destId="{D0B55527-58A5-453A-AAC9-E7454914D72A}" srcOrd="1" destOrd="0" parTransId="{E10EE0F9-B5B9-4DEE-812B-2DBDC2ACA83A}" sibTransId="{28EF489E-8100-4B50-B34B-FEDAB4431C82}"/>
+    <dgm:cxn modelId="{22334715-DBC6-4DFD-8958-141CCB34EFF6}" type="presOf" srcId="{07A62DD5-DEA2-483C-A892-96C00C737FBA}" destId="{B8B4F77C-1B6D-4BFF-9A87-B27ABF25ACED}" srcOrd="1" destOrd="0" presId="urn:microsoft.com/office/officeart/2005/8/layout/hierarchy5"/>
+    <dgm:cxn modelId="{255D30BC-FC84-48DC-93A2-370D6F2292DE}" type="presOf" srcId="{AA6E28E9-08E4-4159-B4FD-19CE09705769}" destId="{D515642A-D0FF-484D-B2AC-2A387BF0D6BB}" srcOrd="1" destOrd="0" presId="urn:microsoft.com/office/officeart/2005/8/layout/hierarchy5"/>
+    <dgm:cxn modelId="{44AFB108-F6F3-45BC-8F5E-E6BAF1CFF73B}" srcId="{1A1E021E-DEDB-4DC8-914D-3CC33BF64070}" destId="{2DB01136-9D02-44C3-8D30-151451BED77A}" srcOrd="0" destOrd="0" parTransId="{0907BA1B-8C2C-46B2-8919-9D01FC1B262B}" sibTransId="{528F1096-9DDD-4775-A3CF-FA1E95D167DA}"/>
+    <dgm:cxn modelId="{D9E25721-1AFB-46F1-9DEB-8CF969B0F007}" type="presOf" srcId="{0A702134-785B-48E8-A677-613364C9D50E}" destId="{FB4FC79E-E391-4D90-AB94-B0B9BDA3497A}" srcOrd="1" destOrd="0" presId="urn:microsoft.com/office/officeart/2005/8/layout/hierarchy5"/>
+    <dgm:cxn modelId="{6290C773-81F5-4171-9C80-E6B5497B44F8}" type="presOf" srcId="{21018797-09B0-43BC-990E-D2C4363A13E3}" destId="{EC4146AA-9375-444B-9B4A-A54C2C08C7E2}" srcOrd="0" destOrd="0" presId="urn:microsoft.com/office/officeart/2005/8/layout/hierarchy5"/>
+    <dgm:cxn modelId="{63B6E2B6-5CD4-458B-AF5B-113F9CEDE4C1}" type="presOf" srcId="{DA6FA8C2-A357-4386-BF3C-EC6C7ED88816}" destId="{FA718ACE-803C-43D0-A3FF-A49775772DF0}" srcOrd="0" destOrd="0" presId="urn:microsoft.com/office/officeart/2005/8/layout/hierarchy5"/>
+    <dgm:cxn modelId="{2F11473F-056C-4DEC-B448-B1D67E65FF6B}" srcId="{A5F1D9FE-94AE-4D9D-8104-127130754F38}" destId="{730F001D-F4A5-4EB0-8D88-B5C40674D694}" srcOrd="1" destOrd="0" parTransId="{21018797-09B0-43BC-990E-D2C4363A13E3}" sibTransId="{B847B0FF-42AF-4282-99C4-FA18AC812828}"/>
+    <dgm:cxn modelId="{215755E8-5202-42D8-BBD5-BF8CF4CFBD0C}" type="presOf" srcId="{3703CCF6-A05B-4A59-8A37-C9334B8CE4EA}" destId="{2CB77F7F-41D2-414F-BFAD-9CE9D858E357}" srcOrd="0" destOrd="0" presId="urn:microsoft.com/office/officeart/2005/8/layout/hierarchy5"/>
+    <dgm:cxn modelId="{695F59BA-CD9C-491A-9788-9594F6CAA788}" type="presOf" srcId="{C6751658-C61A-4CFD-8EFE-23D6286459AC}" destId="{552AC263-5454-4740-9492-B8399C4724E1}" srcOrd="0" destOrd="0" presId="urn:microsoft.com/office/officeart/2005/8/layout/hierarchy5"/>
+    <dgm:cxn modelId="{976FB3F1-6C80-43D3-AADB-D879499CA429}" srcId="{F17D0DD2-BF6D-4CBD-A713-53D9A18B0296}" destId="{1A1E021E-DEDB-4DC8-914D-3CC33BF64070}" srcOrd="0" destOrd="0" parTransId="{5F8BA5B6-A0FC-4E95-AA0E-7A970892ADC8}" sibTransId="{326E1A0A-BBCE-42D0-9FFC-1E0BB4074673}"/>
+    <dgm:cxn modelId="{9FA1F8C5-957C-417F-A7C0-EF0B4C98E228}" srcId="{F426891C-863F-4A09-A7E9-FC50DCF1E151}" destId="{545E3727-7DFE-429D-814A-6CF01E080B31}" srcOrd="1" destOrd="0" parTransId="{34792C18-4B61-4DEA-BB2F-CD4D5C94BF59}" sibTransId="{3A5CE702-E999-4278-A7C8-FDCB1CF46B46}"/>
+    <dgm:cxn modelId="{6DB4259C-4BDE-421E-AEE0-7FD81CAAA083}" type="presOf" srcId="{2609CAE7-1E9B-4EA8-9580-6C6B40609156}" destId="{F49D0E06-532E-4A38-B17D-AA9F46ABFD20}" srcOrd="0" destOrd="0" presId="urn:microsoft.com/office/officeart/2005/8/layout/hierarchy5"/>
+    <dgm:cxn modelId="{54764657-162F-4EF3-BC92-55B34F61D3B8}" type="presOf" srcId="{E10EE0F9-B5B9-4DEE-812B-2DBDC2ACA83A}" destId="{F9452968-5195-4D30-A832-7742F8DB07AE}" srcOrd="1" destOrd="0" presId="urn:microsoft.com/office/officeart/2005/8/layout/hierarchy5"/>
+    <dgm:cxn modelId="{792A95BF-B138-42D8-8B71-8001D679AC7D}" type="presOf" srcId="{5DF021A5-51AC-4009-942E-DDDC0FEE0D9C}" destId="{A9BDF05C-259A-439E-A67A-BADD22FCFC0A}" srcOrd="1" destOrd="0" presId="urn:microsoft.com/office/officeart/2005/8/layout/hierarchy5"/>
+    <dgm:cxn modelId="{7967874C-5385-4E61-82CE-C63185D5A50C}" type="presOf" srcId="{81B61790-51E0-4BE6-82A9-4D5328232DF4}" destId="{9B3B63D5-9C25-4694-A396-678698445052}" srcOrd="0" destOrd="0" presId="urn:microsoft.com/office/officeart/2005/8/layout/hierarchy5"/>
+    <dgm:cxn modelId="{62EC1894-5BB5-4DA7-AD2E-C7BBDFBE08E6}" srcId="{3AA4DD33-29A4-49A2-B812-06861A367F30}" destId="{F9140787-06FE-4EBE-A4EB-0CB65F2D6A1B}" srcOrd="0" destOrd="0" parTransId="{3703CCF6-A05B-4A59-8A37-C9334B8CE4EA}" sibTransId="{43268F99-0228-4D21-BD78-EB6538024EF8}"/>
+    <dgm:cxn modelId="{6C653AA0-FEDC-4902-B0EC-648BAC65DEAD}" type="presOf" srcId="{64665E1A-AFF0-43DA-B18D-D3AF74A28B79}" destId="{8BFF3A73-F0C1-4E71-86E0-B4A468729C59}" srcOrd="1" destOrd="0" presId="urn:microsoft.com/office/officeart/2005/8/layout/hierarchy5"/>
+    <dgm:cxn modelId="{E4A32504-9155-4364-878C-B7BAD783F631}" type="presOf" srcId="{3D02AF21-A4C9-475D-983D-652A2500649B}" destId="{C720D4D6-A118-4D38-9C85-955D2FD4D117}" srcOrd="1" destOrd="0" presId="urn:microsoft.com/office/officeart/2005/8/layout/hierarchy5"/>
+    <dgm:cxn modelId="{C4E80C13-1F0E-4C0E-B9F7-77AB9D420873}" type="presOf" srcId="{5DF021A5-51AC-4009-942E-DDDC0FEE0D9C}" destId="{17839822-E48C-4AB1-8DFC-FB7798F4D700}" srcOrd="0" destOrd="0" presId="urn:microsoft.com/office/officeart/2005/8/layout/hierarchy5"/>
+    <dgm:cxn modelId="{3F34EA5F-7BED-4B1F-981E-51DC127E7D27}" type="presOf" srcId="{1EDF341C-890A-47D0-904A-D3359101FE57}" destId="{9B11BAB6-C5CF-4DE2-9660-1777DDC73FBC}" srcOrd="1" destOrd="0" presId="urn:microsoft.com/office/officeart/2005/8/layout/hierarchy5"/>
+    <dgm:cxn modelId="{37ABACD5-7AA5-4BAD-8A56-93C12008B453}" type="presOf" srcId="{D0B55527-58A5-453A-AAC9-E7454914D72A}" destId="{DAA02A32-98C7-4F72-8293-DB1D1E82BBF2}" srcOrd="0" destOrd="0" presId="urn:microsoft.com/office/officeart/2005/8/layout/hierarchy5"/>
+    <dgm:cxn modelId="{8A59AB2F-5C58-45D9-B519-223065BC0923}" type="presOf" srcId="{B6E81698-9A9A-4953-8EB0-57FCFFD6CBBB}" destId="{94C0F8F5-DDCF-4708-B2E0-BF92442436E9}" srcOrd="0" destOrd="0" presId="urn:microsoft.com/office/officeart/2005/8/layout/hierarchy5"/>
+    <dgm:cxn modelId="{8F8F50EE-2A52-439F-939B-6A06C2C03A59}" type="presOf" srcId="{21018797-09B0-43BC-990E-D2C4363A13E3}" destId="{6BE3305E-F05E-4807-B948-D6048E81DFB0}" srcOrd="1" destOrd="0" presId="urn:microsoft.com/office/officeart/2005/8/layout/hierarchy5"/>
+    <dgm:cxn modelId="{540B4114-3592-4FFD-B577-F65160126E8E}" type="presOf" srcId="{A5F1D9FE-94AE-4D9D-8104-127130754F38}" destId="{3CE3DBC4-EE13-42D3-BCE6-C6B2F278F807}" srcOrd="0" destOrd="0" presId="urn:microsoft.com/office/officeart/2005/8/layout/hierarchy5"/>
+    <dgm:cxn modelId="{EA9D19E5-F19D-4AD9-8FBD-82930D2BF3DA}" type="presOf" srcId="{F6FB4C32-4A0B-4C24-BA0C-C1D83A64476F}" destId="{D1CFFA0A-5F83-4099-95F2-AC364D7F0D31}" srcOrd="0" destOrd="0" presId="urn:microsoft.com/office/officeart/2005/8/layout/hierarchy5"/>
+    <dgm:cxn modelId="{1FD4D801-BF94-4F01-9A70-5A157BCF2E84}" type="presOf" srcId="{F6FB4C32-4A0B-4C24-BA0C-C1D83A64476F}" destId="{028BD7EB-482E-4AFC-AA1C-726DCF0DE4C3}" srcOrd="1" destOrd="0" presId="urn:microsoft.com/office/officeart/2005/8/layout/hierarchy5"/>
+    <dgm:cxn modelId="{363CA59A-FF57-4378-ABC0-95E15810D0FC}" srcId="{1CD9DD62-71D1-4AB4-9004-F666B647DCD2}" destId="{3D02AF21-A4C9-475D-983D-652A2500649B}" srcOrd="2" destOrd="0" parTransId="{5C925451-C102-44A7-A6FE-CEF1952E591B}" sibTransId="{C5007346-C7F7-415D-9987-87B2FFA7F1F1}"/>
+    <dgm:cxn modelId="{BD8C6555-5FD0-4F9B-BD83-C672BC20DF75}" type="presOf" srcId="{3703CCF6-A05B-4A59-8A37-C9334B8CE4EA}" destId="{B8C2E5A0-CC61-472F-B45F-8E1C02483554}" srcOrd="1" destOrd="0" presId="urn:microsoft.com/office/officeart/2005/8/layout/hierarchy5"/>
+    <dgm:cxn modelId="{9674C647-4703-4D23-BF09-D1D0C3EEDF20}" srcId="{1F3ABAE5-FE40-4625-B826-2497EF69ACB0}" destId="{E9B644CD-0AD6-4B2F-AE23-8D44A0D9533C}" srcOrd="1" destOrd="0" parTransId="{A3DB99DA-5742-4A54-9A93-4DE079D5FBA8}" sibTransId="{28874741-DC46-4A04-9A96-DBDC920255E2}"/>
+    <dgm:cxn modelId="{FFCC0547-4154-43BC-8BFB-A7F45A629EDF}" type="presOf" srcId="{91D44572-66D0-4F1C-B83C-19F5E3B96CD1}" destId="{A46AD2AE-069B-49D6-95A1-82BE1C0C859C}" srcOrd="1" destOrd="0" presId="urn:microsoft.com/office/officeart/2005/8/layout/hierarchy5"/>
+    <dgm:cxn modelId="{2BE1B7C8-7C78-4DEA-ABF6-3718A117F6A8}" type="presOf" srcId="{730F001D-F4A5-4EB0-8D88-B5C40674D694}" destId="{9723A4E8-C293-44A7-8D1D-72F3C79538E8}" srcOrd="0" destOrd="0" presId="urn:microsoft.com/office/officeart/2005/8/layout/hierarchy5"/>
+    <dgm:cxn modelId="{1ECB6473-C7B9-4DDB-8E6D-FF67F7A89881}" type="presOf" srcId="{FFDBC1C7-A7C8-4E99-A5A3-8B54E332C334}" destId="{FF361F37-CE33-40F3-B237-A7D24026C6E6}" srcOrd="1" destOrd="0" presId="urn:microsoft.com/office/officeart/2005/8/layout/hierarchy5"/>
+    <dgm:cxn modelId="{28EDF33C-1D20-44E1-978E-0653A617C528}" srcId="{E9B644CD-0AD6-4B2F-AE23-8D44A0D9533C}" destId="{74B15A58-032C-46CF-B5FE-463EE477385D}" srcOrd="1" destOrd="0" parTransId="{95F2FF84-D28D-407B-B8FE-2B372DF9BA0B}" sibTransId="{A59CC78B-BFA7-484E-B62E-D7EEC8249C44}"/>
+    <dgm:cxn modelId="{47FC4AFB-4EB1-41CF-9F90-14B6397AD838}" type="presOf" srcId="{7834B861-A087-47BB-BBBC-65BA175C7835}" destId="{4B13F10F-BC66-4B11-8803-C4AD232DED7F}" srcOrd="1" destOrd="0" presId="urn:microsoft.com/office/officeart/2005/8/layout/hierarchy5"/>
+    <dgm:cxn modelId="{FBF608B6-2682-4FE6-816B-52FA28965180}" type="presOf" srcId="{2156149C-D277-4817-9274-0223F9EC0341}" destId="{7C43E7D1-713D-4DB7-B285-53D222D0F7E4}" srcOrd="0" destOrd="0" presId="urn:microsoft.com/office/officeart/2005/8/layout/hierarchy5"/>
+    <dgm:cxn modelId="{11DBCF88-A519-4C74-9EC2-4468386930C7}" srcId="{F426891C-863F-4A09-A7E9-FC50DCF1E151}" destId="{58F416B4-4AFA-4C6A-9B3B-A1FF9F489D17}" srcOrd="0" destOrd="0" parTransId="{B5DEF538-F16F-487A-9CF1-DF79331A26C1}" sibTransId="{579C376D-2ED9-4F11-9ECA-2B7BACA5A705}"/>
+    <dgm:cxn modelId="{2F75B1A4-37C5-4D51-90FC-C66D6CC68621}" type="presOf" srcId="{44771617-08EA-4EA7-B21B-5B248CEE262C}" destId="{B13B3C32-1189-418C-BC67-FD16797FA497}" srcOrd="0" destOrd="0" presId="urn:microsoft.com/office/officeart/2005/8/layout/hierarchy5"/>
+    <dgm:cxn modelId="{CDD9A9E3-F3D3-45DF-81F0-D1F8D698D49E}" srcId="{0D687C51-502C-48CF-8DFA-4574BB7E0BDC}" destId="{CE6C6459-7675-4D52-9520-93731C259E25}" srcOrd="0" destOrd="0" parTransId="{0A702134-785B-48E8-A677-613364C9D50E}" sibTransId="{911388C6-FDA5-42ED-9958-30BA17734BE3}"/>
     <dgm:cxn modelId="{28FAA116-02F8-4592-93E7-07107B073EF0}" srcId="{1CD9DD62-71D1-4AB4-9004-F666B647DCD2}" destId="{07A62DD5-DEA2-483C-A892-96C00C737FBA}" srcOrd="4" destOrd="0" parTransId="{6352F050-3A6F-4BC9-98C5-57C244C50A4C}" sibTransId="{14616CE9-EFC3-48A8-8C58-2184370289B7}"/>
-    <dgm:cxn modelId="{5C0F6086-2E50-4F13-9F5F-B97D1BF4FEDD}" srcId="{DA6FA8C2-A357-4386-BF3C-EC6C7ED88816}" destId="{2156149C-D277-4817-9274-0223F9EC0341}" srcOrd="1" destOrd="0" parTransId="{91D44572-66D0-4F1C-B83C-19F5E3B96CD1}" sibTransId="{06FB15C4-2BB1-44E1-BDAB-C99173B7B556}"/>
-    <dgm:cxn modelId="{809024B3-535D-4AD3-BCF4-C307AD562A01}" type="presOf" srcId="{F17D0DD2-BF6D-4CBD-A713-53D9A18B0296}" destId="{D92946F3-3C10-44A8-8B33-4422A6016779}" srcOrd="0" destOrd="0" presId="urn:microsoft.com/office/officeart/2005/8/layout/hierarchy5"/>
-    <dgm:cxn modelId="{EC35812E-7C36-4653-868B-AEB05A7F82E0}" type="presOf" srcId="{95F2FF84-D28D-407B-B8FE-2B372DF9BA0B}" destId="{3DDC2BFA-D029-4FC9-9AF9-77E14E16B3E5}" srcOrd="1" destOrd="0" presId="urn:microsoft.com/office/officeart/2005/8/layout/hierarchy5"/>
-    <dgm:cxn modelId="{570815A3-3C18-4050-8603-C308A7D544DD}" type="presOf" srcId="{DC2CBB48-DF3A-4C5E-BDF6-ABC816F5C797}" destId="{73DD586C-FC46-4E6F-81D5-8ECB45DE8E57}" srcOrd="1" destOrd="0" presId="urn:microsoft.com/office/officeart/2005/8/layout/hierarchy5"/>
-    <dgm:cxn modelId="{499628AD-21B8-496B-B479-5567619496B5}" srcId="{CE6C6459-7675-4D52-9520-93731C259E25}" destId="{A5F1D9FE-94AE-4D9D-8104-127130754F38}" srcOrd="0" destOrd="0" parTransId="{AAA0BB42-E0CA-4855-A47A-DAD9CD3E6AC7}" sibTransId="{68B45EC6-D31D-4F3B-92F8-2C575F12BC24}"/>
-    <dgm:cxn modelId="{215755E8-5202-42D8-BBD5-BF8CF4CFBD0C}" type="presOf" srcId="{3703CCF6-A05B-4A59-8A37-C9334B8CE4EA}" destId="{2CB77F7F-41D2-414F-BFAD-9CE9D858E357}" srcOrd="0" destOrd="0" presId="urn:microsoft.com/office/officeart/2005/8/layout/hierarchy5"/>
-    <dgm:cxn modelId="{54764657-162F-4EF3-BC92-55B34F61D3B8}" type="presOf" srcId="{E10EE0F9-B5B9-4DEE-812B-2DBDC2ACA83A}" destId="{F9452968-5195-4D30-A832-7742F8DB07AE}" srcOrd="1" destOrd="0" presId="urn:microsoft.com/office/officeart/2005/8/layout/hierarchy5"/>
-    <dgm:cxn modelId="{54995DFB-E48B-4A34-890E-C9EEF671B795}" type="presOf" srcId="{F426891C-863F-4A09-A7E9-FC50DCF1E151}" destId="{F8E7612B-DC34-4E03-96F7-7220E78E762A}" srcOrd="0" destOrd="0" presId="urn:microsoft.com/office/officeart/2005/8/layout/hierarchy5"/>
-    <dgm:cxn modelId="{7DE82AA1-31D1-402F-B301-20E761C8C96B}" type="presOf" srcId="{E10EE0F9-B5B9-4DEE-812B-2DBDC2ACA83A}" destId="{DA5E3BEE-FFBB-4462-BCA2-B5CD6BEA797F}" srcOrd="0" destOrd="0" presId="urn:microsoft.com/office/officeart/2005/8/layout/hierarchy5"/>
+    <dgm:cxn modelId="{6CC5FA23-222F-4A9C-98DE-9A7AD6638017}" srcId="{0D687C51-502C-48CF-8DFA-4574BB7E0BDC}" destId="{7D08F0DB-94FA-4A95-AE75-B80FC8240301}" srcOrd="1" destOrd="0" parTransId="{B8BCA234-7558-4285-98DC-27C0A68632A0}" sibTransId="{0619CD34-9891-43E8-ACC7-DBF7BDAF7B10}"/>
+    <dgm:cxn modelId="{B59D9290-D5DE-464F-8081-6F55631C7E13}" type="presOf" srcId="{B5DEF538-F16F-487A-9CF1-DF79331A26C1}" destId="{BC4C10C4-2D8D-4F72-A93B-E53674A7FAA1}" srcOrd="1" destOrd="0" presId="urn:microsoft.com/office/officeart/2005/8/layout/hierarchy5"/>
+    <dgm:cxn modelId="{CB49E4D0-4EBD-4BE1-99C4-568FAFF875A2}" type="presOf" srcId="{A3DB99DA-5742-4A54-9A93-4DE079D5FBA8}" destId="{CA7DA830-ECD6-4150-BA97-1ED71F584FAC}" srcOrd="1" destOrd="0" presId="urn:microsoft.com/office/officeart/2005/8/layout/hierarchy5"/>
+    <dgm:cxn modelId="{D91341EE-CC30-4A04-AF38-57F0A831EFC9}" srcId="{FD200CDD-3708-42B4-9412-BC6BC10F780F}" destId="{3F961278-F127-4801-B067-9BB9A29EA637}" srcOrd="1" destOrd="0" parTransId="{BC2138B6-2437-495E-8A8E-A6D94EFDEB17}" sibTransId="{96FCE7FB-CEB5-4B47-87DD-A90FD4FE9CB4}"/>
+    <dgm:cxn modelId="{E758901D-BF17-49B8-AC86-C5593C2C92D5}" srcId="{F17D0DD2-BF6D-4CBD-A713-53D9A18B0296}" destId="{FD200CDD-3708-42B4-9412-BC6BC10F780F}" srcOrd="1" destOrd="0" parTransId="{6B6BB9DE-F38D-4E54-9E28-CC69F328C37F}" sibTransId="{BB18BA1B-86D6-4A40-A019-E9B2EFA521D1}"/>
+    <dgm:cxn modelId="{2C8A3634-FF1A-4310-BC8B-B04BD133DDC0}" srcId="{1CD9DD62-71D1-4AB4-9004-F666B647DCD2}" destId="{0D687C51-502C-48CF-8DFA-4574BB7E0BDC}" srcOrd="0" destOrd="0" parTransId="{7CD96048-F7A9-42F8-86BB-AA5C34D2A0E6}" sibTransId="{48CB004E-CBED-4B23-90C1-9EA127C2BC69}"/>
+    <dgm:cxn modelId="{B8E9F457-6037-427A-921C-CC0FBA18B822}" srcId="{1CD9DD62-71D1-4AB4-9004-F666B647DCD2}" destId="{DC2CBB48-DF3A-4C5E-BDF6-ABC816F5C797}" srcOrd="1" destOrd="0" parTransId="{669E2E36-BE92-4756-9E24-4489A1124CD0}" sibTransId="{59E3A54D-0285-43FC-AAC0-E6ECC30617B1}"/>
+    <dgm:cxn modelId="{1F4492B5-C972-4B59-9320-0637734B6297}" type="presOf" srcId="{1CD9DD62-71D1-4AB4-9004-F666B647DCD2}" destId="{94863F81-6F51-415B-BE40-8777D7E91B03}" srcOrd="0" destOrd="0" presId="urn:microsoft.com/office/officeart/2005/8/layout/hierarchy5"/>
+    <dgm:cxn modelId="{98BA1A96-BCD3-4011-914C-4B7F19DC3961}" type="presOf" srcId="{3BEFD10E-3FC3-40B4-9F94-725C61E140A6}" destId="{6159F236-2F76-41A9-A23B-BEBDBBBCB53B}" srcOrd="0" destOrd="0" presId="urn:microsoft.com/office/officeart/2005/8/layout/hierarchy5"/>
+    <dgm:cxn modelId="{F9C3A461-A3A7-43EF-81B6-E29D86184184}" type="presOf" srcId="{3D02AF21-A4C9-475D-983D-652A2500649B}" destId="{FA248D77-6A15-4299-8DE4-3B766CF2728C}" srcOrd="0" destOrd="0" presId="urn:microsoft.com/office/officeart/2005/8/layout/hierarchy5"/>
+    <dgm:cxn modelId="{A2411785-28C5-40AC-83A3-B196AE46A490}" type="presOf" srcId="{D743D934-A151-4033-85EE-03A8AD73236D}" destId="{6F611C5A-9069-4296-9DBE-6EFF5A7CB28F}" srcOrd="1" destOrd="0" presId="urn:microsoft.com/office/officeart/2005/8/layout/hierarchy5"/>
+    <dgm:cxn modelId="{6095F952-3862-4FF5-A114-D04904E6AA8B}" type="presOf" srcId="{F7F9063E-316E-4ACB-A092-745B51571572}" destId="{B49DCFD5-3E99-4135-A8FF-952B4708CF53}" srcOrd="0" destOrd="0" presId="urn:microsoft.com/office/officeart/2005/8/layout/hierarchy5"/>
+    <dgm:cxn modelId="{BDED1751-42B5-4CF1-ADFC-5905D151A9A6}" type="presOf" srcId="{3F961278-F127-4801-B067-9BB9A29EA637}" destId="{FE7F2866-325D-4B3E-967D-67B7E3E88C14}" srcOrd="0" destOrd="0" presId="urn:microsoft.com/office/officeart/2005/8/layout/hierarchy5"/>
+    <dgm:cxn modelId="{DF5AFE07-59DE-4B58-92FE-2E78E143978F}" type="presOf" srcId="{64665E1A-AFF0-43DA-B18D-D3AF74A28B79}" destId="{A2854C72-DA8B-49A4-8120-CA3E12969429}" srcOrd="0" destOrd="0" presId="urn:microsoft.com/office/officeart/2005/8/layout/hierarchy5"/>
+    <dgm:cxn modelId="{3EB96AFB-4BBB-4614-85D4-194BA61CFE88}" type="presOf" srcId="{9427EDE2-FA6C-44D5-BE12-8F55AB4D4442}" destId="{4E7BBCD9-5235-4E66-B597-B5B06CAB7928}" srcOrd="1" destOrd="0" presId="urn:microsoft.com/office/officeart/2005/8/layout/hierarchy5"/>
+    <dgm:cxn modelId="{4B380693-B4AF-48B7-8D30-CC5243ADC152}" type="presOf" srcId="{B8BCA234-7558-4285-98DC-27C0A68632A0}" destId="{D3D1D14B-DC9D-4496-8982-375857092585}" srcOrd="0" destOrd="0" presId="urn:microsoft.com/office/officeart/2005/8/layout/hierarchy5"/>
     <dgm:cxn modelId="{5EC236DF-CD44-4AFE-8618-A0D0D075FC0A}" srcId="{D0B55527-58A5-453A-AAC9-E7454914D72A}" destId="{2D4BCDE3-0492-4071-8698-EF997550D916}" srcOrd="1" destOrd="0" parTransId="{44771617-08EA-4EA7-B21B-5B248CEE262C}" sibTransId="{3D52BD8D-F3EF-481B-B492-BD4D5F5D4726}"/>
-    <dgm:cxn modelId="{37ABACD5-7AA5-4BAD-8A56-93C12008B453}" type="presOf" srcId="{D0B55527-58A5-453A-AAC9-E7454914D72A}" destId="{DAA02A32-98C7-4F72-8293-DB1D1E82BBF2}" srcOrd="0" destOrd="0" presId="urn:microsoft.com/office/officeart/2005/8/layout/hierarchy5"/>
-    <dgm:cxn modelId="{30FA8037-3E40-469C-94EB-E1062C27ECEE}" type="presOf" srcId="{CE6C6459-7675-4D52-9520-93731C259E25}" destId="{60DED693-263F-4E40-9025-DEEE2B4072C5}" srcOrd="0" destOrd="0" presId="urn:microsoft.com/office/officeart/2005/8/layout/hierarchy5"/>
-    <dgm:cxn modelId="{C18CF4EF-1B13-49A9-988F-3241EE6AA144}" type="presOf" srcId="{E9B644CD-0AD6-4B2F-AE23-8D44A0D9533C}" destId="{9AF4B254-F425-4BA4-89A6-37C9E0B347F8}" srcOrd="0" destOrd="0" presId="urn:microsoft.com/office/officeart/2005/8/layout/hierarchy5"/>
-    <dgm:cxn modelId="{1ECB6473-C7B9-4DDB-8E6D-FF67F7A89881}" type="presOf" srcId="{FFDBC1C7-A7C8-4E99-A5A3-8B54E332C334}" destId="{FF361F37-CE33-40F3-B237-A7D24026C6E6}" srcOrd="1" destOrd="0" presId="urn:microsoft.com/office/officeart/2005/8/layout/hierarchy5"/>
-    <dgm:cxn modelId="{FA90D049-7912-40BC-8079-9DC1311F5CBB}" srcId="{DA6FA8C2-A357-4386-BF3C-EC6C7ED88816}" destId="{07FAF939-5C4F-416F-85AB-52C73C46EA08}" srcOrd="0" destOrd="0" parTransId="{1EDF341C-890A-47D0-904A-D3359101FE57}" sibTransId="{3EE00E86-F56F-44B3-930E-6636AA61935A}"/>
-    <dgm:cxn modelId="{6EC0E6BF-3CC9-44AA-B34C-062767EE3379}" srcId="{2D4BCDE3-0492-4071-8698-EF997550D916}" destId="{1834AC4E-85AB-49FF-B573-A4707299E0E7}" srcOrd="1" destOrd="0" parTransId="{D743D934-A151-4033-85EE-03A8AD73236D}" sibTransId="{52C0C978-BDE3-4465-9909-1AA5689BA8BD}"/>
-    <dgm:cxn modelId="{8A59AB2F-5C58-45D9-B519-223065BC0923}" type="presOf" srcId="{B6E81698-9A9A-4953-8EB0-57FCFFD6CBBB}" destId="{94C0F8F5-DDCF-4708-B2E0-BF92442436E9}" srcOrd="0" destOrd="0" presId="urn:microsoft.com/office/officeart/2005/8/layout/hierarchy5"/>
-    <dgm:cxn modelId="{42AEAD66-8657-44B3-8846-FF871ABA5A72}" srcId="{FD200CDD-3708-42B4-9412-BC6BC10F780F}" destId="{B6E81698-9A9A-4953-8EB0-57FCFFD6CBBB}" srcOrd="0" destOrd="0" parTransId="{F7F9063E-316E-4ACB-A092-745B51571572}" sibTransId="{605FFBE0-350A-415F-A827-12966FD05AAA}"/>
-    <dgm:cxn modelId="{018FB897-4991-44A0-A22A-BAD65C42FC2E}" type="presOf" srcId="{908F626F-B516-4EEB-8541-81A1D2E50FE0}" destId="{83223A45-16DF-4293-BF3B-1A601CD6136D}" srcOrd="0" destOrd="0" presId="urn:microsoft.com/office/officeart/2005/8/layout/hierarchy5"/>
-    <dgm:cxn modelId="{EC7EA44F-608E-459F-91E5-ED286C4694C2}" type="presOf" srcId="{FFDBC1C7-A7C8-4E99-A5A3-8B54E332C334}" destId="{447F965F-96E9-40DC-834F-E91AA721F862}" srcOrd="0" destOrd="0" presId="urn:microsoft.com/office/officeart/2005/8/layout/hierarchy5"/>
-    <dgm:cxn modelId="{2C8A3634-FF1A-4310-BC8B-B04BD133DDC0}" srcId="{1CD9DD62-71D1-4AB4-9004-F666B647DCD2}" destId="{0D687C51-502C-48CF-8DFA-4574BB7E0BDC}" srcOrd="0" destOrd="0" parTransId="{7CD96048-F7A9-42F8-86BB-AA5C34D2A0E6}" sibTransId="{48CB004E-CBED-4B23-90C1-9EA127C2BC69}"/>
-    <dgm:cxn modelId="{E758901D-BF17-49B8-AC86-C5593C2C92D5}" srcId="{F17D0DD2-BF6D-4CBD-A713-53D9A18B0296}" destId="{FD200CDD-3708-42B4-9412-BC6BC10F780F}" srcOrd="1" destOrd="0" parTransId="{6B6BB9DE-F38D-4E54-9E28-CC69F328C37F}" sibTransId="{BB18BA1B-86D6-4A40-A019-E9B2EFA521D1}"/>
-    <dgm:cxn modelId="{21F0DC6A-8B30-4E83-8168-A06A2F0B243A}" srcId="{1CD9DD62-71D1-4AB4-9004-F666B647DCD2}" destId="{7834B861-A087-47BB-BBBC-65BA175C7835}" srcOrd="5" destOrd="0" parTransId="{7E251BF3-1E0A-4EB0-92F1-0328E594CAF7}" sibTransId="{81A6E98E-5065-47C8-A92F-D9ADE1390B73}"/>
-    <dgm:cxn modelId="{FE6687A7-8731-4B45-AE3F-3E116274DF52}" type="presOf" srcId="{A3DB99DA-5742-4A54-9A93-4DE079D5FBA8}" destId="{491E9DA6-DF96-4E0F-A533-FF77FC9B1ED6}" srcOrd="0" destOrd="0" presId="urn:microsoft.com/office/officeart/2005/8/layout/hierarchy5"/>
-    <dgm:cxn modelId="{CB49E4D0-4EBD-4BE1-99C4-568FAFF875A2}" type="presOf" srcId="{A3DB99DA-5742-4A54-9A93-4DE079D5FBA8}" destId="{CA7DA830-ECD6-4150-BA97-1ED71F584FAC}" srcOrd="1" destOrd="0" presId="urn:microsoft.com/office/officeart/2005/8/layout/hierarchy5"/>
-    <dgm:cxn modelId="{A2411785-28C5-40AC-83A3-B196AE46A490}" type="presOf" srcId="{D743D934-A151-4033-85EE-03A8AD73236D}" destId="{6F611C5A-9069-4296-9DBE-6EFF5A7CB28F}" srcOrd="1" destOrd="0" presId="urn:microsoft.com/office/officeart/2005/8/layout/hierarchy5"/>
-    <dgm:cxn modelId="{792A95BF-B138-42D8-8B71-8001D679AC7D}" type="presOf" srcId="{5DF021A5-51AC-4009-942E-DDDC0FEE0D9C}" destId="{A9BDF05C-259A-439E-A67A-BADD22FCFC0A}" srcOrd="1" destOrd="0" presId="urn:microsoft.com/office/officeart/2005/8/layout/hierarchy5"/>
-    <dgm:cxn modelId="{54474368-6DC0-4569-B719-E6153ADB7AED}" type="presOf" srcId="{9682CD7E-E678-44BD-9EBA-E4B8EFCC0DA8}" destId="{3BB25170-7867-49C5-96A3-2C6046FBCACA}" srcOrd="1" destOrd="0" presId="urn:microsoft.com/office/officeart/2005/8/layout/hierarchy5"/>
-    <dgm:cxn modelId="{3A1D86C2-7C2C-410C-8FA1-CA743D4ECEB6}" type="presOf" srcId="{07A62DD5-DEA2-483C-A892-96C00C737FBA}" destId="{6AC56556-8368-4903-BC0E-4F6CBBCF053A}" srcOrd="0" destOrd="0" presId="urn:microsoft.com/office/officeart/2005/8/layout/hierarchy5"/>
-    <dgm:cxn modelId="{6290C773-81F5-4171-9C80-E6B5497B44F8}" type="presOf" srcId="{21018797-09B0-43BC-990E-D2C4363A13E3}" destId="{EC4146AA-9375-444B-9B4A-A54C2C08C7E2}" srcOrd="0" destOrd="0" presId="urn:microsoft.com/office/officeart/2005/8/layout/hierarchy5"/>
-    <dgm:cxn modelId="{C4E80C13-1F0E-4C0E-B9F7-77AB9D420873}" type="presOf" srcId="{5DF021A5-51AC-4009-942E-DDDC0FEE0D9C}" destId="{17839822-E48C-4AB1-8DFC-FB7798F4D700}" srcOrd="0" destOrd="0" presId="urn:microsoft.com/office/officeart/2005/8/layout/hierarchy5"/>
-    <dgm:cxn modelId="{FBF608B6-2682-4FE6-816B-52FA28965180}" type="presOf" srcId="{2156149C-D277-4817-9274-0223F9EC0341}" destId="{7C43E7D1-713D-4DB7-B285-53D222D0F7E4}" srcOrd="0" destOrd="0" presId="urn:microsoft.com/office/officeart/2005/8/layout/hierarchy5"/>
-    <dgm:cxn modelId="{A1FCEC67-EF8A-4B52-BF05-F19F1972E403}" type="presOf" srcId="{0D687C51-502C-48CF-8DFA-4574BB7E0BDC}" destId="{D2D24B57-3EB3-47CA-886C-D78BDDBD6616}" srcOrd="0" destOrd="0" presId="urn:microsoft.com/office/officeart/2005/8/layout/hierarchy5"/>
-    <dgm:cxn modelId="{87EAFED4-B84D-4A33-9C94-405EE12D71AA}" type="presOf" srcId="{7834B861-A087-47BB-BBBC-65BA175C7835}" destId="{1838C9BB-060F-4B9F-8DD7-45F28FC4E293}" srcOrd="0" destOrd="0" presId="urn:microsoft.com/office/officeart/2005/8/layout/hierarchy5"/>
-    <dgm:cxn modelId="{6CC5FA23-222F-4A9C-98DE-9A7AD6638017}" srcId="{0D687C51-502C-48CF-8DFA-4574BB7E0BDC}" destId="{7D08F0DB-94FA-4A95-AE75-B80FC8240301}" srcOrd="1" destOrd="0" parTransId="{B8BCA234-7558-4285-98DC-27C0A68632A0}" sibTransId="{0619CD34-9891-43E8-ACC7-DBF7BDAF7B10}"/>
-    <dgm:cxn modelId="{CDD9A9E3-F3D3-45DF-81F0-D1F8D698D49E}" srcId="{0D687C51-502C-48CF-8DFA-4574BB7E0BDC}" destId="{CE6C6459-7675-4D52-9520-93731C259E25}" srcOrd="0" destOrd="0" parTransId="{0A702134-785B-48E8-A677-613364C9D50E}" sibTransId="{911388C6-FDA5-42ED-9958-30BA17734BE3}"/>
-    <dgm:cxn modelId="{984FF9E0-07D8-4B3A-B039-266DEF3F4A2C}" type="presOf" srcId="{3AA4DD33-29A4-49A2-B812-06861A367F30}" destId="{F55CDB21-B25A-44E2-AC27-A62E893257EA}" srcOrd="0" destOrd="0" presId="urn:microsoft.com/office/officeart/2005/8/layout/hierarchy5"/>
-    <dgm:cxn modelId="{47FC4AFB-4EB1-41CF-9F90-14B6397AD838}" type="presOf" srcId="{7834B861-A087-47BB-BBBC-65BA175C7835}" destId="{4B13F10F-BC66-4B11-8803-C4AD232DED7F}" srcOrd="1" destOrd="0" presId="urn:microsoft.com/office/officeart/2005/8/layout/hierarchy5"/>
-    <dgm:cxn modelId="{63B6E2B6-5CD4-458B-AF5B-113F9CEDE4C1}" type="presOf" srcId="{DA6FA8C2-A357-4386-BF3C-EC6C7ED88816}" destId="{FA718ACE-803C-43D0-A3FF-A49775772DF0}" srcOrd="0" destOrd="0" presId="urn:microsoft.com/office/officeart/2005/8/layout/hierarchy5"/>
-    <dgm:cxn modelId="{EF365414-ED4F-4ABA-8D88-57D6663C2800}" type="presOf" srcId="{6B6BB9DE-F38D-4E54-9E28-CC69F328C37F}" destId="{4BBC361B-46A0-4451-9EAF-CC8B52B275D1}" srcOrd="1" destOrd="0" presId="urn:microsoft.com/office/officeart/2005/8/layout/hierarchy5"/>
-    <dgm:cxn modelId="{0CDC7DA6-5BE2-43D4-87F0-C41F5C22C6DD}" srcId="{1A1E021E-DEDB-4DC8-914D-3CC33BF64070}" destId="{908F626F-B516-4EEB-8541-81A1D2E50FE0}" srcOrd="1" destOrd="0" parTransId="{F6FB4C32-4A0B-4C24-BA0C-C1D83A64476F}" sibTransId="{1384C94D-8589-4D35-B651-3CC4E1B00111}"/>
-    <dgm:cxn modelId="{84858702-D80E-4B81-AE4F-CAF550B3BF64}" type="presOf" srcId="{1EDF341C-890A-47D0-904A-D3359101FE57}" destId="{30B02AC4-22E2-4BFD-9FB9-3EAED9A765A5}" srcOrd="0" destOrd="0" presId="urn:microsoft.com/office/officeart/2005/8/layout/hierarchy5"/>
-    <dgm:cxn modelId="{B8DBC284-431B-4A34-A763-3960B70F15A3}" type="presOf" srcId="{41D672BA-A028-4F21-B333-39B59A298DBB}" destId="{626C1EBD-00F3-4EF0-A61E-6B9B11E3B8AB}" srcOrd="0" destOrd="0" presId="urn:microsoft.com/office/officeart/2005/8/layout/hierarchy5"/>
-    <dgm:cxn modelId="{5FB0775D-F7CA-45D0-87F9-BCCBA4B0EDB8}" type="presOf" srcId="{34792C18-4B61-4DEA-BB2F-CD4D5C94BF59}" destId="{E7CD4DCE-4196-41DD-886C-7F2EEA6B02AF}" srcOrd="1" destOrd="0" presId="urn:microsoft.com/office/officeart/2005/8/layout/hierarchy5"/>
-    <dgm:cxn modelId="{6DB4259C-4BDE-421E-AEE0-7FD81CAAA083}" type="presOf" srcId="{2609CAE7-1E9B-4EA8-9580-6C6B40609156}" destId="{F49D0E06-532E-4A38-B17D-AA9F46ABFD20}" srcOrd="0" destOrd="0" presId="urn:microsoft.com/office/officeart/2005/8/layout/hierarchy5"/>
-    <dgm:cxn modelId="{28EDF33C-1D20-44E1-978E-0653A617C528}" srcId="{E9B644CD-0AD6-4B2F-AE23-8D44A0D9533C}" destId="{74B15A58-032C-46CF-B5FE-463EE477385D}" srcOrd="1" destOrd="0" parTransId="{95F2FF84-D28D-407B-B8FE-2B372DF9BA0B}" sibTransId="{A59CC78B-BFA7-484E-B62E-D7EEC8249C44}"/>
-    <dgm:cxn modelId="{28E80D77-EAF1-4824-AB50-0BA7A0174F36}" srcId="{D0B55527-58A5-453A-AAC9-E7454914D72A}" destId="{3AA4DD33-29A4-49A2-B812-06861A367F30}" srcOrd="0" destOrd="0" parTransId="{3BEFD10E-3FC3-40B4-9F94-725C61E140A6}" sibTransId="{54873295-23A7-4CED-9DCB-18E65CD4BA37}"/>
-    <dgm:cxn modelId="{62EC1894-5BB5-4DA7-AD2E-C7BBDFBE08E6}" srcId="{3AA4DD33-29A4-49A2-B812-06861A367F30}" destId="{F9140787-06FE-4EBE-A4EB-0CB65F2D6A1B}" srcOrd="0" destOrd="0" parTransId="{3703CCF6-A05B-4A59-8A37-C9334B8CE4EA}" sibTransId="{43268F99-0228-4D21-BD78-EB6538024EF8}"/>
-    <dgm:cxn modelId="{66536165-5850-4A79-9D8B-BD52C0833C19}" type="presOf" srcId="{9427EDE2-FA6C-44D5-BE12-8F55AB4D4442}" destId="{01122377-BF51-432C-B5BD-D9659081A77A}" srcOrd="0" destOrd="0" presId="urn:microsoft.com/office/officeart/2005/8/layout/hierarchy5"/>
-    <dgm:cxn modelId="{90318B68-7914-47B4-A766-45A73BD718AA}" srcId="{CE6C6459-7675-4D52-9520-93731C259E25}" destId="{D0B55527-58A5-453A-AAC9-E7454914D72A}" srcOrd="1" destOrd="0" parTransId="{E10EE0F9-B5B9-4DEE-812B-2DBDC2ACA83A}" sibTransId="{28EF489E-8100-4B50-B34B-FEDAB4431C82}"/>
-    <dgm:cxn modelId="{3F34EA5F-7BED-4B1F-981E-51DC127E7D27}" type="presOf" srcId="{1EDF341C-890A-47D0-904A-D3359101FE57}" destId="{9B11BAB6-C5CF-4DE2-9660-1777DDC73FBC}" srcOrd="1" destOrd="0" presId="urn:microsoft.com/office/officeart/2005/8/layout/hierarchy5"/>
-    <dgm:cxn modelId="{22334715-DBC6-4DFD-8958-141CCB34EFF6}" type="presOf" srcId="{07A62DD5-DEA2-483C-A892-96C00C737FBA}" destId="{B8B4F77C-1B6D-4BFF-9A87-B27ABF25ACED}" srcOrd="1" destOrd="0" presId="urn:microsoft.com/office/officeart/2005/8/layout/hierarchy5"/>
-    <dgm:cxn modelId="{19528FD5-9E97-4FCB-A66A-C7D3219B9017}" type="presOf" srcId="{D743D934-A151-4033-85EE-03A8AD73236D}" destId="{86B6B845-5675-4A08-81FA-73B842A94138}" srcOrd="0" destOrd="0" presId="urn:microsoft.com/office/officeart/2005/8/layout/hierarchy5"/>
-    <dgm:cxn modelId="{6095F952-3862-4FF5-A114-D04904E6AA8B}" type="presOf" srcId="{F7F9063E-316E-4ACB-A092-745B51571572}" destId="{B49DCFD5-3E99-4135-A8FF-952B4708CF53}" srcOrd="0" destOrd="0" presId="urn:microsoft.com/office/officeart/2005/8/layout/hierarchy5"/>
-    <dgm:cxn modelId="{363CA59A-FF57-4378-ABC0-95E15810D0FC}" srcId="{1CD9DD62-71D1-4AB4-9004-F666B647DCD2}" destId="{3D02AF21-A4C9-475D-983D-652A2500649B}" srcOrd="2" destOrd="0" parTransId="{5C925451-C102-44A7-A6FE-CEF1952E591B}" sibTransId="{C5007346-C7F7-415D-9987-87B2FFA7F1F1}"/>
-    <dgm:cxn modelId="{9FA1F8C5-957C-417F-A7C0-EF0B4C98E228}" srcId="{F426891C-863F-4A09-A7E9-FC50DCF1E151}" destId="{545E3727-7DFE-429D-814A-6CF01E080B31}" srcOrd="1" destOrd="0" parTransId="{34792C18-4B61-4DEA-BB2F-CD4D5C94BF59}" sibTransId="{3A5CE702-E999-4278-A7C8-FDCB1CF46B46}"/>
-    <dgm:cxn modelId="{E4A32504-9155-4364-878C-B7BAD783F631}" type="presOf" srcId="{3D02AF21-A4C9-475D-983D-652A2500649B}" destId="{C720D4D6-A118-4D38-9C85-955D2FD4D117}" srcOrd="1" destOrd="0" presId="urn:microsoft.com/office/officeart/2005/8/layout/hierarchy5"/>
-    <dgm:cxn modelId="{0E798F92-F32A-4650-BBB3-00EFFF4555AA}" type="presOf" srcId="{58F416B4-4AFA-4C6A-9B3B-A1FF9F489D17}" destId="{E307016A-E994-4E84-987B-8E3D6D020213}" srcOrd="0" destOrd="0" presId="urn:microsoft.com/office/officeart/2005/8/layout/hierarchy5"/>
-    <dgm:cxn modelId="{7967874C-5385-4E61-82CE-C63185D5A50C}" type="presOf" srcId="{81B61790-51E0-4BE6-82A9-4D5328232DF4}" destId="{9B3B63D5-9C25-4694-A396-678698445052}" srcOrd="0" destOrd="0" presId="urn:microsoft.com/office/officeart/2005/8/layout/hierarchy5"/>
-    <dgm:cxn modelId="{1F4492B5-C972-4B59-9320-0637734B6297}" type="presOf" srcId="{1CD9DD62-71D1-4AB4-9004-F666B647DCD2}" destId="{94863F81-6F51-415B-BE40-8777D7E91B03}" srcOrd="0" destOrd="0" presId="urn:microsoft.com/office/officeart/2005/8/layout/hierarchy5"/>
-    <dgm:cxn modelId="{B59D9290-D5DE-464F-8081-6F55631C7E13}" type="presOf" srcId="{B5DEF538-F16F-487A-9CF1-DF79331A26C1}" destId="{BC4C10C4-2D8D-4F72-A93B-E53674A7FAA1}" srcOrd="1" destOrd="0" presId="urn:microsoft.com/office/officeart/2005/8/layout/hierarchy5"/>
-    <dgm:cxn modelId="{DE44CE27-CC1D-4802-A31C-349D1C5986DC}" srcId="{3AA4DD33-29A4-49A2-B812-06861A367F30}" destId="{C6751658-C61A-4CFD-8EFE-23D6286459AC}" srcOrd="1" destOrd="0" parTransId="{9427EDE2-FA6C-44D5-BE12-8F55AB4D4442}" sibTransId="{2DFD55CC-C3A5-4A5A-AC56-0663C310FBCC}"/>
-    <dgm:cxn modelId="{9674C647-4703-4D23-BF09-D1D0C3EEDF20}" srcId="{1F3ABAE5-FE40-4625-B826-2497EF69ACB0}" destId="{E9B644CD-0AD6-4B2F-AE23-8D44A0D9533C}" srcOrd="1" destOrd="0" parTransId="{A3DB99DA-5742-4A54-9A93-4DE079D5FBA8}" sibTransId="{28874741-DC46-4A04-9A96-DBDC920255E2}"/>
-    <dgm:cxn modelId="{89C8FEE6-D342-4DA8-8E4A-F6EF2F1AEA4C}" type="presOf" srcId="{44771617-08EA-4EA7-B21B-5B248CEE262C}" destId="{81FE9397-CF0F-438B-87BA-0C1AA4CBD002}" srcOrd="1" destOrd="0" presId="urn:microsoft.com/office/officeart/2005/8/layout/hierarchy5"/>
-    <dgm:cxn modelId="{DEAC65B4-B722-401F-AA2F-F065B3B615F1}" type="presOf" srcId="{32B53F96-582F-49BE-A2E1-81FCE3D8DEDC}" destId="{1CEED02B-3985-45DB-A3AA-5129BDAA9D03}" srcOrd="0" destOrd="0" presId="urn:microsoft.com/office/officeart/2005/8/layout/hierarchy5"/>
-    <dgm:cxn modelId="{F9C3A461-A3A7-43EF-81B6-E29D86184184}" type="presOf" srcId="{3D02AF21-A4C9-475D-983D-652A2500649B}" destId="{FA248D77-6A15-4299-8DE4-3B766CF2728C}" srcOrd="0" destOrd="0" presId="urn:microsoft.com/office/officeart/2005/8/layout/hierarchy5"/>
-    <dgm:cxn modelId="{450810F9-5BCD-429D-AD50-2FD3177BF64B}" type="presOf" srcId="{AAA0BB42-E0CA-4855-A47A-DAD9CD3E6AC7}" destId="{1F97F4B3-4707-447E-92A7-16B79223936D}" srcOrd="1" destOrd="0" presId="urn:microsoft.com/office/officeart/2005/8/layout/hierarchy5"/>
-    <dgm:cxn modelId="{5493DA63-1E41-40E4-B500-3C3D3E237E5F}" type="presOf" srcId="{0907BA1B-8C2C-46B2-8919-9D01FC1B262B}" destId="{51C38623-ECAC-43E7-87A7-872FA8331AB6}" srcOrd="0" destOrd="0" presId="urn:microsoft.com/office/officeart/2005/8/layout/hierarchy5"/>
-    <dgm:cxn modelId="{255D30BC-FC84-48DC-93A2-370D6F2292DE}" type="presOf" srcId="{AA6E28E9-08E4-4159-B4FD-19CE09705769}" destId="{D515642A-D0FF-484D-B2AC-2A387BF0D6BB}" srcOrd="1" destOrd="0" presId="urn:microsoft.com/office/officeart/2005/8/layout/hierarchy5"/>
-    <dgm:cxn modelId="{1212B0FE-83F6-4575-9835-7DC550197E40}" type="presOf" srcId="{74B15A58-032C-46CF-B5FE-463EE477385D}" destId="{28E57BF7-BA7E-4AFE-A671-CFC047D7FCC6}" srcOrd="0" destOrd="0" presId="urn:microsoft.com/office/officeart/2005/8/layout/hierarchy5"/>
-    <dgm:cxn modelId="{C6EC146C-F697-48B2-9F82-2C4B3E09BBA8}" srcId="{730F001D-F4A5-4EB0-8D88-B5C40674D694}" destId="{2609CAE7-1E9B-4EA8-9580-6C6B40609156}" srcOrd="1" destOrd="0" parTransId="{5DF021A5-51AC-4009-942E-DDDC0FEE0D9C}" sibTransId="{AD7D27B4-DF1D-4788-B0A7-B13542262103}"/>
-    <dgm:cxn modelId="{BF5182AA-5CEA-4EA9-88E4-B94574A7DD13}" type="presOf" srcId="{607BEA54-06A3-4744-8D8D-95019B9FFFE8}" destId="{575743D4-45E3-4259-B33C-B53FA5903ACF}" srcOrd="1" destOrd="0" presId="urn:microsoft.com/office/officeart/2005/8/layout/hierarchy5"/>
-    <dgm:cxn modelId="{60B72EA9-E31D-4FB3-9DD3-B3522A0CF57D}" srcId="{1F3ABAE5-FE40-4625-B826-2497EF69ACB0}" destId="{F426891C-863F-4A09-A7E9-FC50DCF1E151}" srcOrd="0" destOrd="0" parTransId="{5170FC55-8CD2-4575-8664-FE1527F70A57}" sibTransId="{F5455AF1-9047-44FB-9955-03E6834F06D5}"/>
-    <dgm:cxn modelId="{BAAA3875-DF6B-4866-9C6C-79E86F96B476}" type="presOf" srcId="{91D44572-66D0-4F1C-B83C-19F5E3B96CD1}" destId="{1831245D-153F-4759-9E75-ED192268B367}" srcOrd="0" destOrd="0" presId="urn:microsoft.com/office/officeart/2005/8/layout/hierarchy5"/>
-    <dgm:cxn modelId="{273F63B2-8DE0-49D4-8497-2C2D234AB41E}" srcId="{1CD9DD62-71D1-4AB4-9004-F666B647DCD2}" destId="{41D672BA-A028-4F21-B333-39B59A298DBB}" srcOrd="3" destOrd="0" parTransId="{0E118067-7F21-4A41-BA06-2435888BEEEC}" sibTransId="{920E3749-EDE6-4714-BDF7-ECD1F33D7B66}"/>
-    <dgm:cxn modelId="{2BE1B7C8-7C78-4DEA-ABF6-3718A117F6A8}" type="presOf" srcId="{730F001D-F4A5-4EB0-8D88-B5C40674D694}" destId="{9723A4E8-C293-44A7-8D1D-72F3C79538E8}" srcOrd="0" destOrd="0" presId="urn:microsoft.com/office/officeart/2005/8/layout/hierarchy5"/>
-    <dgm:cxn modelId="{FFCC0547-4154-43BC-8BFB-A7F45A629EDF}" type="presOf" srcId="{91D44572-66D0-4F1C-B83C-19F5E3B96CD1}" destId="{A46AD2AE-069B-49D6-95A1-82BE1C0C859C}" srcOrd="1" destOrd="0" presId="urn:microsoft.com/office/officeart/2005/8/layout/hierarchy5"/>
-    <dgm:cxn modelId="{B4BCB597-FC7C-41BF-8B88-1C88AB397C01}" type="presOf" srcId="{41D672BA-A028-4F21-B333-39B59A298DBB}" destId="{99923E23-69ED-45E1-BBE4-696F2F170579}" srcOrd="1" destOrd="0" presId="urn:microsoft.com/office/officeart/2005/8/layout/hierarchy5"/>
-    <dgm:cxn modelId="{CD6B908D-8CE4-4195-AD65-681787919286}" type="presOf" srcId="{607BEA54-06A3-4744-8D8D-95019B9FFFE8}" destId="{F3C23DF2-4442-4108-A920-CA0358091E48}" srcOrd="0" destOrd="0" presId="urn:microsoft.com/office/officeart/2005/8/layout/hierarchy5"/>
-    <dgm:cxn modelId="{67A6341B-80C3-4082-ACA0-0C878EE9DF50}" type="presOf" srcId="{1A1E021E-DEDB-4DC8-914D-3CC33BF64070}" destId="{05EE9D51-936F-4809-8516-A05D1D6DB641}" srcOrd="0" destOrd="0" presId="urn:microsoft.com/office/officeart/2005/8/layout/hierarchy5"/>
-    <dgm:cxn modelId="{6B9CB254-5B49-4F46-922D-8CD0A2020AE2}" type="presOf" srcId="{DC2CBB48-DF3A-4C5E-BDF6-ABC816F5C797}" destId="{0ED429C1-77E8-4FA4-A21E-DF5C246FD072}" srcOrd="0" destOrd="0" presId="urn:microsoft.com/office/officeart/2005/8/layout/hierarchy5"/>
-    <dgm:cxn modelId="{EA9D19E5-F19D-4AD9-8FBD-82930D2BF3DA}" type="presOf" srcId="{F6FB4C32-4A0B-4C24-BA0C-C1D83A64476F}" destId="{D1CFFA0A-5F83-4099-95F2-AC364D7F0D31}" srcOrd="0" destOrd="0" presId="urn:microsoft.com/office/officeart/2005/8/layout/hierarchy5"/>
-    <dgm:cxn modelId="{09353899-B260-444B-9A13-4897C89D04C6}" srcId="{2D4BCDE3-0492-4071-8698-EF997550D916}" destId="{32B53F96-582F-49BE-A2E1-81FCE3D8DEDC}" srcOrd="0" destOrd="0" parTransId="{FFDBC1C7-A7C8-4E99-A5A3-8B54E332C334}" sibTransId="{D6912F17-8FE3-45FB-9E29-3AB56206B9E3}"/>
-    <dgm:cxn modelId="{064DDFCA-79BD-4998-859E-95187A55724A}" type="presOf" srcId="{5170FC55-8CD2-4575-8664-FE1527F70A57}" destId="{AFB25989-E67A-44A6-AFF4-E96E26E3C9DD}" srcOrd="1" destOrd="0" presId="urn:microsoft.com/office/officeart/2005/8/layout/hierarchy5"/>
-    <dgm:cxn modelId="{98BA1A96-BCD3-4011-914C-4B7F19DC3961}" type="presOf" srcId="{3BEFD10E-3FC3-40B4-9F94-725C61E140A6}" destId="{6159F236-2F76-41A9-A23B-BEBDBBBCB53B}" srcOrd="0" destOrd="0" presId="urn:microsoft.com/office/officeart/2005/8/layout/hierarchy5"/>
-    <dgm:cxn modelId="{FF46CC2F-52F3-43C2-B536-9226A94E7954}" type="presOf" srcId="{F7F9063E-316E-4ACB-A092-745B51571572}" destId="{B2B7C2BE-DB6B-4286-9AF2-0464FB7146DD}" srcOrd="1" destOrd="0" presId="urn:microsoft.com/office/officeart/2005/8/layout/hierarchy5"/>
-    <dgm:cxn modelId="{D9E25721-1AFB-46F1-9DEB-8CF969B0F007}" type="presOf" srcId="{0A702134-785B-48E8-A677-613364C9D50E}" destId="{FB4FC79E-E391-4D90-AB94-B0B9BDA3497A}" srcOrd="1" destOrd="0" presId="urn:microsoft.com/office/officeart/2005/8/layout/hierarchy5"/>
-    <dgm:cxn modelId="{940AC9CD-D293-4280-87D7-DB4AA3752FBD}" type="presOf" srcId="{FD200CDD-3708-42B4-9412-BC6BC10F780F}" destId="{B2A9F8A5-DA6A-49A2-AC91-D8136DF75C35}" srcOrd="0" destOrd="0" presId="urn:microsoft.com/office/officeart/2005/8/layout/hierarchy5"/>
-    <dgm:cxn modelId="{1FD4D801-BF94-4F01-9A70-5A157BCF2E84}" type="presOf" srcId="{F6FB4C32-4A0B-4C24-BA0C-C1D83A64476F}" destId="{028BD7EB-482E-4AFC-AA1C-726DCF0DE4C3}" srcOrd="1" destOrd="0" presId="urn:microsoft.com/office/officeart/2005/8/layout/hierarchy5"/>
-    <dgm:cxn modelId="{4A0FBF2D-FDF5-40D5-B4AB-F47C4664B14C}" type="presOf" srcId="{34792C18-4B61-4DEA-BB2F-CD4D5C94BF59}" destId="{BCD01B47-E752-43DC-9204-4662C4A964FE}" srcOrd="0" destOrd="0" presId="urn:microsoft.com/office/officeart/2005/8/layout/hierarchy5"/>
-    <dgm:cxn modelId="{695F59BA-CD9C-491A-9788-9594F6CAA788}" type="presOf" srcId="{C6751658-C61A-4CFD-8EFE-23D6286459AC}" destId="{552AC263-5454-4740-9492-B8399C4724E1}" srcOrd="0" destOrd="0" presId="urn:microsoft.com/office/officeart/2005/8/layout/hierarchy5"/>
-    <dgm:cxn modelId="{540B4114-3592-4FFD-B577-F65160126E8E}" type="presOf" srcId="{A5F1D9FE-94AE-4D9D-8104-127130754F38}" destId="{3CE3DBC4-EE13-42D3-BCE6-C6B2F278F807}" srcOrd="0" destOrd="0" presId="urn:microsoft.com/office/officeart/2005/8/layout/hierarchy5"/>
-    <dgm:cxn modelId="{2F11473F-056C-4DEC-B448-B1D67E65FF6B}" srcId="{A5F1D9FE-94AE-4D9D-8104-127130754F38}" destId="{730F001D-F4A5-4EB0-8D88-B5C40674D694}" srcOrd="1" destOrd="0" parTransId="{21018797-09B0-43BC-990E-D2C4363A13E3}" sibTransId="{B847B0FF-42AF-4282-99C4-FA18AC812828}"/>
-    <dgm:cxn modelId="{E0BA3EDD-0CBA-46DE-A236-8322EAB1AEA0}" srcId="{730F001D-F4A5-4EB0-8D88-B5C40674D694}" destId="{77A54F8E-465A-4740-AB8E-FEB7A432FB77}" srcOrd="0" destOrd="0" parTransId="{9682CD7E-E678-44BD-9EBA-E4B8EFCC0DA8}" sibTransId="{9C54FE50-7582-4C66-8037-1767C1B32DB4}"/>
-    <dgm:cxn modelId="{EFB99E9B-3FFE-406A-8763-9F39445C6D18}" srcId="{7D08F0DB-94FA-4A95-AE75-B80FC8240301}" destId="{F17D0DD2-BF6D-4CBD-A713-53D9A18B0296}" srcOrd="1" destOrd="0" parTransId="{64665E1A-AFF0-43DA-B18D-D3AF74A28B79}" sibTransId="{4450360C-C8D2-40C9-AA8D-B4D09051EAA6}"/>
-    <dgm:cxn modelId="{DF5AFE07-59DE-4B58-92FE-2E78E143978F}" type="presOf" srcId="{64665E1A-AFF0-43DA-B18D-D3AF74A28B79}" destId="{A2854C72-DA8B-49A4-8120-CA3E12969429}" srcOrd="0" destOrd="0" presId="urn:microsoft.com/office/officeart/2005/8/layout/hierarchy5"/>
-    <dgm:cxn modelId="{15754237-1BA8-49B8-A427-5453469D10E5}" type="presOf" srcId="{B8BCA234-7558-4285-98DC-27C0A68632A0}" destId="{E1F725A6-2EDB-4001-A75E-CEEE0AAC9B17}" srcOrd="1" destOrd="0" presId="urn:microsoft.com/office/officeart/2005/8/layout/hierarchy5"/>
-    <dgm:cxn modelId="{95E03E6B-F1E8-4EC0-9CE0-9F08C25B446D}" type="presOf" srcId="{7D08F0DB-94FA-4A95-AE75-B80FC8240301}" destId="{229CD80C-330D-4DAC-A3C1-59B6C682DAE6}" srcOrd="0" destOrd="0" presId="urn:microsoft.com/office/officeart/2005/8/layout/hierarchy5"/>
-    <dgm:cxn modelId="{637F21F0-6824-432B-BD76-169505A0F0E9}" type="presOf" srcId="{07FAF939-5C4F-416F-85AB-52C73C46EA08}" destId="{73814760-7A80-4BEE-8DB6-6EC494F8B42A}" srcOrd="0" destOrd="0" presId="urn:microsoft.com/office/officeart/2005/8/layout/hierarchy5"/>
-    <dgm:cxn modelId="{A30E9E64-78F8-4802-BAB2-857D6265BFB7}" type="presOf" srcId="{0907BA1B-8C2C-46B2-8919-9D01FC1B262B}" destId="{520C6796-1E1A-460F-A9A0-68737CF1A106}" srcOrd="1" destOrd="0" presId="urn:microsoft.com/office/officeart/2005/8/layout/hierarchy5"/>
-    <dgm:cxn modelId="{79A95EFD-E348-4F8D-91CE-48A3EC8924EB}" srcId="{7D08F0DB-94FA-4A95-AE75-B80FC8240301}" destId="{1F3ABAE5-FE40-4625-B826-2497EF69ACB0}" srcOrd="0" destOrd="0" parTransId="{607BEA54-06A3-4744-8D8D-95019B9FFFE8}" sibTransId="{DB4BC700-CFDF-4BC9-B327-37F470167C5B}"/>
-    <dgm:cxn modelId="{F7C0BFAD-6588-4C79-82BB-21B8C70D362C}" srcId="{E9B644CD-0AD6-4B2F-AE23-8D44A0D9533C}" destId="{A502BECD-C25C-46DD-998E-BBE3539A2279}" srcOrd="0" destOrd="0" parTransId="{81B61790-51E0-4BE6-82A9-4D5328232DF4}" sibTransId="{CFB6DABA-84D7-4B30-AE33-C378927045CF}"/>
-    <dgm:cxn modelId="{FFC0D9B8-0BD0-4CE7-8B7A-60560E3E4532}" type="presOf" srcId="{545E3727-7DFE-429D-814A-6CF01E080B31}" destId="{8FC05931-54A7-429E-A4A9-9A249A4A90D3}" srcOrd="0" destOrd="0" presId="urn:microsoft.com/office/officeart/2005/8/layout/hierarchy5"/>
-    <dgm:cxn modelId="{2F75B1A4-37C5-4D51-90FC-C66D6CC68621}" type="presOf" srcId="{44771617-08EA-4EA7-B21B-5B248CEE262C}" destId="{B13B3C32-1189-418C-BC67-FD16797FA497}" srcOrd="0" destOrd="0" presId="urn:microsoft.com/office/officeart/2005/8/layout/hierarchy5"/>
-    <dgm:cxn modelId="{07ADD566-1F38-428C-BCE3-7D4411D6BC15}" type="presOf" srcId="{77A54F8E-465A-4740-AB8E-FEB7A432FB77}" destId="{C53D64E5-754C-4B3E-96B6-051D1710BB21}" srcOrd="0" destOrd="0" presId="urn:microsoft.com/office/officeart/2005/8/layout/hierarchy5"/>
-    <dgm:cxn modelId="{4BAD174D-D0EF-4AAD-9E82-483D00688906}" type="presOf" srcId="{5F8BA5B6-A0FC-4E95-AA0E-7A970892ADC8}" destId="{0A2EE00C-43D2-4C8E-95E3-84F11AA1CC90}" srcOrd="0" destOrd="0" presId="urn:microsoft.com/office/officeart/2005/8/layout/hierarchy5"/>
-    <dgm:cxn modelId="{4338A8F5-1855-4967-9959-958B7C519A88}" type="presOf" srcId="{5170FC55-8CD2-4575-8664-FE1527F70A57}" destId="{C85981BA-B3EC-4E1E-B5CC-4C957248A8F4}" srcOrd="0" destOrd="0" presId="urn:microsoft.com/office/officeart/2005/8/layout/hierarchy5"/>
-    <dgm:cxn modelId="{11DBCF88-A519-4C74-9EC2-4468386930C7}" srcId="{F426891C-863F-4A09-A7E9-FC50DCF1E151}" destId="{58F416B4-4AFA-4C6A-9B3B-A1FF9F489D17}" srcOrd="0" destOrd="0" parTransId="{B5DEF538-F16F-487A-9CF1-DF79331A26C1}" sibTransId="{579C376D-2ED9-4F11-9ECA-2B7BACA5A705}"/>
-    <dgm:cxn modelId="{CCCAE1F5-AE8E-4690-8D31-2D20F9A2B3D6}" type="presOf" srcId="{F9140787-06FE-4EBE-A4EB-0CB65F2D6A1B}" destId="{D083E61F-555D-4A96-8A77-3691E3DAB520}" srcOrd="0" destOrd="0" presId="urn:microsoft.com/office/officeart/2005/8/layout/hierarchy5"/>
-    <dgm:cxn modelId="{8F8F50EE-2A52-439F-939B-6A06C2C03A59}" type="presOf" srcId="{21018797-09B0-43BC-990E-D2C4363A13E3}" destId="{6BE3305E-F05E-4807-B948-D6048E81DFB0}" srcOrd="1" destOrd="0" presId="urn:microsoft.com/office/officeart/2005/8/layout/hierarchy5"/>
-    <dgm:cxn modelId="{4A2F8508-D217-4F8C-9727-48CE45D3D3FA}" type="presOf" srcId="{3BEFD10E-3FC3-40B4-9F94-725C61E140A6}" destId="{5B3DBCAE-487B-45C9-B557-F679B80AC45A}" srcOrd="1" destOrd="0" presId="urn:microsoft.com/office/officeart/2005/8/layout/hierarchy5"/>
-    <dgm:cxn modelId="{A4C581A1-919E-447B-9CBF-BAF2C105583C}" srcId="{A5F1D9FE-94AE-4D9D-8104-127130754F38}" destId="{DA6FA8C2-A357-4386-BF3C-EC6C7ED88816}" srcOrd="0" destOrd="0" parTransId="{AA6E28E9-08E4-4159-B4FD-19CE09705769}" sibTransId="{FBACBC3E-1C80-4F18-8487-9AA0FC70B6DA}"/>
-    <dgm:cxn modelId="{E97CAE79-671C-4170-BA0F-C59D13CF649F}" type="presOf" srcId="{BC2138B6-2437-495E-8A8E-A6D94EFDEB17}" destId="{CD4E2D1D-2803-4866-8244-D42D0E2B7384}" srcOrd="1" destOrd="0" presId="urn:microsoft.com/office/officeart/2005/8/layout/hierarchy5"/>
-    <dgm:cxn modelId="{B8E9F457-6037-427A-921C-CC0FBA18B822}" srcId="{1CD9DD62-71D1-4AB4-9004-F666B647DCD2}" destId="{DC2CBB48-DF3A-4C5E-BDF6-ABC816F5C797}" srcOrd="1" destOrd="0" parTransId="{669E2E36-BE92-4756-9E24-4489A1124CD0}" sibTransId="{59E3A54D-0285-43FC-AAC0-E6ECC30617B1}"/>
-    <dgm:cxn modelId="{D91341EE-CC30-4A04-AF38-57F0A831EFC9}" srcId="{FD200CDD-3708-42B4-9412-BC6BC10F780F}" destId="{3F961278-F127-4801-B067-9BB9A29EA637}" srcOrd="1" destOrd="0" parTransId="{BC2138B6-2437-495E-8A8E-A6D94EFDEB17}" sibTransId="{96FCE7FB-CEB5-4B47-87DD-A90FD4FE9CB4}"/>
-    <dgm:cxn modelId="{FEC7ADC7-D455-4A20-AE16-D16FA59241D9}" type="presOf" srcId="{BC2138B6-2437-495E-8A8E-A6D94EFDEB17}" destId="{B22F18DC-87CE-4AED-B450-0239C096CB00}" srcOrd="0" destOrd="0" presId="urn:microsoft.com/office/officeart/2005/8/layout/hierarchy5"/>
-    <dgm:cxn modelId="{3EB96AFB-4BBB-4614-85D4-194BA61CFE88}" type="presOf" srcId="{9427EDE2-FA6C-44D5-BE12-8F55AB4D4442}" destId="{4E7BBCD9-5235-4E66-B597-B5B06CAB7928}" srcOrd="1" destOrd="0" presId="urn:microsoft.com/office/officeart/2005/8/layout/hierarchy5"/>
-    <dgm:cxn modelId="{67AAC91D-372E-41B6-AE78-199F7972761C}" type="presOf" srcId="{AAA0BB42-E0CA-4855-A47A-DAD9CD3E6AC7}" destId="{9C27FF12-1874-4BFC-8976-392ECF8E121C}" srcOrd="0" destOrd="0" presId="urn:microsoft.com/office/officeart/2005/8/layout/hierarchy5"/>
-    <dgm:cxn modelId="{D36D68F5-B3FC-4E02-8EB4-95F0269E16FA}" type="presOf" srcId="{A502BECD-C25C-46DD-998E-BBE3539A2279}" destId="{30D776E8-77C7-481D-8E73-51D329C63D57}" srcOrd="0" destOrd="0" presId="urn:microsoft.com/office/officeart/2005/8/layout/hierarchy5"/>
-    <dgm:cxn modelId="{BDED1751-42B5-4CF1-ADFC-5905D151A9A6}" type="presOf" srcId="{3F961278-F127-4801-B067-9BB9A29EA637}" destId="{FE7F2866-325D-4B3E-967D-67B7E3E88C14}" srcOrd="0" destOrd="0" presId="urn:microsoft.com/office/officeart/2005/8/layout/hierarchy5"/>
-    <dgm:cxn modelId="{4B380693-B4AF-48B7-8D30-CC5243ADC152}" type="presOf" srcId="{B8BCA234-7558-4285-98DC-27C0A68632A0}" destId="{D3D1D14B-DC9D-4496-8982-375857092585}" srcOrd="0" destOrd="0" presId="urn:microsoft.com/office/officeart/2005/8/layout/hierarchy5"/>
-    <dgm:cxn modelId="{9D63E75B-AE28-4D1C-9E4F-B5A08E18E946}" type="presOf" srcId="{0A702134-785B-48E8-A677-613364C9D50E}" destId="{80B81E04-174D-45C2-86AF-F63D1F112A73}" srcOrd="0" destOrd="0" presId="urn:microsoft.com/office/officeart/2005/8/layout/hierarchy5"/>
-    <dgm:cxn modelId="{44AFB108-F6F3-45BC-8F5E-E6BAF1CFF73B}" srcId="{1A1E021E-DEDB-4DC8-914D-3CC33BF64070}" destId="{2DB01136-9D02-44C3-8D30-151451BED77A}" srcOrd="0" destOrd="0" parTransId="{0907BA1B-8C2C-46B2-8919-9D01FC1B262B}" sibTransId="{528F1096-9DDD-4775-A3CF-FA1E95D167DA}"/>
-    <dgm:cxn modelId="{4010B087-8DBC-4776-A6B7-87202ED533DE}" type="presOf" srcId="{1F3ABAE5-FE40-4625-B826-2497EF69ACB0}" destId="{DDB88BFF-D45A-4708-B1D6-9985179F7DBD}" srcOrd="0" destOrd="0" presId="urn:microsoft.com/office/officeart/2005/8/layout/hierarchy5"/>
-    <dgm:cxn modelId="{9C1C473F-A36C-4689-B685-857169970B9A}" type="presOf" srcId="{B5DEF538-F16F-487A-9CF1-DF79331A26C1}" destId="{F5C90689-0D93-4983-824F-43F8C0C1014C}" srcOrd="0" destOrd="0" presId="urn:microsoft.com/office/officeart/2005/8/layout/hierarchy5"/>
-    <dgm:cxn modelId="{BA02EFC0-5B96-4A6A-9645-8BADAB7DCE09}" type="presOf" srcId="{2DB01136-9D02-44C3-8D30-151451BED77A}" destId="{F3538FEE-6D80-44FB-A6F9-4CD03EA1E756}" srcOrd="0" destOrd="0" presId="urn:microsoft.com/office/officeart/2005/8/layout/hierarchy5"/>
-    <dgm:cxn modelId="{6C653AA0-FEDC-4902-B0EC-648BAC65DEAD}" type="presOf" srcId="{64665E1A-AFF0-43DA-B18D-D3AF74A28B79}" destId="{8BFF3A73-F0C1-4E71-86E0-B4A468729C59}" srcOrd="1" destOrd="0" presId="urn:microsoft.com/office/officeart/2005/8/layout/hierarchy5"/>
-    <dgm:cxn modelId="{BD8C6555-5FD0-4F9B-BD83-C672BC20DF75}" type="presOf" srcId="{3703CCF6-A05B-4A59-8A37-C9334B8CE4EA}" destId="{B8C2E5A0-CC61-472F-B45F-8E1C02483554}" srcOrd="1" destOrd="0" presId="urn:microsoft.com/office/officeart/2005/8/layout/hierarchy5"/>
-    <dgm:cxn modelId="{923ABBAA-84C7-49E6-BDB4-01C61BC91387}" type="presOf" srcId="{1834AC4E-85AB-49FF-B573-A4707299E0E7}" destId="{99C06FA2-59E4-4652-9628-1AE4948833D7}" srcOrd="0" destOrd="0" presId="urn:microsoft.com/office/officeart/2005/8/layout/hierarchy5"/>
-    <dgm:cxn modelId="{0D4A46F9-FA03-4043-AD14-81CC3DCABFE4}" type="presOf" srcId="{AA6E28E9-08E4-4159-B4FD-19CE09705769}" destId="{96F733B4-71CF-4F60-B4BF-457F41FD9E8A}" srcOrd="0" destOrd="0" presId="urn:microsoft.com/office/officeart/2005/8/layout/hierarchy5"/>
-    <dgm:cxn modelId="{930F809C-586B-4A8A-9ED4-73BAF1C26049}" type="presOf" srcId="{6B6BB9DE-F38D-4E54-9E28-CC69F328C37F}" destId="{1B604072-CA25-4129-8EB6-D106EE75C333}" srcOrd="0" destOrd="0" presId="urn:microsoft.com/office/officeart/2005/8/layout/hierarchy5"/>
-    <dgm:cxn modelId="{7F542CD7-FAA7-4710-930E-C58BF7601898}" type="presOf" srcId="{2D4BCDE3-0492-4071-8698-EF997550D916}" destId="{C08AD4DC-4EEE-4327-8D4E-4150C94BBD0E}" srcOrd="0" destOrd="0" presId="urn:microsoft.com/office/officeart/2005/8/layout/hierarchy5"/>
-    <dgm:cxn modelId="{976FB3F1-6C80-43D3-AADB-D879499CA429}" srcId="{F17D0DD2-BF6D-4CBD-A713-53D9A18B0296}" destId="{1A1E021E-DEDB-4DC8-914D-3CC33BF64070}" srcOrd="0" destOrd="0" parTransId="{5F8BA5B6-A0FC-4E95-AA0E-7A970892ADC8}" sibTransId="{326E1A0A-BBCE-42D0-9FFC-1E0BB4074673}"/>
-    <dgm:cxn modelId="{15DAB7B0-2396-4BAE-B003-C5F7B9B2FBE7}" type="presOf" srcId="{81B61790-51E0-4BE6-82A9-4D5328232DF4}" destId="{458D0804-25FD-4A67-88D8-B0E9E8A08FED}" srcOrd="1" destOrd="0" presId="urn:microsoft.com/office/officeart/2005/8/layout/hierarchy5"/>
     <dgm:cxn modelId="{F32FB75D-82F3-4276-A65C-5221B6D7CE90}" type="presParOf" srcId="{94863F81-6F51-415B-BE40-8777D7E91B03}" destId="{BA894299-97DB-4667-BF57-DEC7597AD851}" srcOrd="0" destOrd="0" presId="urn:microsoft.com/office/officeart/2005/8/layout/hierarchy5"/>
     <dgm:cxn modelId="{530E356E-34A3-49B8-BACF-3BB09998149B}" type="presParOf" srcId="{BA894299-97DB-4667-BF57-DEC7597AD851}" destId="{C46F04B1-0A59-409F-8A7B-43A5BD1D5A98}" srcOrd="0" destOrd="0" presId="urn:microsoft.com/office/officeart/2005/8/layout/hierarchy5"/>
     <dgm:cxn modelId="{94B069D1-F3DC-42C1-B407-7E7563325AAF}" type="presParOf" srcId="{BA894299-97DB-4667-BF57-DEC7597AD851}" destId="{C3B457EC-6170-4A59-8BE4-5E6C374E73DB}" srcOrd="1" destOrd="0" presId="urn:microsoft.com/office/officeart/2005/8/layout/hierarchy5"/>
@@ -12313,7 +12316,7 @@
           <a:p>
             <a:fld id="{FE8BC13A-84C2-4F23-B046-9F1FD285F1D3}" type="datetimeFigureOut">
               <a:rPr lang="en-US" smtClean="0"/>
-              <a:t>11/1/2017</a:t>
+              <a:t>11/9/2017</a:t>
             </a:fld>
             <a:endParaRPr lang="en-US"/>
           </a:p>
@@ -12586,7 +12589,7 @@
           <a:p>
             <a:fld id="{FE8BC13A-84C2-4F23-B046-9F1FD285F1D3}" type="datetimeFigureOut">
               <a:rPr lang="en-US" smtClean="0"/>
-              <a:t>11/1/2017</a:t>
+              <a:t>11/9/2017</a:t>
             </a:fld>
             <a:endParaRPr lang="en-US"/>
           </a:p>
@@ -12843,7 +12846,7 @@
           <a:p>
             <a:fld id="{FE8BC13A-84C2-4F23-B046-9F1FD285F1D3}" type="datetimeFigureOut">
               <a:rPr lang="en-US" smtClean="0"/>
-              <a:t>11/1/2017</a:t>
+              <a:t>11/9/2017</a:t>
             </a:fld>
             <a:endParaRPr lang="en-US"/>
           </a:p>
@@ -13190,7 +13193,7 @@
           <a:p>
             <a:fld id="{FE8BC13A-84C2-4F23-B046-9F1FD285F1D3}" type="datetimeFigureOut">
               <a:rPr lang="en-US" smtClean="0"/>
-              <a:t>11/1/2017</a:t>
+              <a:t>11/9/2017</a:t>
             </a:fld>
             <a:endParaRPr lang="en-US"/>
           </a:p>
@@ -13592,7 +13595,7 @@
           <a:p>
             <a:fld id="{FE8BC13A-84C2-4F23-B046-9F1FD285F1D3}" type="datetimeFigureOut">
               <a:rPr lang="en-US" smtClean="0"/>
-              <a:t>11/1/2017</a:t>
+              <a:t>11/9/2017</a:t>
             </a:fld>
             <a:endParaRPr lang="en-US"/>
           </a:p>
@@ -13710,7 +13713,7 @@
           <a:p>
             <a:fld id="{FE8BC13A-84C2-4F23-B046-9F1FD285F1D3}" type="datetimeFigureOut">
               <a:rPr lang="en-US" smtClean="0"/>
-              <a:t>11/1/2017</a:t>
+              <a:t>11/9/2017</a:t>
             </a:fld>
             <a:endParaRPr lang="en-US"/>
           </a:p>
@@ -13805,7 +13808,7 @@
           <a:p>
             <a:fld id="{FE8BC13A-84C2-4F23-B046-9F1FD285F1D3}" type="datetimeFigureOut">
               <a:rPr lang="en-US" smtClean="0"/>
-              <a:t>11/1/2017</a:t>
+              <a:t>11/9/2017</a:t>
             </a:fld>
             <a:endParaRPr lang="en-US"/>
           </a:p>
@@ -14095,7 +14098,7 @@
           <a:p>
             <a:fld id="{FE8BC13A-84C2-4F23-B046-9F1FD285F1D3}" type="datetimeFigureOut">
               <a:rPr lang="en-US" smtClean="0"/>
-              <a:t>11/1/2017</a:t>
+              <a:t>11/9/2017</a:t>
             </a:fld>
             <a:endParaRPr lang="en-US"/>
           </a:p>
@@ -14372,7 +14375,7 @@
           <a:p>
             <a:fld id="{FE8BC13A-84C2-4F23-B046-9F1FD285F1D3}" type="datetimeFigureOut">
               <a:rPr lang="en-US" smtClean="0"/>
-              <a:t>11/1/2017</a:t>
+              <a:t>11/9/2017</a:t>
             </a:fld>
             <a:endParaRPr lang="en-US"/>
           </a:p>
@@ -14625,7 +14628,7 @@
           <a:p>
             <a:fld id="{FE8BC13A-84C2-4F23-B046-9F1FD285F1D3}" type="datetimeFigureOut">
               <a:rPr lang="en-US" smtClean="0"/>
-              <a:t>11/1/2017</a:t>
+              <a:t>11/9/2017</a:t>
             </a:fld>
             <a:endParaRPr lang="en-US"/>
           </a:p>
@@ -15616,6 +15619,376 @@
           <a:p>
             <a:r>
               <a:rPr lang="en-US" dirty="0" smtClean="0"/>
+              <a:t>Converting </a:t>
+            </a:r>
+            <a:r>
+              <a:rPr lang="en-US" dirty="0" smtClean="0"/>
+              <a:t>Process Flows</a:t>
+            </a:r>
+            <a:endParaRPr lang="en-US" dirty="0"/>
+          </a:p>
+        </p:txBody>
+      </p:sp>
+      <p:sp>
+        <p:nvSpPr>
+          <p:cNvPr id="3" name="Content Placeholder 2"/>
+          <p:cNvSpPr>
+            <a:spLocks noGrp="1"/>
+          </p:cNvSpPr>
+          <p:nvPr>
+            <p:ph idx="1"/>
+          </p:nvPr>
+        </p:nvSpPr>
+        <p:spPr/>
+        <p:txBody>
+          <a:bodyPr>
+            <a:normAutofit/>
+          </a:bodyPr>
+          <a:lstStyle/>
+          <a:p>
+            <a:pPr lvl="1"/>
+            <a:r>
+              <a:rPr lang="en-US" sz="2400" dirty="0" smtClean="0"/>
+              <a:t>Procedural code often leaks into methods that are procedures</a:t>
+            </a:r>
+          </a:p>
+          <a:p>
+            <a:pPr lvl="1"/>
+            <a:r>
+              <a:rPr lang="en-US" sz="2400" dirty="0" smtClean="0"/>
+              <a:t>This code, over time, become harder and harder to modify</a:t>
+            </a:r>
+          </a:p>
+          <a:p>
+            <a:pPr lvl="1"/>
+            <a:r>
+              <a:rPr lang="en-US" sz="2400" dirty="0" smtClean="0"/>
+              <a:t>It often</a:t>
+            </a:r>
+            <a:r>
+              <a:rPr lang="en-US" sz="2400" dirty="0" smtClean="0"/>
+              <a:t> collects technical debt as incongruent requirements from external systems</a:t>
+            </a:r>
+          </a:p>
+          <a:p>
+            <a:pPr lvl="1"/>
+            <a:r>
+              <a:rPr lang="en-US" sz="2400" dirty="0" smtClean="0"/>
+              <a:t>You want to design for change and long procedural methods are not the way to make change easy</a:t>
+            </a:r>
+          </a:p>
+          <a:p>
+            <a:pPr lvl="1"/>
+            <a:endParaRPr lang="en-US" sz="2400" dirty="0"/>
+          </a:p>
+          <a:p>
+            <a:pPr lvl="1"/>
+            <a:r>
+              <a:rPr lang="en-US" sz="2400" dirty="0" smtClean="0"/>
+              <a:t>Let’s look as a simple Object Oriented Process Engine</a:t>
+            </a:r>
+            <a:endParaRPr lang="en-US" sz="2400" dirty="0"/>
+          </a:p>
+        </p:txBody>
+      </p:sp>
+    </p:spTree>
+    <p:extLst>
+      <p:ext uri="{BB962C8B-B14F-4D97-AF65-F5344CB8AC3E}">
+        <p14:creationId xmlns:p14="http://schemas.microsoft.com/office/powerpoint/2010/main" val="1526294612"/>
+      </p:ext>
+    </p:extLst>
+  </p:cSld>
+  <p:clrMapOvr>
+    <a:masterClrMapping/>
+  </p:clrMapOvr>
+  <p:timing>
+    <p:tnLst>
+      <p:par>
+        <p:cTn id="1" dur="indefinite" restart="never" nodeType="tmRoot"/>
+      </p:par>
+    </p:tnLst>
+  </p:timing>
+</p:sld>
+</file>
+
+<file path=ppt/slides/slide14.xml><?xml version="1.0" encoding="utf-8"?>
+<p:sld xmlns:a="http://schemas.openxmlformats.org/drawingml/2006/main" xmlns:r="http://schemas.openxmlformats.org/officeDocument/2006/relationships" xmlns:p="http://schemas.openxmlformats.org/presentationml/2006/main">
+  <p:cSld>
+    <p:spTree>
+      <p:nvGrpSpPr>
+        <p:cNvPr id="1" name=""/>
+        <p:cNvGrpSpPr/>
+        <p:nvPr/>
+      </p:nvGrpSpPr>
+      <p:grpSpPr>
+        <a:xfrm>
+          <a:off x="0" y="0"/>
+          <a:ext cx="0" cy="0"/>
+          <a:chOff x="0" y="0"/>
+          <a:chExt cx="0" cy="0"/>
+        </a:xfrm>
+      </p:grpSpPr>
+      <p:sp>
+        <p:nvSpPr>
+          <p:cNvPr id="2" name="Title 1"/>
+          <p:cNvSpPr>
+            <a:spLocks noGrp="1"/>
+          </p:cNvSpPr>
+          <p:nvPr>
+            <p:ph type="title"/>
+          </p:nvPr>
+        </p:nvSpPr>
+        <p:spPr/>
+        <p:txBody>
+          <a:bodyPr/>
+          <a:lstStyle/>
+          <a:p>
+            <a:r>
+              <a:rPr lang="en-US" dirty="0" smtClean="0"/>
+              <a:t>Code Demo</a:t>
+            </a:r>
+            <a:endParaRPr lang="en-US" dirty="0"/>
+          </a:p>
+        </p:txBody>
+      </p:sp>
+      <p:pic>
+        <p:nvPicPr>
+          <p:cNvPr id="7" name="Content Placeholder 6"/>
+          <p:cNvPicPr>
+            <a:picLocks noGrp="1" noChangeAspect="1"/>
+          </p:cNvPicPr>
+          <p:nvPr>
+            <p:ph sz="half" idx="1"/>
+          </p:nvPr>
+        </p:nvPicPr>
+        <p:blipFill>
+          <a:blip r:embed="rId2"/>
+          <a:stretch>
+            <a:fillRect/>
+          </a:stretch>
+        </p:blipFill>
+        <p:spPr>
+          <a:xfrm>
+            <a:off x="1422606" y="2286000"/>
+            <a:ext cx="3957226" cy="4022725"/>
+          </a:xfrm>
+          <a:prstGeom prst="rect">
+            <a:avLst/>
+          </a:prstGeom>
+        </p:spPr>
+      </p:pic>
+      <p:pic>
+        <p:nvPicPr>
+          <p:cNvPr id="8" name="Content Placeholder 7"/>
+          <p:cNvPicPr>
+            <a:picLocks noGrp="1" noChangeAspect="1"/>
+          </p:cNvPicPr>
+          <p:nvPr>
+            <p:ph sz="half" idx="2"/>
+          </p:nvPr>
+        </p:nvPicPr>
+        <p:blipFill>
+          <a:blip r:embed="rId3"/>
+          <a:stretch>
+            <a:fillRect/>
+          </a:stretch>
+        </p:blipFill>
+        <p:spPr>
+          <a:xfrm>
+            <a:off x="6023769" y="2668587"/>
+            <a:ext cx="4686300" cy="3257550"/>
+          </a:xfrm>
+          <a:prstGeom prst="rect">
+            <a:avLst/>
+          </a:prstGeom>
+        </p:spPr>
+      </p:pic>
+    </p:spTree>
+    <p:extLst>
+      <p:ext uri="{BB962C8B-B14F-4D97-AF65-F5344CB8AC3E}">
+        <p14:creationId xmlns:p14="http://schemas.microsoft.com/office/powerpoint/2010/main" val="2163253683"/>
+      </p:ext>
+    </p:extLst>
+  </p:cSld>
+  <p:clrMapOvr>
+    <a:masterClrMapping/>
+  </p:clrMapOvr>
+  <p:timing>
+    <p:tnLst>
+      <p:par>
+        <p:cTn id="1" dur="indefinite" restart="never" nodeType="tmRoot"/>
+      </p:par>
+    </p:tnLst>
+  </p:timing>
+</p:sld>
+</file>
+
+<file path=ppt/slides/slide15.xml><?xml version="1.0" encoding="utf-8"?>
+<p:sld xmlns:a="http://schemas.openxmlformats.org/drawingml/2006/main" xmlns:r="http://schemas.openxmlformats.org/officeDocument/2006/relationships" xmlns:p="http://schemas.openxmlformats.org/presentationml/2006/main">
+  <p:cSld>
+    <p:spTree>
+      <p:nvGrpSpPr>
+        <p:cNvPr id="1" name=""/>
+        <p:cNvGrpSpPr/>
+        <p:nvPr/>
+      </p:nvGrpSpPr>
+      <p:grpSpPr>
+        <a:xfrm>
+          <a:off x="0" y="0"/>
+          <a:ext cx="0" cy="0"/>
+          <a:chOff x="0" y="0"/>
+          <a:chExt cx="0" cy="0"/>
+        </a:xfrm>
+      </p:grpSpPr>
+      <p:sp>
+        <p:nvSpPr>
+          <p:cNvPr id="2" name="Title 1"/>
+          <p:cNvSpPr>
+            <a:spLocks noGrp="1"/>
+          </p:cNvSpPr>
+          <p:nvPr>
+            <p:ph type="title"/>
+          </p:nvPr>
+        </p:nvSpPr>
+        <p:spPr/>
+        <p:txBody>
+          <a:bodyPr/>
+          <a:lstStyle/>
+          <a:p>
+            <a:r>
+              <a:rPr lang="en-US" dirty="0" smtClean="0"/>
+              <a:t>Transition Tactic: </a:t>
+            </a:r>
+            <a:r>
+              <a:rPr lang="en-US" dirty="0" smtClean="0"/>
+              <a:t>Process Engine</a:t>
+            </a:r>
+            <a:endParaRPr lang="en-US" dirty="0"/>
+          </a:p>
+        </p:txBody>
+      </p:sp>
+      <p:sp>
+        <p:nvSpPr>
+          <p:cNvPr id="3" name="Content Placeholder 2"/>
+          <p:cNvSpPr>
+            <a:spLocks noGrp="1"/>
+          </p:cNvSpPr>
+          <p:nvPr>
+            <p:ph idx="1"/>
+          </p:nvPr>
+        </p:nvSpPr>
+        <p:spPr/>
+        <p:txBody>
+          <a:bodyPr/>
+          <a:lstStyle/>
+          <a:p>
+            <a:pPr marL="457200" indent="-457200">
+              <a:buFont typeface="+mj-lt"/>
+              <a:buAutoNum type="arabicPeriod"/>
+            </a:pPr>
+            <a:r>
+              <a:rPr lang="en-US" dirty="0" smtClean="0"/>
+              <a:t>Wrap all of the process data into a context object that tracks the state of the execution.</a:t>
+            </a:r>
+          </a:p>
+          <a:p>
+            <a:pPr marL="457200" indent="-457200">
+              <a:buFont typeface="+mj-lt"/>
+              <a:buAutoNum type="arabicPeriod"/>
+            </a:pPr>
+            <a:r>
+              <a:rPr lang="en-US" dirty="0" smtClean="0"/>
+              <a:t>Convert each step of the process into a command object that executes with a common execution interface.</a:t>
+            </a:r>
+          </a:p>
+          <a:p>
+            <a:pPr marL="457200" indent="-457200">
+              <a:buFont typeface="+mj-lt"/>
+              <a:buAutoNum type="arabicPeriod"/>
+            </a:pPr>
+            <a:r>
+              <a:rPr lang="en-US" dirty="0" smtClean="0"/>
+              <a:t>Wrap external interface control requirements into the execution step so that the step serves as an adapter layer.</a:t>
+            </a:r>
+          </a:p>
+          <a:p>
+            <a:pPr marL="457200" indent="-457200">
+              <a:buFont typeface="+mj-lt"/>
+              <a:buAutoNum type="arabicPeriod"/>
+            </a:pPr>
+            <a:r>
+              <a:rPr lang="en-US" dirty="0" smtClean="0"/>
+              <a:t>Configure the execution pipeline as a collection of </a:t>
+            </a:r>
+            <a:r>
+              <a:rPr lang="en-US" smtClean="0"/>
+              <a:t>step objects </a:t>
+            </a:r>
+            <a:r>
+              <a:rPr lang="en-US" dirty="0" smtClean="0"/>
+              <a:t>so you can change the steps by just changing the number of objects in the collection.</a:t>
+            </a:r>
+          </a:p>
+          <a:p>
+            <a:pPr marL="457200" indent="-457200">
+              <a:buFont typeface="+mj-lt"/>
+              <a:buAutoNum type="arabicPeriod"/>
+            </a:pPr>
+            <a:r>
+              <a:rPr lang="en-US" dirty="0" smtClean="0"/>
+              <a:t>Execute the steps with a simple loop.</a:t>
+            </a:r>
+            <a:endParaRPr lang="en-US" dirty="0"/>
+          </a:p>
+        </p:txBody>
+      </p:sp>
+    </p:spTree>
+    <p:extLst>
+      <p:ext uri="{BB962C8B-B14F-4D97-AF65-F5344CB8AC3E}">
+        <p14:creationId xmlns:p14="http://schemas.microsoft.com/office/powerpoint/2010/main" val="1304835210"/>
+      </p:ext>
+    </p:extLst>
+  </p:cSld>
+  <p:clrMapOvr>
+    <a:masterClrMapping/>
+  </p:clrMapOvr>
+</p:sld>
+</file>
+
+<file path=ppt/slides/slide16.xml><?xml version="1.0" encoding="utf-8"?>
+<p:sld xmlns:a="http://schemas.openxmlformats.org/drawingml/2006/main" xmlns:r="http://schemas.openxmlformats.org/officeDocument/2006/relationships" xmlns:p="http://schemas.openxmlformats.org/presentationml/2006/main">
+  <p:cSld>
+    <p:spTree>
+      <p:nvGrpSpPr>
+        <p:cNvPr id="1" name=""/>
+        <p:cNvGrpSpPr/>
+        <p:nvPr/>
+      </p:nvGrpSpPr>
+      <p:grpSpPr>
+        <a:xfrm>
+          <a:off x="0" y="0"/>
+          <a:ext cx="0" cy="0"/>
+          <a:chOff x="0" y="0"/>
+          <a:chExt cx="0" cy="0"/>
+        </a:xfrm>
+      </p:grpSpPr>
+      <p:sp>
+        <p:nvSpPr>
+          <p:cNvPr id="2" name="Title 1"/>
+          <p:cNvSpPr>
+            <a:spLocks noGrp="1"/>
+          </p:cNvSpPr>
+          <p:nvPr>
+            <p:ph type="title"/>
+          </p:nvPr>
+        </p:nvSpPr>
+        <p:spPr/>
+        <p:txBody>
+          <a:bodyPr/>
+          <a:lstStyle/>
+          <a:p>
+            <a:r>
+              <a:rPr lang="en-US" dirty="0" smtClean="0"/>
               <a:t>Thanks to all the </a:t>
             </a:r>
             <a:r>
@@ -15624,11 +15997,7 @@
             </a:r>
             <a:r>
               <a:rPr lang="en-US" dirty="0" smtClean="0"/>
-              <a:t> </a:t>
-            </a:r>
-            <a:r>
-              <a:rPr lang="en-US" dirty="0" smtClean="0"/>
-              <a:t>DEVS!</a:t>
+              <a:t> DEVS!</a:t>
             </a:r>
             <a:endParaRPr lang="en-US" dirty="0"/>
           </a:p>

</xml_diff>